<commit_message>
tweak eh fig again
Signed-off-by: Jinghao Jia <jinghao7@illinois.edu>
</commit_message>
<xml_diff>
--- a/figs/exception_handling.pptx
+++ b/figs/exception_handling.pptx
@@ -3270,7 +3270,7 @@
         <p:spPr>
           <a:xfrm>
             <a:off x="161813" y="2714224"/>
-            <a:ext cx="4014215" cy="1307592"/>
+            <a:ext cx="4014215" cy="1102123"/>
           </a:xfrm>
           <a:prstGeom prst="rect">
             <a:avLst/>
@@ -3508,8 +3508,8 @@
         </p:nvSpPr>
         <p:spPr>
           <a:xfrm>
-            <a:off x="92154" y="12935"/>
-            <a:ext cx="4162402" cy="4101865"/>
+            <a:off x="92154" y="12936"/>
+            <a:ext cx="4162402" cy="3803412"/>
           </a:xfrm>
           <a:prstGeom prst="rect">
             <a:avLst/>
@@ -3695,7 +3695,7 @@
                 <a:latin typeface="Consolas" panose="020B0609020204030204" pitchFamily="49" charset="0"/>
                 <a:cs typeface="Consolas" panose="020B0609020204030204" pitchFamily="49" charset="0"/>
               </a:rPr>
-              <a:t>iu_old_sp</a:t>
+              <a:t>rex_old_sp</a:t>
             </a:r>
             <a:r>
               <a:rPr lang="en-US" sz="1400" dirty="0">
@@ -3757,7 +3757,7 @@
                 <a:latin typeface="Consolas" panose="020B0609020204030204" pitchFamily="49" charset="0"/>
                 <a:cs typeface="Consolas" panose="020B0609020204030204" pitchFamily="49" charset="0"/>
               </a:rPr>
-              <a:t>iu_stack_ptr</a:t>
+              <a:t>rex_stack</a:t>
             </a:r>
             <a:r>
               <a:rPr lang="en-US" sz="1400" dirty="0">
@@ -3925,7 +3925,7 @@
                 <a:latin typeface="Consolas" panose="020B0609020204030204" pitchFamily="49" charset="0"/>
                 <a:cs typeface="Consolas" panose="020B0609020204030204" pitchFamily="49" charset="0"/>
               </a:rPr>
-              <a:t>iu_old_sp</a:t>
+              <a:t>rex_old_sp</a:t>
             </a:r>
             <a:r>
               <a:rPr lang="en-US" sz="1400" dirty="0">
@@ -3946,68 +3946,6 @@
                 <a:cs typeface="Consolas" panose="020B0609020204030204" pitchFamily="49" charset="0"/>
               </a:rPr>
               <a:t>rsp</a:t>
-            </a:r>
-            <a:endParaRPr lang="en-US" sz="1400" dirty="0">
-              <a:solidFill>
-                <a:prstClr val="black"/>
-              </a:solidFill>
-              <a:latin typeface="Consolas" panose="020B0609020204030204" pitchFamily="49" charset="0"/>
-              <a:cs typeface="Consolas" panose="020B0609020204030204" pitchFamily="49" charset="0"/>
-            </a:endParaRPr>
-          </a:p>
-          <a:p>
-            <a:pPr defTabSz="914400">
-              <a:defRPr/>
-            </a:pPr>
-            <a:r>
-              <a:rPr lang="en-US" sz="1400" dirty="0" err="1">
-                <a:solidFill>
-                  <a:prstClr val="black"/>
-                </a:solidFill>
-                <a:latin typeface="Consolas" panose="020B0609020204030204" pitchFamily="49" charset="0"/>
-                <a:cs typeface="Consolas" panose="020B0609020204030204" pitchFamily="49" charset="0"/>
-              </a:rPr>
-              <a:t>movq</a:t>
-            </a:r>
-            <a:r>
-              <a:rPr lang="en-US" sz="1400" dirty="0">
-                <a:solidFill>
-                  <a:prstClr val="black"/>
-                </a:solidFill>
-                <a:latin typeface="Consolas" panose="020B0609020204030204" pitchFamily="49" charset="0"/>
-                <a:cs typeface="Consolas" panose="020B0609020204030204" pitchFamily="49" charset="0"/>
-              </a:rPr>
-              <a:t> PER_CPU_VAR(</a:t>
-            </a:r>
-            <a:r>
-              <a:rPr lang="en-US" sz="1400" dirty="0" err="1">
-                <a:solidFill>
-                  <a:prstClr val="black"/>
-                </a:solidFill>
-                <a:latin typeface="Consolas" panose="020B0609020204030204" pitchFamily="49" charset="0"/>
-                <a:cs typeface="Consolas" panose="020B0609020204030204" pitchFamily="49" charset="0"/>
-              </a:rPr>
-              <a:t>iu_old_fp</a:t>
-            </a:r>
-            <a:r>
-              <a:rPr lang="en-US" sz="1400" dirty="0">
-                <a:solidFill>
-                  <a:prstClr val="black"/>
-                </a:solidFill>
-                <a:latin typeface="Consolas" panose="020B0609020204030204" pitchFamily="49" charset="0"/>
-                <a:cs typeface="Consolas" panose="020B0609020204030204" pitchFamily="49" charset="0"/>
-              </a:rPr>
-              <a:t>), %</a:t>
-            </a:r>
-            <a:r>
-              <a:rPr lang="en-US" sz="1400" dirty="0" err="1">
-                <a:solidFill>
-                  <a:prstClr val="black"/>
-                </a:solidFill>
-                <a:latin typeface="Consolas" panose="020B0609020204030204" pitchFamily="49" charset="0"/>
-                <a:cs typeface="Consolas" panose="020B0609020204030204" pitchFamily="49" charset="0"/>
-              </a:rPr>
-              <a:t>rbp</a:t>
             </a:r>
             <a:endParaRPr lang="en-US" sz="1400" dirty="0">
               <a:solidFill>
@@ -4170,8 +4108,19 @@
                 <a:latin typeface="Times New Roman" panose="02020603050405020304" pitchFamily="18" charset="0"/>
                 <a:cs typeface="Times New Roman" panose="02020603050405020304" pitchFamily="18" charset="0"/>
               </a:rPr>
-              <a:t>Panic Handler</a:t>
-            </a:r>
+              <a:t>In-kernel </a:t>
+            </a:r>
+            <a:r>
+              <a:rPr lang="en-US" dirty="0" err="1">
+                <a:latin typeface="Times New Roman" panose="02020603050405020304" pitchFamily="18" charset="0"/>
+                <a:cs typeface="Times New Roman" panose="02020603050405020304" pitchFamily="18" charset="0"/>
+              </a:rPr>
+              <a:t>landingpad</a:t>
+            </a:r>
+            <a:endParaRPr lang="en-US" dirty="0">
+              <a:latin typeface="Times New Roman" panose="02020603050405020304" pitchFamily="18" charset="0"/>
+              <a:cs typeface="Times New Roman" panose="02020603050405020304" pitchFamily="18" charset="0"/>
+            </a:endParaRPr>
           </a:p>
           <a:p>
             <a:endParaRPr lang="en-US" dirty="0">
@@ -4272,17 +4221,19 @@
           </p:cNvPr>
           <p:cNvCxnSpPr>
             <a:cxnSpLocks/>
+            <a:stCxn id="40" idx="10"/>
+            <a:endCxn id="9" idx="1"/>
           </p:cNvCxnSpPr>
           <p:nvPr/>
         </p:nvCxnSpPr>
         <p:spPr>
-          <a:xfrm rot="16200000" flipH="1">
-            <a:off x="5229978" y="1183931"/>
-            <a:ext cx="1700282" cy="1082243"/>
+          <a:xfrm rot="10800000" flipV="1">
+            <a:off x="5182428" y="1641927"/>
+            <a:ext cx="79829" cy="1058831"/>
           </a:xfrm>
           <a:prstGeom prst="bentConnector3">
             <a:avLst>
-              <a:gd name="adj1" fmla="val 50000"/>
+              <a:gd name="adj1" fmla="val 490493"/>
             </a:avLst>
           </a:prstGeom>
           <a:ln w="34925">
@@ -4373,7 +4324,7 @@
         </p:nvSpPr>
         <p:spPr>
           <a:xfrm>
-            <a:off x="5446645" y="1347269"/>
+            <a:off x="5262256" y="1328877"/>
             <a:ext cx="1266951" cy="626102"/>
           </a:xfrm>
           <a:prstGeom prst="star16">
@@ -4413,6 +4364,162 @@
               <a:t>Panic</a:t>
             </a:r>
             <a:endParaRPr lang="en-US" sz="1600" dirty="0"/>
+          </a:p>
+        </p:txBody>
+      </p:sp>
+      <p:sp>
+        <p:nvSpPr>
+          <p:cNvPr id="9" name="Rectangle 8">
+            <a:extLst>
+              <a:ext uri="{FF2B5EF4-FFF2-40B4-BE49-F238E27FC236}">
+                <a16:creationId xmlns:a16="http://schemas.microsoft.com/office/drawing/2014/main" id="{5EDB9AA2-1D81-1C8E-BD4D-8E31340F0699}"/>
+              </a:ext>
+            </a:extLst>
+          </p:cNvPr>
+          <p:cNvSpPr/>
+          <p:nvPr/>
+        </p:nvSpPr>
+        <p:spPr>
+          <a:xfrm>
+            <a:off x="5182427" y="2575190"/>
+            <a:ext cx="1540921" cy="251137"/>
+          </a:xfrm>
+          <a:prstGeom prst="rect">
+            <a:avLst/>
+          </a:prstGeom>
+          <a:solidFill>
+            <a:schemeClr val="accent1">
+              <a:alpha val="0"/>
+            </a:schemeClr>
+          </a:solidFill>
+          <a:ln>
+            <a:noFill/>
+          </a:ln>
+        </p:spPr>
+        <p:style>
+          <a:lnRef idx="2">
+            <a:schemeClr val="accent1">
+              <a:shade val="15000"/>
+            </a:schemeClr>
+          </a:lnRef>
+          <a:fillRef idx="1">
+            <a:schemeClr val="accent1"/>
+          </a:fillRef>
+          <a:effectRef idx="0">
+            <a:schemeClr val="accent1"/>
+          </a:effectRef>
+          <a:fontRef idx="minor">
+            <a:schemeClr val="lt1"/>
+          </a:fontRef>
+        </p:style>
+        <p:txBody>
+          <a:bodyPr rtlCol="0" anchor="ctr"/>
+          <a:lstStyle/>
+          <a:p>
+            <a:pPr algn="ctr"/>
+            <a:endParaRPr lang="en-US" dirty="0"/>
+          </a:p>
+        </p:txBody>
+      </p:sp>
+      <p:cxnSp>
+        <p:nvCxnSpPr>
+          <p:cNvPr id="15" name="Elbow Connector 14">
+            <a:extLst>
+              <a:ext uri="{FF2B5EF4-FFF2-40B4-BE49-F238E27FC236}">
+                <a16:creationId xmlns:a16="http://schemas.microsoft.com/office/drawing/2014/main" id="{810763AC-E56E-511C-01EB-3FFB1CCA76FC}"/>
+              </a:ext>
+            </a:extLst>
+          </p:cNvPr>
+          <p:cNvCxnSpPr>
+            <a:cxnSpLocks/>
+            <a:stCxn id="22" idx="3"/>
+            <a:endCxn id="40" idx="14"/>
+          </p:cNvCxnSpPr>
+          <p:nvPr/>
+        </p:nvCxnSpPr>
+        <p:spPr>
+          <a:xfrm>
+            <a:off x="5486400" y="896555"/>
+            <a:ext cx="409332" cy="432322"/>
+          </a:xfrm>
+          <a:prstGeom prst="bentConnector2">
+            <a:avLst/>
+          </a:prstGeom>
+          <a:ln w="34925">
+            <a:solidFill>
+              <a:srgbClr val="C00000"/>
+            </a:solidFill>
+            <a:prstDash val="sysDot"/>
+            <a:round/>
+            <a:tailEnd type="triangle"/>
+          </a:ln>
+        </p:spPr>
+        <p:style>
+          <a:lnRef idx="2">
+            <a:schemeClr val="accent1"/>
+          </a:lnRef>
+          <a:fillRef idx="0">
+            <a:schemeClr val="accent1"/>
+          </a:fillRef>
+          <a:effectRef idx="1">
+            <a:schemeClr val="accent1"/>
+          </a:effectRef>
+          <a:fontRef idx="minor">
+            <a:schemeClr val="tx1"/>
+          </a:fontRef>
+        </p:style>
+      </p:cxnSp>
+      <p:sp>
+        <p:nvSpPr>
+          <p:cNvPr id="22" name="Rectangle 21">
+            <a:extLst>
+              <a:ext uri="{FF2B5EF4-FFF2-40B4-BE49-F238E27FC236}">
+                <a16:creationId xmlns:a16="http://schemas.microsoft.com/office/drawing/2014/main" id="{17C96EE5-C1CA-1C2F-7300-AA9E703BD53E}"/>
+              </a:ext>
+            </a:extLst>
+          </p:cNvPr>
+          <p:cNvSpPr/>
+          <p:nvPr/>
+        </p:nvSpPr>
+        <p:spPr>
+          <a:xfrm>
+            <a:off x="5128639" y="794327"/>
+            <a:ext cx="357761" cy="204455"/>
+          </a:xfrm>
+          <a:prstGeom prst="rect">
+            <a:avLst/>
+          </a:prstGeom>
+          <a:solidFill>
+            <a:schemeClr val="accent1">
+              <a:alpha val="0"/>
+            </a:schemeClr>
+          </a:solidFill>
+          <a:ln>
+            <a:noFill/>
+          </a:ln>
+        </p:spPr>
+        <p:style>
+          <a:lnRef idx="2">
+            <a:schemeClr val="accent1">
+              <a:shade val="15000"/>
+            </a:schemeClr>
+          </a:lnRef>
+          <a:fillRef idx="1">
+            <a:schemeClr val="accent1"/>
+          </a:fillRef>
+          <a:effectRef idx="0">
+            <a:schemeClr val="accent1"/>
+          </a:effectRef>
+          <a:fontRef idx="minor">
+            <a:schemeClr val="lt1"/>
+          </a:fontRef>
+        </p:style>
+        <p:txBody>
+          <a:bodyPr rtlCol="0" anchor="ctr"/>
+          <a:lstStyle/>
+          <a:p>
+            <a:pPr algn="ctr"/>
+            <a:endParaRPr lang="en-US"/>
           </a:p>
         </p:txBody>
       </p:sp>

</xml_diff>

<commit_message>
make eh fig more space efficient
Signed-off-by: Jinghao Jia <jinghao7@illinois.edu>
</commit_message>
<xml_diff>
--- a/figs/exception_handling.pptx
+++ b/figs/exception_handling.pptx
@@ -2973,1556 +2973,1577 @@
           <a:chExt cx="0" cy="0"/>
         </a:xfrm>
       </p:grpSpPr>
-      <p:sp>
-        <p:nvSpPr>
-          <p:cNvPr id="7" name="Rectangle 6">
+      <p:grpSp>
+        <p:nvGrpSpPr>
+          <p:cNvPr id="2" name="Group 1">
             <a:extLst>
               <a:ext uri="{FF2B5EF4-FFF2-40B4-BE49-F238E27FC236}">
-                <a16:creationId xmlns:a16="http://schemas.microsoft.com/office/drawing/2014/main" id="{1F872621-EC48-3332-CBBC-2C03012BFD07}"/>
+                <a16:creationId xmlns:a16="http://schemas.microsoft.com/office/drawing/2014/main" id="{42BD48D7-161C-AF85-4C09-11A1F3A03762}"/>
               </a:ext>
             </a:extLst>
           </p:cNvPr>
-          <p:cNvSpPr/>
+          <p:cNvGrpSpPr/>
           <p:nvPr/>
-        </p:nvSpPr>
-        <p:spPr>
+        </p:nvGrpSpPr>
+        <p:grpSpPr>
           <a:xfrm>
-            <a:off x="5128640" y="454302"/>
-            <a:ext cx="2635602" cy="770347"/>
+            <a:off x="92154" y="12934"/>
+            <a:ext cx="8035158" cy="3897540"/>
+            <a:chOff x="92154" y="12934"/>
+            <a:chExt cx="8035158" cy="3897540"/>
           </a:xfrm>
-          <a:prstGeom prst="rect">
-            <a:avLst/>
-          </a:prstGeom>
-          <a:solidFill>
-            <a:schemeClr val="accent3">
-              <a:lumMod val="20000"/>
-              <a:lumOff val="80000"/>
-            </a:schemeClr>
-          </a:solidFill>
-          <a:ln>
+        </p:grpSpPr>
+        <p:sp>
+          <p:nvSpPr>
+            <p:cNvPr id="7" name="Rectangle 6">
+              <a:extLst>
+                <a:ext uri="{FF2B5EF4-FFF2-40B4-BE49-F238E27FC236}">
+                  <a16:creationId xmlns:a16="http://schemas.microsoft.com/office/drawing/2014/main" id="{1F872621-EC48-3332-CBBC-2C03012BFD07}"/>
+                </a:ext>
+              </a:extLst>
+            </p:cNvPr>
+            <p:cNvSpPr/>
+            <p:nvPr/>
+          </p:nvSpPr>
+          <p:spPr>
+            <a:xfrm>
+              <a:off x="5128640" y="454302"/>
+              <a:ext cx="2635602" cy="770347"/>
+            </a:xfrm>
+            <a:prstGeom prst="rect">
+              <a:avLst/>
+            </a:prstGeom>
+            <a:solidFill>
+              <a:schemeClr val="accent3">
+                <a:lumMod val="20000"/>
+                <a:lumOff val="80000"/>
+              </a:schemeClr>
+            </a:solidFill>
+            <a:ln>
+              <a:noFill/>
+            </a:ln>
+          </p:spPr>
+          <p:style>
+            <a:lnRef idx="2">
+              <a:schemeClr val="accent1">
+                <a:shade val="50000"/>
+              </a:schemeClr>
+            </a:lnRef>
+            <a:fillRef idx="1">
+              <a:schemeClr val="accent1"/>
+            </a:fillRef>
+            <a:effectRef idx="0">
+              <a:schemeClr val="accent1"/>
+            </a:effectRef>
+            <a:fontRef idx="minor">
+              <a:schemeClr val="lt1"/>
+            </a:fontRef>
+          </p:style>
+          <p:txBody>
+            <a:bodyPr rtlCol="0" anchor="ctr" anchorCtr="0"/>
+            <a:lstStyle/>
+            <a:p>
+              <a:endParaRPr lang="en-US" sz="1400" dirty="0">
+                <a:solidFill>
+                  <a:schemeClr val="tx1"/>
+                </a:solidFill>
+                <a:latin typeface="Consolas" panose="020B0609020204030204" pitchFamily="49" charset="0"/>
+                <a:cs typeface="Consolas" panose="020B0609020204030204" pitchFamily="49" charset="0"/>
+              </a:endParaRPr>
+            </a:p>
+          </p:txBody>
+        </p:sp>
+        <p:sp>
+          <p:nvSpPr>
+            <p:cNvPr id="17" name="Rectangle 16">
+              <a:extLst>
+                <a:ext uri="{FF2B5EF4-FFF2-40B4-BE49-F238E27FC236}">
+                  <a16:creationId xmlns:a16="http://schemas.microsoft.com/office/drawing/2014/main" id="{4A974896-1FB6-99BD-E3C1-66A923F1844A}"/>
+                </a:ext>
+              </a:extLst>
+            </p:cNvPr>
+            <p:cNvSpPr/>
+            <p:nvPr/>
+          </p:nvSpPr>
+          <p:spPr>
+            <a:xfrm>
+              <a:off x="5182429" y="3446538"/>
+              <a:ext cx="1290896" cy="265172"/>
+            </a:xfrm>
+            <a:prstGeom prst="rect">
+              <a:avLst/>
+            </a:prstGeom>
+            <a:solidFill>
+              <a:schemeClr val="accent2">
+                <a:lumMod val="20000"/>
+                <a:lumOff val="80000"/>
+                <a:alpha val="89000"/>
+              </a:schemeClr>
+            </a:solidFill>
+            <a:ln>
+              <a:noFill/>
+            </a:ln>
+          </p:spPr>
+          <p:style>
+            <a:lnRef idx="2">
+              <a:schemeClr val="accent1">
+                <a:shade val="50000"/>
+              </a:schemeClr>
+            </a:lnRef>
+            <a:fillRef idx="1">
+              <a:schemeClr val="accent1"/>
+            </a:fillRef>
+            <a:effectRef idx="0">
+              <a:schemeClr val="accent1"/>
+            </a:effectRef>
+            <a:fontRef idx="minor">
+              <a:schemeClr val="lt1"/>
+            </a:fontRef>
+          </p:style>
+          <p:txBody>
+            <a:bodyPr rtlCol="0" anchor="ctr" anchorCtr="0"/>
+            <a:lstStyle/>
+            <a:p>
+              <a:endParaRPr lang="en-US" sz="1400" b="1" dirty="0">
+                <a:solidFill>
+                  <a:schemeClr val="tx1"/>
+                </a:solidFill>
+                <a:latin typeface="Consolas" panose="020B0609020204030204" pitchFamily="49" charset="0"/>
+                <a:cs typeface="Consolas" panose="020B0609020204030204" pitchFamily="49" charset="0"/>
+              </a:endParaRPr>
+            </a:p>
+          </p:txBody>
+        </p:sp>
+        <p:sp>
+          <p:nvSpPr>
+            <p:cNvPr id="13" name="TextBox 12">
+              <a:extLst>
+                <a:ext uri="{FF2B5EF4-FFF2-40B4-BE49-F238E27FC236}">
+                  <a16:creationId xmlns:a16="http://schemas.microsoft.com/office/drawing/2014/main" id="{0B437A3A-0629-116F-D833-3529DF7AC570}"/>
+                </a:ext>
+              </a:extLst>
+            </p:cNvPr>
+            <p:cNvSpPr txBox="1"/>
+            <p:nvPr/>
+          </p:nvSpPr>
+          <p:spPr>
+            <a:xfrm>
+              <a:off x="5047207" y="12934"/>
+              <a:ext cx="2819420" cy="1281118"/>
+            </a:xfrm>
+            <a:prstGeom prst="rect">
+              <a:avLst/>
+            </a:prstGeom>
             <a:noFill/>
-          </a:ln>
-        </p:spPr>
-        <p:style>
-          <a:lnRef idx="2">
-            <a:schemeClr val="accent1">
-              <a:shade val="50000"/>
-            </a:schemeClr>
-          </a:lnRef>
-          <a:fillRef idx="1">
-            <a:schemeClr val="accent1"/>
-          </a:fillRef>
-          <a:effectRef idx="0">
-            <a:schemeClr val="accent1"/>
-          </a:effectRef>
-          <a:fontRef idx="minor">
-            <a:schemeClr val="lt1"/>
-          </a:fontRef>
-        </p:style>
-        <p:txBody>
-          <a:bodyPr rtlCol="0" anchor="ctr" anchorCtr="0"/>
-          <a:lstStyle/>
-          <a:p>
-            <a:endParaRPr lang="en-US" sz="1400" dirty="0">
+            <a:ln>
               <a:solidFill>
-                <a:schemeClr val="tx1"/>
+                <a:schemeClr val="accent1"/>
               </a:solidFill>
-              <a:latin typeface="Consolas" panose="020B0609020204030204" pitchFamily="49" charset="0"/>
-              <a:cs typeface="Consolas" panose="020B0609020204030204" pitchFamily="49" charset="0"/>
-            </a:endParaRPr>
-          </a:p>
-        </p:txBody>
-      </p:sp>
-      <p:sp>
-        <p:nvSpPr>
-          <p:cNvPr id="17" name="Rectangle 16">
-            <a:extLst>
-              <a:ext uri="{FF2B5EF4-FFF2-40B4-BE49-F238E27FC236}">
-                <a16:creationId xmlns:a16="http://schemas.microsoft.com/office/drawing/2014/main" id="{4A974896-1FB6-99BD-E3C1-66A923F1844A}"/>
-              </a:ext>
-            </a:extLst>
-          </p:cNvPr>
-          <p:cNvSpPr/>
-          <p:nvPr/>
-        </p:nvSpPr>
-        <p:spPr>
-          <a:xfrm>
-            <a:off x="5182429" y="3446538"/>
-            <a:ext cx="1290896" cy="265172"/>
-          </a:xfrm>
-          <a:prstGeom prst="rect">
-            <a:avLst/>
-          </a:prstGeom>
-          <a:solidFill>
-            <a:schemeClr val="accent2">
-              <a:lumMod val="20000"/>
-              <a:lumOff val="80000"/>
-              <a:alpha val="89000"/>
-            </a:schemeClr>
-          </a:solidFill>
-          <a:ln>
-            <a:noFill/>
-          </a:ln>
-        </p:spPr>
-        <p:style>
-          <a:lnRef idx="2">
-            <a:schemeClr val="accent1">
-              <a:shade val="50000"/>
-            </a:schemeClr>
-          </a:lnRef>
-          <a:fillRef idx="1">
-            <a:schemeClr val="accent1"/>
-          </a:fillRef>
-          <a:effectRef idx="0">
-            <a:schemeClr val="accent1"/>
-          </a:effectRef>
-          <a:fontRef idx="minor">
-            <a:schemeClr val="lt1"/>
-          </a:fontRef>
-        </p:style>
-        <p:txBody>
-          <a:bodyPr rtlCol="0" anchor="ctr" anchorCtr="0"/>
-          <a:lstStyle/>
-          <a:p>
-            <a:endParaRPr lang="en-US" sz="1400" b="1" dirty="0">
-              <a:solidFill>
-                <a:schemeClr val="tx1"/>
-              </a:solidFill>
-              <a:latin typeface="Consolas" panose="020B0609020204030204" pitchFamily="49" charset="0"/>
-              <a:cs typeface="Consolas" panose="020B0609020204030204" pitchFamily="49" charset="0"/>
-            </a:endParaRPr>
-          </a:p>
-        </p:txBody>
-      </p:sp>
-      <p:sp>
-        <p:nvSpPr>
-          <p:cNvPr id="13" name="TextBox 12">
-            <a:extLst>
-              <a:ext uri="{FF2B5EF4-FFF2-40B4-BE49-F238E27FC236}">
-                <a16:creationId xmlns:a16="http://schemas.microsoft.com/office/drawing/2014/main" id="{0B437A3A-0629-116F-D833-3529DF7AC570}"/>
-              </a:ext>
-            </a:extLst>
-          </p:cNvPr>
-          <p:cNvSpPr txBox="1"/>
-          <p:nvPr/>
-        </p:nvSpPr>
-        <p:spPr>
-          <a:xfrm>
-            <a:off x="5047207" y="12934"/>
-            <a:ext cx="2819420" cy="1281118"/>
-          </a:xfrm>
-          <a:prstGeom prst="rect">
-            <a:avLst/>
-          </a:prstGeom>
-          <a:noFill/>
-          <a:ln>
-            <a:solidFill>
-              <a:schemeClr val="accent1"/>
-            </a:solidFill>
-          </a:ln>
-        </p:spPr>
-        <p:txBody>
-          <a:bodyPr wrap="square" rtlCol="0">
-            <a:noAutofit/>
-          </a:bodyPr>
-          <a:lstStyle/>
-          <a:p>
-            <a:r>
-              <a:rPr lang="en-US" dirty="0">
-                <a:latin typeface="Times New Roman" panose="02020603050405020304" pitchFamily="18" charset="0"/>
-                <a:cs typeface="Times New Roman" panose="02020603050405020304" pitchFamily="18" charset="0"/>
-              </a:rPr>
-              <a:t>REX User Program</a:t>
-            </a:r>
-          </a:p>
-          <a:p>
-            <a:pPr defTabSz="914400">
-              <a:defRPr/>
-            </a:pPr>
-            <a:endParaRPr lang="en-US" sz="1400" b="1" dirty="0">
-              <a:solidFill>
-                <a:prstClr val="black"/>
-              </a:solidFill>
-              <a:latin typeface="Consolas" panose="020B0609020204030204" pitchFamily="49" charset="0"/>
-              <a:cs typeface="Consolas" panose="020B0609020204030204" pitchFamily="49" charset="0"/>
-            </a:endParaRPr>
-          </a:p>
-          <a:p>
-            <a:pPr defTabSz="914400">
-              <a:defRPr/>
-            </a:pPr>
-            <a:r>
-              <a:rPr lang="en-US" sz="1400" b="1" dirty="0">
+            </a:ln>
+          </p:spPr>
+          <p:txBody>
+            <a:bodyPr wrap="square" rtlCol="0">
+              <a:noAutofit/>
+            </a:bodyPr>
+            <a:lstStyle/>
+            <a:p>
+              <a:r>
+                <a:rPr lang="en-US" dirty="0">
+                  <a:latin typeface="Times New Roman" panose="02020603050405020304" pitchFamily="18" charset="0"/>
+                  <a:cs typeface="Times New Roman" panose="02020603050405020304" pitchFamily="18" charset="0"/>
+                </a:rPr>
+                <a:t>REX User Program</a:t>
+              </a:r>
+            </a:p>
+            <a:p>
+              <a:pPr defTabSz="914400">
+                <a:defRPr/>
+              </a:pPr>
+              <a:endParaRPr lang="en-US" sz="1400" b="1" dirty="0">
                 <a:solidFill>
                   <a:prstClr val="black"/>
                 </a:solidFill>
                 <a:latin typeface="Consolas" panose="020B0609020204030204" pitchFamily="49" charset="0"/>
                 <a:cs typeface="Consolas" panose="020B0609020204030204" pitchFamily="49" charset="0"/>
-              </a:rPr>
-              <a:t>rex_prog1:</a:t>
-            </a:r>
-          </a:p>
-          <a:p>
-            <a:pPr defTabSz="914400">
-              <a:defRPr/>
-            </a:pPr>
-            <a:r>
-              <a:rPr lang="en-US" sz="1400" dirty="0">
+              </a:endParaRPr>
+            </a:p>
+            <a:p>
+              <a:pPr defTabSz="914400">
+                <a:defRPr/>
+              </a:pPr>
+              <a:r>
+                <a:rPr lang="en-US" sz="1400" b="1" dirty="0">
+                  <a:solidFill>
+                    <a:prstClr val="black"/>
+                  </a:solidFill>
+                  <a:latin typeface="Consolas" panose="020B0609020204030204" pitchFamily="49" charset="0"/>
+                  <a:cs typeface="Consolas" panose="020B0609020204030204" pitchFamily="49" charset="0"/>
+                </a:rPr>
+                <a:t>rex_prog1:</a:t>
+              </a:r>
+            </a:p>
+            <a:p>
+              <a:pPr defTabSz="914400">
+                <a:defRPr/>
+              </a:pPr>
+              <a:r>
+                <a:rPr lang="en-US" sz="1400" dirty="0">
+                  <a:solidFill>
+                    <a:prstClr val="black"/>
+                  </a:solidFill>
+                  <a:latin typeface="Consolas" panose="020B0609020204030204" pitchFamily="49" charset="0"/>
+                  <a:cs typeface="Consolas" panose="020B0609020204030204" pitchFamily="49" charset="0"/>
+                </a:rPr>
+                <a:t>...</a:t>
+              </a:r>
+            </a:p>
+            <a:p>
+              <a:pPr defTabSz="914400">
+                <a:defRPr/>
+              </a:pPr>
+              <a:r>
+                <a:rPr lang="en-US" sz="1400" dirty="0">
+                  <a:solidFill>
+                    <a:prstClr val="black"/>
+                  </a:solidFill>
+                  <a:latin typeface="Consolas" panose="020B0609020204030204" pitchFamily="49" charset="0"/>
+                  <a:cs typeface="Consolas" panose="020B0609020204030204" pitchFamily="49" charset="0"/>
+                </a:rPr>
+                <a:t>ret</a:t>
+              </a:r>
+            </a:p>
+          </p:txBody>
+        </p:sp>
+        <p:sp>
+          <p:nvSpPr>
+            <p:cNvPr id="35" name="Rectangle 34">
+              <a:extLst>
+                <a:ext uri="{FF2B5EF4-FFF2-40B4-BE49-F238E27FC236}">
+                  <a16:creationId xmlns:a16="http://schemas.microsoft.com/office/drawing/2014/main" id="{3649AC7D-4CBA-CEDA-1E35-C47DC495BC39}"/>
+                </a:ext>
+              </a:extLst>
+            </p:cNvPr>
+            <p:cNvSpPr/>
+            <p:nvPr/>
+          </p:nvSpPr>
+          <p:spPr>
+            <a:xfrm>
+              <a:off x="163305" y="2458192"/>
+              <a:ext cx="944643" cy="233996"/>
+            </a:xfrm>
+            <a:prstGeom prst="rect">
+              <a:avLst/>
+            </a:prstGeom>
+            <a:solidFill>
+              <a:schemeClr val="accent2">
+                <a:lumMod val="20000"/>
+                <a:lumOff val="80000"/>
+                <a:alpha val="85200"/>
+              </a:schemeClr>
+            </a:solidFill>
+            <a:ln>
+              <a:noFill/>
+            </a:ln>
+          </p:spPr>
+          <p:style>
+            <a:lnRef idx="2">
+              <a:schemeClr val="accent1">
+                <a:shade val="50000"/>
+              </a:schemeClr>
+            </a:lnRef>
+            <a:fillRef idx="1">
+              <a:schemeClr val="accent1"/>
+            </a:fillRef>
+            <a:effectRef idx="0">
+              <a:schemeClr val="accent1"/>
+            </a:effectRef>
+            <a:fontRef idx="minor">
+              <a:schemeClr val="lt1"/>
+            </a:fontRef>
+          </p:style>
+          <p:txBody>
+            <a:bodyPr rtlCol="0" anchor="ctr" anchorCtr="0"/>
+            <a:lstStyle/>
+            <a:p>
+              <a:endParaRPr lang="en-US" sz="1400" dirty="0">
+                <a:solidFill>
+                  <a:schemeClr val="tx1"/>
+                </a:solidFill>
+                <a:latin typeface="Consolas" panose="020B0609020204030204" pitchFamily="49" charset="0"/>
+                <a:cs typeface="Consolas" panose="020B0609020204030204" pitchFamily="49" charset="0"/>
+              </a:endParaRPr>
+            </a:p>
+          </p:txBody>
+        </p:sp>
+        <p:sp>
+          <p:nvSpPr>
+            <p:cNvPr id="24" name="Rectangle 23">
+              <a:extLst>
+                <a:ext uri="{FF2B5EF4-FFF2-40B4-BE49-F238E27FC236}">
+                  <a16:creationId xmlns:a16="http://schemas.microsoft.com/office/drawing/2014/main" id="{BCE7C08D-EC2E-9315-CDCC-A9F3E1412C56}"/>
+                </a:ext>
+              </a:extLst>
+            </p:cNvPr>
+            <p:cNvSpPr/>
+            <p:nvPr/>
+          </p:nvSpPr>
+          <p:spPr>
+            <a:xfrm>
+              <a:off x="161813" y="2714224"/>
+              <a:ext cx="4014215" cy="1102123"/>
+            </a:xfrm>
+            <a:prstGeom prst="rect">
+              <a:avLst/>
+            </a:prstGeom>
+            <a:solidFill>
+              <a:schemeClr val="accent6">
+                <a:lumMod val="20000"/>
+                <a:lumOff val="80000"/>
+                <a:alpha val="50000"/>
+              </a:schemeClr>
+            </a:solidFill>
+            <a:ln>
+              <a:noFill/>
+            </a:ln>
+          </p:spPr>
+          <p:style>
+            <a:lnRef idx="2">
+              <a:schemeClr val="accent1">
+                <a:shade val="50000"/>
+              </a:schemeClr>
+            </a:lnRef>
+            <a:fillRef idx="1">
+              <a:schemeClr val="accent1"/>
+            </a:fillRef>
+            <a:effectRef idx="0">
+              <a:schemeClr val="accent1"/>
+            </a:effectRef>
+            <a:fontRef idx="minor">
+              <a:schemeClr val="lt1"/>
+            </a:fontRef>
+          </p:style>
+          <p:txBody>
+            <a:bodyPr rtlCol="0" anchor="ctr"/>
+            <a:lstStyle/>
+            <a:p>
+              <a:pPr algn="ctr"/>
+              <a:endParaRPr lang="en-US" sz="600" dirty="0"/>
+            </a:p>
+          </p:txBody>
+        </p:sp>
+        <p:sp>
+          <p:nvSpPr>
+            <p:cNvPr id="8" name="Rectangle 7">
+              <a:extLst>
+                <a:ext uri="{FF2B5EF4-FFF2-40B4-BE49-F238E27FC236}">
+                  <a16:creationId xmlns:a16="http://schemas.microsoft.com/office/drawing/2014/main" id="{CF488771-0B9B-DFD8-B008-7EA5FC0673BC}"/>
+                </a:ext>
+              </a:extLst>
+            </p:cNvPr>
+            <p:cNvSpPr/>
+            <p:nvPr/>
+          </p:nvSpPr>
+          <p:spPr>
+            <a:xfrm>
+              <a:off x="152669" y="1854690"/>
+              <a:ext cx="2560113" cy="378219"/>
+            </a:xfrm>
+            <a:prstGeom prst="rect">
+              <a:avLst/>
+            </a:prstGeom>
+            <a:solidFill>
+              <a:schemeClr val="accent2">
+                <a:lumMod val="20000"/>
+                <a:lumOff val="80000"/>
+                <a:alpha val="85200"/>
+              </a:schemeClr>
+            </a:solidFill>
+            <a:ln>
+              <a:noFill/>
+            </a:ln>
+          </p:spPr>
+          <p:style>
+            <a:lnRef idx="2">
+              <a:schemeClr val="accent1">
+                <a:shade val="50000"/>
+              </a:schemeClr>
+            </a:lnRef>
+            <a:fillRef idx="1">
+              <a:schemeClr val="accent1"/>
+            </a:fillRef>
+            <a:effectRef idx="0">
+              <a:schemeClr val="accent1"/>
+            </a:effectRef>
+            <a:fontRef idx="minor">
+              <a:schemeClr val="lt1"/>
+            </a:fontRef>
+          </p:style>
+          <p:txBody>
+            <a:bodyPr rtlCol="0" anchor="ctr" anchorCtr="0"/>
+            <a:lstStyle/>
+            <a:p>
+              <a:endParaRPr lang="en-US" sz="1400" dirty="0">
+                <a:solidFill>
+                  <a:schemeClr val="tx1"/>
+                </a:solidFill>
+                <a:latin typeface="Consolas" panose="020B0609020204030204" pitchFamily="49" charset="0"/>
+                <a:cs typeface="Consolas" panose="020B0609020204030204" pitchFamily="49" charset="0"/>
+              </a:endParaRPr>
+            </a:p>
+          </p:txBody>
+        </p:sp>
+        <p:sp>
+          <p:nvSpPr>
+            <p:cNvPr id="5" name="Rectangle 4">
+              <a:extLst>
+                <a:ext uri="{FF2B5EF4-FFF2-40B4-BE49-F238E27FC236}">
+                  <a16:creationId xmlns:a16="http://schemas.microsoft.com/office/drawing/2014/main" id="{450B10D6-AD2E-7932-C9ED-F99E35ABC865}"/>
+                </a:ext>
+              </a:extLst>
+            </p:cNvPr>
+            <p:cNvSpPr/>
+            <p:nvPr/>
+          </p:nvSpPr>
+          <p:spPr>
+            <a:xfrm>
+              <a:off x="163307" y="380328"/>
+              <a:ext cx="4010567" cy="1430342"/>
+            </a:xfrm>
+            <a:prstGeom prst="rect">
+              <a:avLst/>
+            </a:prstGeom>
+            <a:solidFill>
+              <a:schemeClr val="accent4">
+                <a:lumMod val="20000"/>
+                <a:lumOff val="80000"/>
+                <a:alpha val="50000"/>
+              </a:schemeClr>
+            </a:solidFill>
+            <a:ln>
+              <a:noFill/>
+            </a:ln>
+          </p:spPr>
+          <p:style>
+            <a:lnRef idx="2">
+              <a:schemeClr val="accent1">
+                <a:shade val="50000"/>
+              </a:schemeClr>
+            </a:lnRef>
+            <a:fillRef idx="1">
+              <a:schemeClr val="accent1"/>
+            </a:fillRef>
+            <a:effectRef idx="0">
+              <a:schemeClr val="accent1"/>
+            </a:effectRef>
+            <a:fontRef idx="minor">
+              <a:schemeClr val="lt1"/>
+            </a:fontRef>
+          </p:style>
+          <p:txBody>
+            <a:bodyPr rtlCol="0" anchor="ctr" anchorCtr="0"/>
+            <a:lstStyle/>
+            <a:p>
+              <a:endParaRPr lang="en-US" sz="1400" dirty="0">
+                <a:solidFill>
+                  <a:schemeClr val="tx1"/>
+                </a:solidFill>
+                <a:latin typeface="Consolas" panose="020B0609020204030204" pitchFamily="49" charset="0"/>
+                <a:cs typeface="Consolas" panose="020B0609020204030204" pitchFamily="49" charset="0"/>
+              </a:endParaRPr>
+            </a:p>
+          </p:txBody>
+        </p:sp>
+        <p:sp>
+          <p:nvSpPr>
+            <p:cNvPr id="16" name="Rectangle 15">
+              <a:extLst>
+                <a:ext uri="{FF2B5EF4-FFF2-40B4-BE49-F238E27FC236}">
+                  <a16:creationId xmlns:a16="http://schemas.microsoft.com/office/drawing/2014/main" id="{218A518E-A5FE-9D86-1DA1-E23BCDE4656F}"/>
+                </a:ext>
+              </a:extLst>
+            </p:cNvPr>
+            <p:cNvSpPr/>
+            <p:nvPr/>
+          </p:nvSpPr>
+          <p:spPr>
+            <a:xfrm>
+              <a:off x="5182428" y="2337046"/>
+              <a:ext cx="2850754" cy="1479301"/>
+            </a:xfrm>
+            <a:prstGeom prst="rect">
+              <a:avLst/>
+            </a:prstGeom>
+            <a:solidFill>
+              <a:schemeClr val="bg2">
+                <a:lumMod val="90000"/>
+                <a:alpha val="18897"/>
+              </a:schemeClr>
+            </a:solidFill>
+            <a:ln>
+              <a:noFill/>
+            </a:ln>
+          </p:spPr>
+          <p:style>
+            <a:lnRef idx="2">
+              <a:schemeClr val="accent1">
+                <a:shade val="50000"/>
+              </a:schemeClr>
+            </a:lnRef>
+            <a:fillRef idx="1">
+              <a:schemeClr val="accent1"/>
+            </a:fillRef>
+            <a:effectRef idx="0">
+              <a:schemeClr val="accent1"/>
+            </a:effectRef>
+            <a:fontRef idx="minor">
+              <a:schemeClr val="lt1"/>
+            </a:fontRef>
+          </p:style>
+          <p:txBody>
+            <a:bodyPr rtlCol="0" anchor="ctr" anchorCtr="0"/>
+            <a:lstStyle/>
+            <a:p>
+              <a:endParaRPr lang="en-US" sz="1400" dirty="0">
+                <a:solidFill>
+                  <a:schemeClr val="accent5">
+                    <a:lumMod val="20000"/>
+                    <a:lumOff val="80000"/>
+                  </a:schemeClr>
+                </a:solidFill>
+              </a:endParaRPr>
+            </a:p>
+          </p:txBody>
+        </p:sp>
+        <p:sp>
+          <p:nvSpPr>
+            <p:cNvPr id="4" name="TextBox 3">
+              <a:extLst>
+                <a:ext uri="{FF2B5EF4-FFF2-40B4-BE49-F238E27FC236}">
+                  <a16:creationId xmlns:a16="http://schemas.microsoft.com/office/drawing/2014/main" id="{DC5D00EE-0AFF-B160-215E-307CB2FC6491}"/>
+                </a:ext>
+              </a:extLst>
+            </p:cNvPr>
+            <p:cNvSpPr txBox="1"/>
+            <p:nvPr/>
+          </p:nvSpPr>
+          <p:spPr>
+            <a:xfrm>
+              <a:off x="92154" y="12936"/>
+              <a:ext cx="4162402" cy="3803412"/>
+            </a:xfrm>
+            <a:prstGeom prst="rect">
+              <a:avLst/>
+            </a:prstGeom>
+            <a:noFill/>
+            <a:ln>
+              <a:solidFill>
+                <a:schemeClr val="accent1"/>
+              </a:solidFill>
+            </a:ln>
+          </p:spPr>
+          <p:txBody>
+            <a:bodyPr wrap="square" rtlCol="0">
+              <a:noAutofit/>
+            </a:bodyPr>
+            <a:lstStyle/>
+            <a:p>
+              <a:r>
+                <a:rPr lang="en-US" dirty="0">
+                  <a:latin typeface="Times New Roman" panose="02020603050405020304" pitchFamily="18" charset="0"/>
+                  <a:cs typeface="Times New Roman" panose="02020603050405020304" pitchFamily="18" charset="0"/>
+                </a:rPr>
+                <a:t>REX Dispatcher Function </a:t>
+              </a:r>
+            </a:p>
+            <a:p>
+              <a:pPr defTabSz="914400">
+                <a:defRPr/>
+              </a:pPr>
+              <a:r>
+                <a:rPr lang="en-US" sz="1400" b="1" dirty="0" err="1">
+                  <a:solidFill>
+                    <a:prstClr val="black"/>
+                  </a:solidFill>
+                  <a:latin typeface="Consolas" panose="020B0609020204030204" pitchFamily="49" charset="0"/>
+                  <a:cs typeface="Consolas" panose="020B0609020204030204" pitchFamily="49" charset="0"/>
+                </a:rPr>
+                <a:t>rex_dispatcher_func</a:t>
+              </a:r>
+              <a:r>
+                <a:rPr lang="en-US" sz="1400" b="1" dirty="0">
+                  <a:solidFill>
+                    <a:prstClr val="black"/>
+                  </a:solidFill>
+                  <a:latin typeface="Consolas" panose="020B0609020204030204" pitchFamily="49" charset="0"/>
+                  <a:cs typeface="Consolas" panose="020B0609020204030204" pitchFamily="49" charset="0"/>
+                </a:rPr>
+                <a:t>:</a:t>
+              </a:r>
+            </a:p>
+            <a:p>
+              <a:pPr defTabSz="457200">
+                <a:defRPr/>
+              </a:pPr>
+              <a:r>
+                <a:rPr lang="en-US" sz="1398" dirty="0">
+                  <a:solidFill>
+                    <a:schemeClr val="accent6">
+                      <a:lumMod val="75000"/>
+                    </a:schemeClr>
+                  </a:solidFill>
+                  <a:latin typeface="Consolas" panose="020B0609020204030204" pitchFamily="49" charset="0"/>
+                  <a:cs typeface="Consolas" panose="020B0609020204030204" pitchFamily="49" charset="0"/>
+                </a:rPr>
+                <a:t>// save the callee-saved registers</a:t>
+              </a:r>
+            </a:p>
+            <a:p>
+              <a:pPr defTabSz="914400">
+                <a:defRPr/>
+              </a:pPr>
+              <a:r>
+                <a:rPr lang="en-US" sz="1400" dirty="0" err="1">
+                  <a:solidFill>
+                    <a:prstClr val="black"/>
+                  </a:solidFill>
+                  <a:latin typeface="Consolas" panose="020B0609020204030204" pitchFamily="49" charset="0"/>
+                  <a:cs typeface="Consolas" panose="020B0609020204030204" pitchFamily="49" charset="0"/>
+                </a:rPr>
+                <a:t>pushq</a:t>
+              </a:r>
+              <a:r>
+                <a:rPr lang="en-US" sz="1400" dirty="0">
+                  <a:solidFill>
+                    <a:prstClr val="black"/>
+                  </a:solidFill>
+                  <a:latin typeface="Consolas" panose="020B0609020204030204" pitchFamily="49" charset="0"/>
+                  <a:cs typeface="Consolas" panose="020B0609020204030204" pitchFamily="49" charset="0"/>
+                </a:rPr>
+                <a:t> ...</a:t>
+              </a:r>
+            </a:p>
+            <a:p>
+              <a:pPr defTabSz="457200">
+                <a:defRPr/>
+              </a:pPr>
+              <a:r>
+                <a:rPr lang="en-US" sz="1398" dirty="0">
+                  <a:solidFill>
+                    <a:schemeClr val="accent6">
+                      <a:lumMod val="75000"/>
+                    </a:schemeClr>
+                  </a:solidFill>
+                  <a:latin typeface="Consolas" panose="020B0609020204030204" pitchFamily="49" charset="0"/>
+                  <a:cs typeface="Consolas" panose="020B0609020204030204" pitchFamily="49" charset="0"/>
+                </a:rPr>
+                <a:t>//</a:t>
+              </a:r>
+              <a:r>
+                <a:rPr lang="zh-CN" altLang="en-US" sz="1398" dirty="0">
+                  <a:solidFill>
+                    <a:schemeClr val="accent6">
+                      <a:lumMod val="75000"/>
+                    </a:schemeClr>
+                  </a:solidFill>
+                  <a:latin typeface="Consolas" panose="020B0609020204030204" pitchFamily="49" charset="0"/>
+                  <a:cs typeface="Consolas" panose="020B0609020204030204" pitchFamily="49" charset="0"/>
+                </a:rPr>
+                <a:t> </a:t>
+              </a:r>
+              <a:r>
+                <a:rPr lang="en-US" sz="1398" dirty="0">
+                  <a:solidFill>
+                    <a:schemeClr val="accent6">
+                      <a:lumMod val="75000"/>
+                    </a:schemeClr>
+                  </a:solidFill>
+                  <a:latin typeface="Consolas" panose="020B0609020204030204" pitchFamily="49" charset="0"/>
+                  <a:cs typeface="Consolas" panose="020B0609020204030204" pitchFamily="49" charset="0"/>
+                </a:rPr>
+                <a:t>save stack and frame pointer</a:t>
+              </a:r>
+            </a:p>
+            <a:p>
+              <a:pPr defTabSz="914400">
+                <a:defRPr/>
+              </a:pPr>
+              <a:r>
+                <a:rPr lang="en-US" sz="1400" dirty="0" err="1">
+                  <a:solidFill>
+                    <a:prstClr val="black"/>
+                  </a:solidFill>
+                  <a:latin typeface="Consolas" panose="020B0609020204030204" pitchFamily="49" charset="0"/>
+                  <a:cs typeface="Consolas" panose="020B0609020204030204" pitchFamily="49" charset="0"/>
+                </a:rPr>
+                <a:t>movq</a:t>
+              </a:r>
+              <a:r>
+                <a:rPr lang="en-US" sz="1400" dirty="0">
+                  <a:solidFill>
+                    <a:prstClr val="black"/>
+                  </a:solidFill>
+                  <a:latin typeface="Consolas" panose="020B0609020204030204" pitchFamily="49" charset="0"/>
+                  <a:cs typeface="Consolas" panose="020B0609020204030204" pitchFamily="49" charset="0"/>
+                </a:rPr>
+                <a:t> %</a:t>
+              </a:r>
+              <a:r>
+                <a:rPr lang="en-US" sz="1400" dirty="0" err="1">
+                  <a:solidFill>
+                    <a:prstClr val="black"/>
+                  </a:solidFill>
+                  <a:latin typeface="Consolas" panose="020B0609020204030204" pitchFamily="49" charset="0"/>
+                  <a:cs typeface="Consolas" panose="020B0609020204030204" pitchFamily="49" charset="0"/>
+                </a:rPr>
+                <a:t>rsp</a:t>
+              </a:r>
+              <a:r>
+                <a:rPr lang="en-US" sz="1400" dirty="0">
+                  <a:solidFill>
+                    <a:prstClr val="black"/>
+                  </a:solidFill>
+                  <a:latin typeface="Consolas" panose="020B0609020204030204" pitchFamily="49" charset="0"/>
+                  <a:cs typeface="Consolas" panose="020B0609020204030204" pitchFamily="49" charset="0"/>
+                </a:rPr>
+                <a:t>, PER_CPU_VAR(</a:t>
+              </a:r>
+              <a:r>
+                <a:rPr lang="en-US" sz="1400" dirty="0" err="1">
+                  <a:solidFill>
+                    <a:prstClr val="black"/>
+                  </a:solidFill>
+                  <a:latin typeface="Consolas" panose="020B0609020204030204" pitchFamily="49" charset="0"/>
+                  <a:cs typeface="Consolas" panose="020B0609020204030204" pitchFamily="49" charset="0"/>
+                </a:rPr>
+                <a:t>rex_old_sp</a:t>
+              </a:r>
+              <a:r>
+                <a:rPr lang="en-US" sz="1400" dirty="0">
+                  <a:solidFill>
+                    <a:prstClr val="black"/>
+                  </a:solidFill>
+                  <a:latin typeface="Consolas" panose="020B0609020204030204" pitchFamily="49" charset="0"/>
+                  <a:cs typeface="Consolas" panose="020B0609020204030204" pitchFamily="49" charset="0"/>
+                </a:rPr>
+                <a:t>) ...</a:t>
+              </a:r>
+            </a:p>
+            <a:p>
+              <a:pPr defTabSz="457200">
+                <a:defRPr/>
+              </a:pPr>
+              <a:r>
+                <a:rPr lang="en-US" sz="1398" dirty="0">
+                  <a:solidFill>
+                    <a:schemeClr val="accent6">
+                      <a:lumMod val="75000"/>
+                    </a:schemeClr>
+                  </a:solidFill>
+                  <a:latin typeface="Consolas" panose="020B0609020204030204" pitchFamily="49" charset="0"/>
+                  <a:cs typeface="Consolas" panose="020B0609020204030204" pitchFamily="49" charset="0"/>
+                </a:rPr>
+                <a:t>// switch stack </a:t>
+              </a:r>
+            </a:p>
+            <a:p>
+              <a:pPr defTabSz="914400">
+                <a:defRPr/>
+              </a:pPr>
+              <a:r>
+                <a:rPr lang="en-US" sz="1400" dirty="0" err="1">
+                  <a:solidFill>
+                    <a:prstClr val="black"/>
+                  </a:solidFill>
+                  <a:latin typeface="Consolas" panose="020B0609020204030204" pitchFamily="49" charset="0"/>
+                  <a:cs typeface="Consolas" panose="020B0609020204030204" pitchFamily="49" charset="0"/>
+                </a:rPr>
+                <a:t>movq</a:t>
+              </a:r>
+              <a:r>
+                <a:rPr lang="en-US" sz="1400" dirty="0">
+                  <a:solidFill>
+                    <a:prstClr val="black"/>
+                  </a:solidFill>
+                  <a:latin typeface="Consolas" panose="020B0609020204030204" pitchFamily="49" charset="0"/>
+                  <a:cs typeface="Consolas" panose="020B0609020204030204" pitchFamily="49" charset="0"/>
+                </a:rPr>
+                <a:t> PER_CPU_VAR(</a:t>
+              </a:r>
+              <a:r>
+                <a:rPr lang="en-US" sz="1400" dirty="0" err="1">
+                  <a:solidFill>
+                    <a:prstClr val="black"/>
+                  </a:solidFill>
+                  <a:latin typeface="Consolas" panose="020B0609020204030204" pitchFamily="49" charset="0"/>
+                  <a:cs typeface="Consolas" panose="020B0609020204030204" pitchFamily="49" charset="0"/>
+                </a:rPr>
+                <a:t>rex_stack</a:t>
+              </a:r>
+              <a:r>
+                <a:rPr lang="en-US" sz="1400" dirty="0">
+                  <a:solidFill>
+                    <a:prstClr val="black"/>
+                  </a:solidFill>
+                  <a:latin typeface="Consolas" panose="020B0609020204030204" pitchFamily="49" charset="0"/>
+                  <a:cs typeface="Consolas" panose="020B0609020204030204" pitchFamily="49" charset="0"/>
+                </a:rPr>
+                <a:t>), %</a:t>
+              </a:r>
+              <a:r>
+                <a:rPr lang="en-US" sz="1400" dirty="0" err="1">
+                  <a:solidFill>
+                    <a:prstClr val="black"/>
+                  </a:solidFill>
+                  <a:latin typeface="Consolas" panose="020B0609020204030204" pitchFamily="49" charset="0"/>
+                  <a:cs typeface="Consolas" panose="020B0609020204030204" pitchFamily="49" charset="0"/>
+                </a:rPr>
+                <a:t>rsp</a:t>
+              </a:r>
+              <a:r>
+                <a:rPr lang="en-US" sz="1400" dirty="0">
+                  <a:solidFill>
+                    <a:prstClr val="black"/>
+                  </a:solidFill>
+                  <a:latin typeface="Consolas" panose="020B0609020204030204" pitchFamily="49" charset="0"/>
+                  <a:cs typeface="Consolas" panose="020B0609020204030204" pitchFamily="49" charset="0"/>
+                </a:rPr>
+                <a:t> ...</a:t>
+              </a:r>
+            </a:p>
+            <a:p>
+              <a:pPr defTabSz="457200">
+                <a:defRPr/>
+              </a:pPr>
+              <a:r>
+                <a:rPr lang="en-US" sz="1398" dirty="0">
+                  <a:solidFill>
+                    <a:schemeClr val="accent6">
+                      <a:lumMod val="75000"/>
+                    </a:schemeClr>
+                  </a:solidFill>
+                  <a:latin typeface="Consolas" panose="020B0609020204030204" pitchFamily="49" charset="0"/>
+                  <a:cs typeface="Consolas" panose="020B0609020204030204" pitchFamily="49" charset="0"/>
+                </a:rPr>
+                <a:t>// invoke REX user program</a:t>
+              </a:r>
+            </a:p>
+            <a:p>
+              <a:pPr defTabSz="914400">
+                <a:defRPr/>
+              </a:pPr>
+              <a:r>
+                <a:rPr lang="en-US" sz="1400" b="1" dirty="0">
+                  <a:solidFill>
+                    <a:prstClr val="black"/>
+                  </a:solidFill>
+                  <a:latin typeface="Consolas" panose="020B0609020204030204" pitchFamily="49" charset="0"/>
+                  <a:cs typeface="Consolas" panose="020B0609020204030204" pitchFamily="49" charset="0"/>
+                </a:rPr>
+                <a:t>call *%</a:t>
+              </a:r>
+              <a:r>
+                <a:rPr lang="en-US" sz="1400" b="1" dirty="0" err="1">
+                  <a:solidFill>
+                    <a:prstClr val="black"/>
+                  </a:solidFill>
+                  <a:latin typeface="Consolas" panose="020B0609020204030204" pitchFamily="49" charset="0"/>
+                  <a:cs typeface="Consolas" panose="020B0609020204030204" pitchFamily="49" charset="0"/>
+                </a:rPr>
+                <a:t>rdx</a:t>
+              </a:r>
+              <a:endParaRPr lang="en-US" sz="1400" dirty="0">
                 <a:solidFill>
                   <a:prstClr val="black"/>
                 </a:solidFill>
                 <a:latin typeface="Consolas" panose="020B0609020204030204" pitchFamily="49" charset="0"/>
                 <a:cs typeface="Consolas" panose="020B0609020204030204" pitchFamily="49" charset="0"/>
-              </a:rPr>
-              <a:t>...</a:t>
-            </a:r>
-          </a:p>
-          <a:p>
-            <a:pPr defTabSz="914400">
-              <a:defRPr/>
-            </a:pPr>
-            <a:r>
-              <a:rPr lang="en-US" sz="1400" dirty="0">
+              </a:endParaRPr>
+            </a:p>
+            <a:p>
+              <a:pPr defTabSz="914400">
+                <a:defRPr/>
+              </a:pPr>
+              <a:endParaRPr lang="en-US" sz="1400" dirty="0">
                 <a:solidFill>
                   <a:prstClr val="black"/>
                 </a:solidFill>
                 <a:latin typeface="Consolas" panose="020B0609020204030204" pitchFamily="49" charset="0"/>
                 <a:cs typeface="Consolas" panose="020B0609020204030204" pitchFamily="49" charset="0"/>
-              </a:rPr>
-              <a:t>ret</a:t>
-            </a:r>
-          </a:p>
-        </p:txBody>
-      </p:sp>
-      <p:sp>
-        <p:nvSpPr>
-          <p:cNvPr id="35" name="Rectangle 34">
-            <a:extLst>
-              <a:ext uri="{FF2B5EF4-FFF2-40B4-BE49-F238E27FC236}">
-                <a16:creationId xmlns:a16="http://schemas.microsoft.com/office/drawing/2014/main" id="{3649AC7D-4CBA-CEDA-1E35-C47DC495BC39}"/>
-              </a:ext>
-            </a:extLst>
-          </p:cNvPr>
-          <p:cNvSpPr/>
-          <p:nvPr/>
-        </p:nvSpPr>
-        <p:spPr>
-          <a:xfrm>
-            <a:off x="163305" y="2458192"/>
-            <a:ext cx="944643" cy="233996"/>
-          </a:xfrm>
-          <a:prstGeom prst="rect">
-            <a:avLst/>
-          </a:prstGeom>
-          <a:solidFill>
-            <a:schemeClr val="accent2">
-              <a:lumMod val="20000"/>
-              <a:lumOff val="80000"/>
-              <a:alpha val="85200"/>
-            </a:schemeClr>
-          </a:solidFill>
-          <a:ln>
-            <a:noFill/>
-          </a:ln>
-        </p:spPr>
-        <p:style>
-          <a:lnRef idx="2">
-            <a:schemeClr val="accent1">
-              <a:shade val="50000"/>
-            </a:schemeClr>
-          </a:lnRef>
-          <a:fillRef idx="1">
-            <a:schemeClr val="accent1"/>
-          </a:fillRef>
-          <a:effectRef idx="0">
-            <a:schemeClr val="accent1"/>
-          </a:effectRef>
-          <a:fontRef idx="minor">
-            <a:schemeClr val="lt1"/>
-          </a:fontRef>
-        </p:style>
-        <p:txBody>
-          <a:bodyPr rtlCol="0" anchor="ctr" anchorCtr="0"/>
-          <a:lstStyle/>
-          <a:p>
-            <a:endParaRPr lang="en-US" sz="1400" dirty="0">
-              <a:solidFill>
-                <a:schemeClr val="tx1"/>
-              </a:solidFill>
-              <a:latin typeface="Consolas" panose="020B0609020204030204" pitchFamily="49" charset="0"/>
-              <a:cs typeface="Consolas" panose="020B0609020204030204" pitchFamily="49" charset="0"/>
-            </a:endParaRPr>
-          </a:p>
-        </p:txBody>
-      </p:sp>
-      <p:sp>
-        <p:nvSpPr>
-          <p:cNvPr id="24" name="Rectangle 23">
-            <a:extLst>
-              <a:ext uri="{FF2B5EF4-FFF2-40B4-BE49-F238E27FC236}">
-                <a16:creationId xmlns:a16="http://schemas.microsoft.com/office/drawing/2014/main" id="{BCE7C08D-EC2E-9315-CDCC-A9F3E1412C56}"/>
-              </a:ext>
-            </a:extLst>
-          </p:cNvPr>
-          <p:cNvSpPr/>
-          <p:nvPr/>
-        </p:nvSpPr>
-        <p:spPr>
-          <a:xfrm>
-            <a:off x="161813" y="2714224"/>
-            <a:ext cx="4014215" cy="1102123"/>
-          </a:xfrm>
-          <a:prstGeom prst="rect">
-            <a:avLst/>
-          </a:prstGeom>
-          <a:solidFill>
-            <a:schemeClr val="accent6">
-              <a:lumMod val="20000"/>
-              <a:lumOff val="80000"/>
-              <a:alpha val="50000"/>
-            </a:schemeClr>
-          </a:solidFill>
-          <a:ln>
-            <a:noFill/>
-          </a:ln>
-        </p:spPr>
-        <p:style>
-          <a:lnRef idx="2">
-            <a:schemeClr val="accent1">
-              <a:shade val="50000"/>
-            </a:schemeClr>
-          </a:lnRef>
-          <a:fillRef idx="1">
-            <a:schemeClr val="accent1"/>
-          </a:fillRef>
-          <a:effectRef idx="0">
-            <a:schemeClr val="accent1"/>
-          </a:effectRef>
-          <a:fontRef idx="minor">
-            <a:schemeClr val="lt1"/>
-          </a:fontRef>
-        </p:style>
-        <p:txBody>
-          <a:bodyPr rtlCol="0" anchor="ctr"/>
-          <a:lstStyle/>
-          <a:p>
-            <a:pPr algn="ctr"/>
-            <a:endParaRPr lang="en-US" sz="600" dirty="0"/>
-          </a:p>
-        </p:txBody>
-      </p:sp>
-      <p:sp>
-        <p:nvSpPr>
-          <p:cNvPr id="8" name="Rectangle 7">
-            <a:extLst>
-              <a:ext uri="{FF2B5EF4-FFF2-40B4-BE49-F238E27FC236}">
-                <a16:creationId xmlns:a16="http://schemas.microsoft.com/office/drawing/2014/main" id="{CF488771-0B9B-DFD8-B008-7EA5FC0673BC}"/>
-              </a:ext>
-            </a:extLst>
-          </p:cNvPr>
-          <p:cNvSpPr/>
-          <p:nvPr/>
-        </p:nvSpPr>
-        <p:spPr>
-          <a:xfrm>
-            <a:off x="152669" y="1854690"/>
-            <a:ext cx="2560113" cy="378219"/>
-          </a:xfrm>
-          <a:prstGeom prst="rect">
-            <a:avLst/>
-          </a:prstGeom>
-          <a:solidFill>
-            <a:schemeClr val="accent2">
-              <a:lumMod val="20000"/>
-              <a:lumOff val="80000"/>
-              <a:alpha val="85200"/>
-            </a:schemeClr>
-          </a:solidFill>
-          <a:ln>
-            <a:noFill/>
-          </a:ln>
-        </p:spPr>
-        <p:style>
-          <a:lnRef idx="2">
-            <a:schemeClr val="accent1">
-              <a:shade val="50000"/>
-            </a:schemeClr>
-          </a:lnRef>
-          <a:fillRef idx="1">
-            <a:schemeClr val="accent1"/>
-          </a:fillRef>
-          <a:effectRef idx="0">
-            <a:schemeClr val="accent1"/>
-          </a:effectRef>
-          <a:fontRef idx="minor">
-            <a:schemeClr val="lt1"/>
-          </a:fontRef>
-        </p:style>
-        <p:txBody>
-          <a:bodyPr rtlCol="0" anchor="ctr" anchorCtr="0"/>
-          <a:lstStyle/>
-          <a:p>
-            <a:endParaRPr lang="en-US" sz="1400" dirty="0">
-              <a:solidFill>
-                <a:schemeClr val="tx1"/>
-              </a:solidFill>
-              <a:latin typeface="Consolas" panose="020B0609020204030204" pitchFamily="49" charset="0"/>
-              <a:cs typeface="Consolas" panose="020B0609020204030204" pitchFamily="49" charset="0"/>
-            </a:endParaRPr>
-          </a:p>
-        </p:txBody>
-      </p:sp>
-      <p:sp>
-        <p:nvSpPr>
-          <p:cNvPr id="5" name="Rectangle 4">
-            <a:extLst>
-              <a:ext uri="{FF2B5EF4-FFF2-40B4-BE49-F238E27FC236}">
-                <a16:creationId xmlns:a16="http://schemas.microsoft.com/office/drawing/2014/main" id="{450B10D6-AD2E-7932-C9ED-F99E35ABC865}"/>
-              </a:ext>
-            </a:extLst>
-          </p:cNvPr>
-          <p:cNvSpPr/>
-          <p:nvPr/>
-        </p:nvSpPr>
-        <p:spPr>
-          <a:xfrm>
-            <a:off x="163307" y="380328"/>
-            <a:ext cx="4010567" cy="1430342"/>
-          </a:xfrm>
-          <a:prstGeom prst="rect">
-            <a:avLst/>
-          </a:prstGeom>
-          <a:solidFill>
-            <a:schemeClr val="accent4">
-              <a:lumMod val="20000"/>
-              <a:lumOff val="80000"/>
-              <a:alpha val="50000"/>
-            </a:schemeClr>
-          </a:solidFill>
-          <a:ln>
-            <a:noFill/>
-          </a:ln>
-        </p:spPr>
-        <p:style>
-          <a:lnRef idx="2">
-            <a:schemeClr val="accent1">
-              <a:shade val="50000"/>
-            </a:schemeClr>
-          </a:lnRef>
-          <a:fillRef idx="1">
-            <a:schemeClr val="accent1"/>
-          </a:fillRef>
-          <a:effectRef idx="0">
-            <a:schemeClr val="accent1"/>
-          </a:effectRef>
-          <a:fontRef idx="minor">
-            <a:schemeClr val="lt1"/>
-          </a:fontRef>
-        </p:style>
-        <p:txBody>
-          <a:bodyPr rtlCol="0" anchor="ctr" anchorCtr="0"/>
-          <a:lstStyle/>
-          <a:p>
-            <a:endParaRPr lang="en-US" sz="1400" dirty="0">
-              <a:solidFill>
-                <a:schemeClr val="tx1"/>
-              </a:solidFill>
-              <a:latin typeface="Consolas" panose="020B0609020204030204" pitchFamily="49" charset="0"/>
-              <a:cs typeface="Consolas" panose="020B0609020204030204" pitchFamily="49" charset="0"/>
-            </a:endParaRPr>
-          </a:p>
-        </p:txBody>
-      </p:sp>
-      <p:sp>
-        <p:nvSpPr>
-          <p:cNvPr id="16" name="Rectangle 15">
-            <a:extLst>
-              <a:ext uri="{FF2B5EF4-FFF2-40B4-BE49-F238E27FC236}">
-                <a16:creationId xmlns:a16="http://schemas.microsoft.com/office/drawing/2014/main" id="{218A518E-A5FE-9D86-1DA1-E23BCDE4656F}"/>
-              </a:ext>
-            </a:extLst>
-          </p:cNvPr>
-          <p:cNvSpPr/>
-          <p:nvPr/>
-        </p:nvSpPr>
-        <p:spPr>
-          <a:xfrm>
-            <a:off x="5182428" y="2337046"/>
-            <a:ext cx="2850754" cy="1479301"/>
-          </a:xfrm>
-          <a:prstGeom prst="rect">
-            <a:avLst/>
-          </a:prstGeom>
-          <a:solidFill>
-            <a:schemeClr val="bg2">
-              <a:lumMod val="90000"/>
-              <a:alpha val="18897"/>
-            </a:schemeClr>
-          </a:solidFill>
-          <a:ln>
-            <a:noFill/>
-          </a:ln>
-        </p:spPr>
-        <p:style>
-          <a:lnRef idx="2">
-            <a:schemeClr val="accent1">
-              <a:shade val="50000"/>
-            </a:schemeClr>
-          </a:lnRef>
-          <a:fillRef idx="1">
-            <a:schemeClr val="accent1"/>
-          </a:fillRef>
-          <a:effectRef idx="0">
-            <a:schemeClr val="accent1"/>
-          </a:effectRef>
-          <a:fontRef idx="minor">
-            <a:schemeClr val="lt1"/>
-          </a:fontRef>
-        </p:style>
-        <p:txBody>
-          <a:bodyPr rtlCol="0" anchor="ctr" anchorCtr="0"/>
-          <a:lstStyle/>
-          <a:p>
-            <a:endParaRPr lang="en-US" sz="1400" dirty="0">
-              <a:solidFill>
-                <a:schemeClr val="accent5">
-                  <a:lumMod val="20000"/>
-                  <a:lumOff val="80000"/>
-                </a:schemeClr>
-              </a:solidFill>
-            </a:endParaRPr>
-          </a:p>
-        </p:txBody>
-      </p:sp>
-      <p:sp>
-        <p:nvSpPr>
-          <p:cNvPr id="4" name="TextBox 3">
-            <a:extLst>
-              <a:ext uri="{FF2B5EF4-FFF2-40B4-BE49-F238E27FC236}">
-                <a16:creationId xmlns:a16="http://schemas.microsoft.com/office/drawing/2014/main" id="{DC5D00EE-0AFF-B160-215E-307CB2FC6491}"/>
-              </a:ext>
-            </a:extLst>
-          </p:cNvPr>
-          <p:cNvSpPr txBox="1"/>
-          <p:nvPr/>
-        </p:nvSpPr>
-        <p:spPr>
-          <a:xfrm>
-            <a:off x="92154" y="12936"/>
-            <a:ext cx="4162402" cy="3803412"/>
-          </a:xfrm>
-          <a:prstGeom prst="rect">
-            <a:avLst/>
-          </a:prstGeom>
-          <a:noFill/>
-          <a:ln>
-            <a:solidFill>
-              <a:schemeClr val="accent1"/>
-            </a:solidFill>
-          </a:ln>
-        </p:spPr>
-        <p:txBody>
-          <a:bodyPr wrap="square" rtlCol="0">
-            <a:noAutofit/>
-          </a:bodyPr>
-          <a:lstStyle/>
-          <a:p>
-            <a:r>
-              <a:rPr lang="en-US" dirty="0">
-                <a:latin typeface="Times New Roman" panose="02020603050405020304" pitchFamily="18" charset="0"/>
-                <a:cs typeface="Times New Roman" panose="02020603050405020304" pitchFamily="18" charset="0"/>
-              </a:rPr>
-              <a:t>REX Dispatcher Function </a:t>
-            </a:r>
-          </a:p>
-          <a:p>
-            <a:pPr defTabSz="914400">
-              <a:defRPr/>
-            </a:pPr>
-            <a:r>
-              <a:rPr lang="en-US" sz="1400" b="1" dirty="0" err="1">
+              </a:endParaRPr>
+            </a:p>
+            <a:p>
+              <a:pPr defTabSz="914400">
+                <a:defRPr/>
+              </a:pPr>
+              <a:r>
+                <a:rPr lang="en-US" sz="1400" b="1" dirty="0" err="1">
+                  <a:solidFill>
+                    <a:prstClr val="black"/>
+                  </a:solidFill>
+                  <a:latin typeface="Consolas" panose="020B0609020204030204" pitchFamily="49" charset="0"/>
+                  <a:cs typeface="Consolas" panose="020B0609020204030204" pitchFamily="49" charset="0"/>
+                </a:rPr>
+                <a:t>rex_exit</a:t>
+              </a:r>
+              <a:r>
+                <a:rPr lang="en-US" sz="1400" b="1" dirty="0">
+                  <a:solidFill>
+                    <a:prstClr val="black"/>
+                  </a:solidFill>
+                  <a:latin typeface="Consolas" panose="020B0609020204030204" pitchFamily="49" charset="0"/>
+                  <a:cs typeface="Consolas" panose="020B0609020204030204" pitchFamily="49" charset="0"/>
+                </a:rPr>
+                <a:t>:</a:t>
+              </a:r>
+            </a:p>
+            <a:p>
+              <a:pPr defTabSz="457200">
+                <a:defRPr/>
+              </a:pPr>
+              <a:r>
+                <a:rPr lang="en-US" sz="1398" dirty="0">
+                  <a:solidFill>
+                    <a:schemeClr val="accent6">
+                      <a:lumMod val="75000"/>
+                    </a:schemeClr>
+                  </a:solidFill>
+                  <a:latin typeface="Consolas" panose="020B0609020204030204" pitchFamily="49" charset="0"/>
+                  <a:cs typeface="Consolas" panose="020B0609020204030204" pitchFamily="49" charset="0"/>
+                </a:rPr>
+                <a:t>// restore old stack and frame pointer</a:t>
+              </a:r>
+            </a:p>
+            <a:p>
+              <a:pPr defTabSz="914400">
+                <a:defRPr/>
+              </a:pPr>
+              <a:r>
+                <a:rPr lang="en-US" sz="1400" dirty="0" err="1">
+                  <a:solidFill>
+                    <a:prstClr val="black"/>
+                  </a:solidFill>
+                  <a:latin typeface="Consolas" panose="020B0609020204030204" pitchFamily="49" charset="0"/>
+                  <a:cs typeface="Consolas" panose="020B0609020204030204" pitchFamily="49" charset="0"/>
+                </a:rPr>
+                <a:t>movq</a:t>
+              </a:r>
+              <a:r>
+                <a:rPr lang="en-US" sz="1400" dirty="0">
+                  <a:solidFill>
+                    <a:prstClr val="black"/>
+                  </a:solidFill>
+                  <a:latin typeface="Consolas" panose="020B0609020204030204" pitchFamily="49" charset="0"/>
+                  <a:cs typeface="Consolas" panose="020B0609020204030204" pitchFamily="49" charset="0"/>
+                </a:rPr>
+                <a:t> PER_CPU_VAR(</a:t>
+              </a:r>
+              <a:r>
+                <a:rPr lang="en-US" sz="1400" dirty="0" err="1">
+                  <a:solidFill>
+                    <a:prstClr val="black"/>
+                  </a:solidFill>
+                  <a:latin typeface="Consolas" panose="020B0609020204030204" pitchFamily="49" charset="0"/>
+                  <a:cs typeface="Consolas" panose="020B0609020204030204" pitchFamily="49" charset="0"/>
+                </a:rPr>
+                <a:t>rex_old_sp</a:t>
+              </a:r>
+              <a:r>
+                <a:rPr lang="en-US" sz="1400" dirty="0">
+                  <a:solidFill>
+                    <a:prstClr val="black"/>
+                  </a:solidFill>
+                  <a:latin typeface="Consolas" panose="020B0609020204030204" pitchFamily="49" charset="0"/>
+                  <a:cs typeface="Consolas" panose="020B0609020204030204" pitchFamily="49" charset="0"/>
+                </a:rPr>
+                <a:t>), %</a:t>
+              </a:r>
+              <a:r>
+                <a:rPr lang="en-US" sz="1400" dirty="0" err="1">
+                  <a:solidFill>
+                    <a:prstClr val="black"/>
+                  </a:solidFill>
+                  <a:latin typeface="Consolas" panose="020B0609020204030204" pitchFamily="49" charset="0"/>
+                  <a:cs typeface="Consolas" panose="020B0609020204030204" pitchFamily="49" charset="0"/>
+                </a:rPr>
+                <a:t>rsp</a:t>
+              </a:r>
+              <a:endParaRPr lang="en-US" sz="1400" dirty="0">
                 <a:solidFill>
                   <a:prstClr val="black"/>
                 </a:solidFill>
                 <a:latin typeface="Consolas" panose="020B0609020204030204" pitchFamily="49" charset="0"/>
                 <a:cs typeface="Consolas" panose="020B0609020204030204" pitchFamily="49" charset="0"/>
-              </a:rPr>
-              <a:t>rex_dispatcher_func</a:t>
-            </a:r>
-            <a:r>
-              <a:rPr lang="en-US" sz="1400" b="1" dirty="0">
+              </a:endParaRPr>
+            </a:p>
+            <a:p>
+              <a:pPr defTabSz="914400">
+                <a:defRPr/>
+              </a:pPr>
+              <a:endParaRPr lang="en-US" sz="1400" dirty="0">
                 <a:solidFill>
                   <a:prstClr val="black"/>
                 </a:solidFill>
                 <a:latin typeface="Consolas" panose="020B0609020204030204" pitchFamily="49" charset="0"/>
                 <a:cs typeface="Consolas" panose="020B0609020204030204" pitchFamily="49" charset="0"/>
-              </a:rPr>
-              <a:t>:</a:t>
-            </a:r>
-          </a:p>
-          <a:p>
-            <a:pPr defTabSz="457200">
-              <a:defRPr/>
-            </a:pPr>
-            <a:r>
-              <a:rPr lang="en-US" sz="1398" dirty="0">
-                <a:solidFill>
-                  <a:schemeClr val="accent6">
-                    <a:lumMod val="75000"/>
-                  </a:schemeClr>
-                </a:solidFill>
-                <a:latin typeface="Consolas" panose="020B0609020204030204" pitchFamily="49" charset="0"/>
-                <a:cs typeface="Consolas" panose="020B0609020204030204" pitchFamily="49" charset="0"/>
-              </a:rPr>
-              <a:t>// save the callee-saved registers</a:t>
-            </a:r>
-          </a:p>
-          <a:p>
-            <a:pPr defTabSz="914400">
-              <a:defRPr/>
-            </a:pPr>
-            <a:r>
-              <a:rPr lang="en-US" sz="1400" dirty="0" err="1">
+              </a:endParaRPr>
+            </a:p>
+            <a:p>
+              <a:pPr defTabSz="457200">
+                <a:defRPr/>
+              </a:pPr>
+              <a:r>
+                <a:rPr lang="en-US" sz="1398" dirty="0">
+                  <a:solidFill>
+                    <a:schemeClr val="accent6">
+                      <a:lumMod val="75000"/>
+                    </a:schemeClr>
+                  </a:solidFill>
+                  <a:latin typeface="Consolas" panose="020B0609020204030204" pitchFamily="49" charset="0"/>
+                  <a:cs typeface="Consolas" panose="020B0609020204030204" pitchFamily="49" charset="0"/>
+                </a:rPr>
+                <a:t>// restore the callee-saved registers</a:t>
+              </a:r>
+            </a:p>
+            <a:p>
+              <a:pPr defTabSz="914400">
+                <a:defRPr/>
+              </a:pPr>
+              <a:r>
+                <a:rPr lang="en-US" sz="1400" dirty="0" err="1">
+                  <a:solidFill>
+                    <a:prstClr val="black"/>
+                  </a:solidFill>
+                  <a:latin typeface="Consolas" panose="020B0609020204030204" pitchFamily="49" charset="0"/>
+                  <a:cs typeface="Consolas" panose="020B0609020204030204" pitchFamily="49" charset="0"/>
+                </a:rPr>
+                <a:t>popq</a:t>
+              </a:r>
+              <a:r>
+                <a:rPr lang="en-US" sz="1400" dirty="0">
+                  <a:solidFill>
+                    <a:prstClr val="black"/>
+                  </a:solidFill>
+                  <a:latin typeface="Consolas" panose="020B0609020204030204" pitchFamily="49" charset="0"/>
+                  <a:cs typeface="Consolas" panose="020B0609020204030204" pitchFamily="49" charset="0"/>
+                </a:rPr>
+                <a:t> ...</a:t>
+              </a:r>
+            </a:p>
+            <a:p>
+              <a:pPr defTabSz="914400">
+                <a:defRPr/>
+              </a:pPr>
+              <a:endParaRPr lang="en-US" sz="500" dirty="0">
                 <a:solidFill>
                   <a:prstClr val="black"/>
                 </a:solidFill>
                 <a:latin typeface="Consolas" panose="020B0609020204030204" pitchFamily="49" charset="0"/>
                 <a:cs typeface="Consolas" panose="020B0609020204030204" pitchFamily="49" charset="0"/>
-              </a:rPr>
-              <a:t>pushq</a:t>
-            </a:r>
-            <a:r>
-              <a:rPr lang="en-US" sz="1400" dirty="0">
-                <a:solidFill>
-                  <a:prstClr val="black"/>
-                </a:solidFill>
+              </a:endParaRPr>
+            </a:p>
+          </p:txBody>
+        </p:sp>
+        <p:cxnSp>
+          <p:nvCxnSpPr>
+            <p:cNvPr id="12" name="Elbow Connector 11">
+              <a:extLst>
+                <a:ext uri="{FF2B5EF4-FFF2-40B4-BE49-F238E27FC236}">
+                  <a16:creationId xmlns:a16="http://schemas.microsoft.com/office/drawing/2014/main" id="{A3231205-109F-A30C-CF11-C6E1F95CDE41}"/>
+                </a:ext>
+              </a:extLst>
+            </p:cNvPr>
+            <p:cNvCxnSpPr>
+              <a:cxnSpLocks/>
+              <a:stCxn id="8" idx="3"/>
+              <a:endCxn id="13" idx="1"/>
+            </p:cNvCxnSpPr>
+            <p:nvPr/>
+          </p:nvCxnSpPr>
+          <p:spPr>
+            <a:xfrm flipV="1">
+              <a:off x="2712781" y="653495"/>
+              <a:ext cx="2334426" cy="1390305"/>
+            </a:xfrm>
+            <a:prstGeom prst="bentConnector3">
+              <a:avLst>
+                <a:gd name="adj1" fmla="val 79378"/>
+              </a:avLst>
+            </a:prstGeom>
+            <a:ln w="34925">
+              <a:prstDash val="sysDot"/>
+              <a:round/>
+              <a:tailEnd type="triangle"/>
+            </a:ln>
+          </p:spPr>
+          <p:style>
+            <a:lnRef idx="2">
+              <a:schemeClr val="accent1"/>
+            </a:lnRef>
+            <a:fillRef idx="0">
+              <a:schemeClr val="accent1"/>
+            </a:fillRef>
+            <a:effectRef idx="1">
+              <a:schemeClr val="accent1"/>
+            </a:effectRef>
+            <a:fontRef idx="minor">
+              <a:schemeClr val="tx1"/>
+            </a:fontRef>
+          </p:style>
+        </p:cxnSp>
+        <p:sp>
+          <p:nvSpPr>
+            <p:cNvPr id="14" name="TextBox 13">
+              <a:extLst>
+                <a:ext uri="{FF2B5EF4-FFF2-40B4-BE49-F238E27FC236}">
+                  <a16:creationId xmlns:a16="http://schemas.microsoft.com/office/drawing/2014/main" id="{A65E88A0-512F-D08C-B8AB-6BEAC25C63D9}"/>
+                </a:ext>
+              </a:extLst>
+            </p:cNvPr>
+            <p:cNvSpPr txBox="1"/>
+            <p:nvPr/>
+          </p:nvSpPr>
+          <p:spPr>
+            <a:xfrm>
+              <a:off x="5115182" y="1988802"/>
+              <a:ext cx="3012130" cy="1921672"/>
+            </a:xfrm>
+            <a:prstGeom prst="rect">
+              <a:avLst/>
+            </a:prstGeom>
+            <a:noFill/>
+            <a:ln>
+              <a:solidFill>
+                <a:schemeClr val="accent1"/>
+              </a:solidFill>
+            </a:ln>
+          </p:spPr>
+          <p:txBody>
+            <a:bodyPr wrap="square" rtlCol="0">
+              <a:noAutofit/>
+            </a:bodyPr>
+            <a:lstStyle/>
+            <a:p>
+              <a:r>
+                <a:rPr lang="en-US" dirty="0">
+                  <a:latin typeface="Times New Roman" panose="02020603050405020304" pitchFamily="18" charset="0"/>
+                  <a:cs typeface="Times New Roman" panose="02020603050405020304" pitchFamily="18" charset="0"/>
+                </a:rPr>
+                <a:t>In-kernel </a:t>
+              </a:r>
+              <a:r>
+                <a:rPr lang="en-US" dirty="0" err="1">
+                  <a:latin typeface="Times New Roman" panose="02020603050405020304" pitchFamily="18" charset="0"/>
+                  <a:cs typeface="Times New Roman" panose="02020603050405020304" pitchFamily="18" charset="0"/>
+                </a:rPr>
+                <a:t>landingpad</a:t>
+              </a:r>
+              <a:endParaRPr lang="en-US" dirty="0">
+                <a:latin typeface="Times New Roman" panose="02020603050405020304" pitchFamily="18" charset="0"/>
+                <a:cs typeface="Times New Roman" panose="02020603050405020304" pitchFamily="18" charset="0"/>
+              </a:endParaRPr>
+            </a:p>
+            <a:p>
+              <a:endParaRPr lang="en-US" dirty="0">
+                <a:latin typeface="Times New Roman" panose="02020603050405020304" pitchFamily="18" charset="0"/>
+                <a:cs typeface="Times New Roman" panose="02020603050405020304" pitchFamily="18" charset="0"/>
+              </a:endParaRPr>
+            </a:p>
+            <a:p>
+              <a:r>
+                <a:rPr lang="en-US" sz="1400" b="1" dirty="0" err="1">
+                  <a:latin typeface="Consolas" panose="020B0609020204030204" pitchFamily="49" charset="0"/>
+                  <a:cs typeface="Consolas" panose="020B0609020204030204" pitchFamily="49" charset="0"/>
+                </a:rPr>
+                <a:t>rex_landingpad</a:t>
+              </a:r>
+              <a:r>
+                <a:rPr lang="en-US" sz="1400" b="1" dirty="0">
+                  <a:latin typeface="Consolas" panose="020B0609020204030204" pitchFamily="49" charset="0"/>
+                  <a:cs typeface="Consolas" panose="020B0609020204030204" pitchFamily="49" charset="0"/>
+                </a:rPr>
+                <a:t>:</a:t>
+              </a:r>
+            </a:p>
+            <a:p>
+              <a:r>
+                <a:rPr lang="en-US" sz="1398" dirty="0">
+                  <a:solidFill>
+                    <a:schemeClr val="accent6">
+                      <a:lumMod val="75000"/>
+                    </a:schemeClr>
+                  </a:solidFill>
+                  <a:latin typeface="Consolas" panose="020B0609020204030204" pitchFamily="49" charset="0"/>
+                  <a:cs typeface="Consolas" panose="020B0609020204030204" pitchFamily="49" charset="0"/>
+                </a:rPr>
+                <a:t>// report error</a:t>
+              </a:r>
+            </a:p>
+            <a:p>
+              <a:r>
+                <a:rPr lang="en-US" sz="1398" dirty="0">
+                  <a:solidFill>
+                    <a:schemeClr val="accent6">
+                      <a:lumMod val="75000"/>
+                    </a:schemeClr>
+                  </a:solidFill>
+                  <a:latin typeface="Consolas" panose="020B0609020204030204" pitchFamily="49" charset="0"/>
+                  <a:cs typeface="Consolas" panose="020B0609020204030204" pitchFamily="49" charset="0"/>
+                </a:rPr>
+                <a:t>// set default return value</a:t>
+              </a:r>
+            </a:p>
+            <a:p>
+              <a:r>
+                <a:rPr lang="en-US" sz="1400" dirty="0">
+                  <a:latin typeface="Consolas" panose="020B0609020204030204" pitchFamily="49" charset="0"/>
+                  <a:cs typeface="Consolas" panose="020B0609020204030204" pitchFamily="49" charset="0"/>
+                </a:rPr>
+                <a:t>...</a:t>
+              </a:r>
+            </a:p>
+            <a:p>
+              <a:r>
+                <a:rPr lang="en-US" sz="1400" b="1" dirty="0" err="1">
+                  <a:latin typeface="Consolas" panose="020B0609020204030204" pitchFamily="49" charset="0"/>
+                  <a:cs typeface="Consolas" panose="020B0609020204030204" pitchFamily="49" charset="0"/>
+                </a:rPr>
+                <a:t>jmp</a:t>
+              </a:r>
+              <a:r>
+                <a:rPr lang="en-US" sz="1400" b="1" dirty="0">
+                  <a:latin typeface="Consolas" panose="020B0609020204030204" pitchFamily="49" charset="0"/>
+                  <a:cs typeface="Consolas" panose="020B0609020204030204" pitchFamily="49" charset="0"/>
+                </a:rPr>
+                <a:t> </a:t>
+              </a:r>
+              <a:r>
+                <a:rPr lang="en-US" sz="1400" b="1" dirty="0" err="1">
+                  <a:latin typeface="Consolas" panose="020B0609020204030204" pitchFamily="49" charset="0"/>
+                  <a:cs typeface="Consolas" panose="020B0609020204030204" pitchFamily="49" charset="0"/>
+                </a:rPr>
+                <a:t>rex_exit</a:t>
+              </a:r>
+              <a:endParaRPr lang="en-US" sz="1400" b="1" dirty="0">
                 <a:latin typeface="Consolas" panose="020B0609020204030204" pitchFamily="49" charset="0"/>
                 <a:cs typeface="Consolas" panose="020B0609020204030204" pitchFamily="49" charset="0"/>
-              </a:rPr>
-              <a:t> ...</a:t>
-            </a:r>
-          </a:p>
-          <a:p>
-            <a:pPr defTabSz="457200">
-              <a:defRPr/>
-            </a:pPr>
-            <a:r>
-              <a:rPr lang="en-US" sz="1398" dirty="0">
-                <a:solidFill>
-                  <a:schemeClr val="accent6">
-                    <a:lumMod val="75000"/>
-                  </a:schemeClr>
-                </a:solidFill>
-                <a:latin typeface="Consolas" panose="020B0609020204030204" pitchFamily="49" charset="0"/>
-                <a:cs typeface="Consolas" panose="020B0609020204030204" pitchFamily="49" charset="0"/>
-              </a:rPr>
-              <a:t>//</a:t>
-            </a:r>
-            <a:r>
-              <a:rPr lang="zh-CN" altLang="en-US" sz="1398" dirty="0">
-                <a:solidFill>
-                  <a:schemeClr val="accent6">
-                    <a:lumMod val="75000"/>
-                  </a:schemeClr>
-                </a:solidFill>
-                <a:latin typeface="Consolas" panose="020B0609020204030204" pitchFamily="49" charset="0"/>
-                <a:cs typeface="Consolas" panose="020B0609020204030204" pitchFamily="49" charset="0"/>
-              </a:rPr>
-              <a:t> </a:t>
-            </a:r>
-            <a:r>
-              <a:rPr lang="en-US" sz="1398" dirty="0">
-                <a:solidFill>
-                  <a:schemeClr val="accent6">
-                    <a:lumMod val="75000"/>
-                  </a:schemeClr>
-                </a:solidFill>
-                <a:latin typeface="Consolas" panose="020B0609020204030204" pitchFamily="49" charset="0"/>
-                <a:cs typeface="Consolas" panose="020B0609020204030204" pitchFamily="49" charset="0"/>
-              </a:rPr>
-              <a:t>save stack and frame pointer</a:t>
-            </a:r>
-          </a:p>
-          <a:p>
-            <a:pPr defTabSz="914400">
-              <a:defRPr/>
-            </a:pPr>
-            <a:r>
-              <a:rPr lang="en-US" sz="1400" dirty="0" err="1">
-                <a:solidFill>
-                  <a:prstClr val="black"/>
-                </a:solidFill>
-                <a:latin typeface="Consolas" panose="020B0609020204030204" pitchFamily="49" charset="0"/>
-                <a:cs typeface="Consolas" panose="020B0609020204030204" pitchFamily="49" charset="0"/>
-              </a:rPr>
-              <a:t>movq</a:t>
-            </a:r>
-            <a:r>
-              <a:rPr lang="en-US" sz="1400" dirty="0">
-                <a:solidFill>
-                  <a:prstClr val="black"/>
-                </a:solidFill>
-                <a:latin typeface="Consolas" panose="020B0609020204030204" pitchFamily="49" charset="0"/>
-                <a:cs typeface="Consolas" panose="020B0609020204030204" pitchFamily="49" charset="0"/>
-              </a:rPr>
-              <a:t> %</a:t>
-            </a:r>
-            <a:r>
-              <a:rPr lang="en-US" sz="1400" dirty="0" err="1">
-                <a:solidFill>
-                  <a:prstClr val="black"/>
-                </a:solidFill>
-                <a:latin typeface="Consolas" panose="020B0609020204030204" pitchFamily="49" charset="0"/>
-                <a:cs typeface="Consolas" panose="020B0609020204030204" pitchFamily="49" charset="0"/>
-              </a:rPr>
-              <a:t>rsp</a:t>
-            </a:r>
-            <a:r>
-              <a:rPr lang="en-US" sz="1400" dirty="0">
-                <a:solidFill>
-                  <a:prstClr val="black"/>
-                </a:solidFill>
-                <a:latin typeface="Consolas" panose="020B0609020204030204" pitchFamily="49" charset="0"/>
-                <a:cs typeface="Consolas" panose="020B0609020204030204" pitchFamily="49" charset="0"/>
-              </a:rPr>
-              <a:t>, PER_CPU_VAR(</a:t>
-            </a:r>
-            <a:r>
-              <a:rPr lang="en-US" sz="1400" dirty="0" err="1">
-                <a:solidFill>
-                  <a:prstClr val="black"/>
-                </a:solidFill>
-                <a:latin typeface="Consolas" panose="020B0609020204030204" pitchFamily="49" charset="0"/>
-                <a:cs typeface="Consolas" panose="020B0609020204030204" pitchFamily="49" charset="0"/>
-              </a:rPr>
-              <a:t>rex_old_sp</a:t>
-            </a:r>
-            <a:r>
-              <a:rPr lang="en-US" sz="1400" dirty="0">
-                <a:solidFill>
-                  <a:prstClr val="black"/>
-                </a:solidFill>
-                <a:latin typeface="Consolas" panose="020B0609020204030204" pitchFamily="49" charset="0"/>
-                <a:cs typeface="Consolas" panose="020B0609020204030204" pitchFamily="49" charset="0"/>
-              </a:rPr>
-              <a:t>) ...</a:t>
-            </a:r>
-          </a:p>
-          <a:p>
-            <a:pPr defTabSz="457200">
-              <a:defRPr/>
-            </a:pPr>
-            <a:r>
-              <a:rPr lang="en-US" sz="1398" dirty="0">
-                <a:solidFill>
-                  <a:schemeClr val="accent6">
-                    <a:lumMod val="75000"/>
-                  </a:schemeClr>
-                </a:solidFill>
-                <a:latin typeface="Consolas" panose="020B0609020204030204" pitchFamily="49" charset="0"/>
-                <a:cs typeface="Consolas" panose="020B0609020204030204" pitchFamily="49" charset="0"/>
-              </a:rPr>
-              <a:t>// switch stack </a:t>
-            </a:r>
-          </a:p>
-          <a:p>
-            <a:pPr defTabSz="914400">
-              <a:defRPr/>
-            </a:pPr>
-            <a:r>
-              <a:rPr lang="en-US" sz="1400" dirty="0" err="1">
-                <a:solidFill>
-                  <a:prstClr val="black"/>
-                </a:solidFill>
-                <a:latin typeface="Consolas" panose="020B0609020204030204" pitchFamily="49" charset="0"/>
-                <a:cs typeface="Consolas" panose="020B0609020204030204" pitchFamily="49" charset="0"/>
-              </a:rPr>
-              <a:t>movq</a:t>
-            </a:r>
-            <a:r>
-              <a:rPr lang="en-US" sz="1400" dirty="0">
-                <a:solidFill>
-                  <a:prstClr val="black"/>
-                </a:solidFill>
-                <a:latin typeface="Consolas" panose="020B0609020204030204" pitchFamily="49" charset="0"/>
-                <a:cs typeface="Consolas" panose="020B0609020204030204" pitchFamily="49" charset="0"/>
-              </a:rPr>
-              <a:t> PER_CPU_VAR(</a:t>
-            </a:r>
-            <a:r>
-              <a:rPr lang="en-US" sz="1400" dirty="0" err="1">
-                <a:solidFill>
-                  <a:prstClr val="black"/>
-                </a:solidFill>
-                <a:latin typeface="Consolas" panose="020B0609020204030204" pitchFamily="49" charset="0"/>
-                <a:cs typeface="Consolas" panose="020B0609020204030204" pitchFamily="49" charset="0"/>
-              </a:rPr>
-              <a:t>rex_stack</a:t>
-            </a:r>
-            <a:r>
-              <a:rPr lang="en-US" sz="1400" dirty="0">
-                <a:solidFill>
-                  <a:prstClr val="black"/>
-                </a:solidFill>
-                <a:latin typeface="Consolas" panose="020B0609020204030204" pitchFamily="49" charset="0"/>
-                <a:cs typeface="Consolas" panose="020B0609020204030204" pitchFamily="49" charset="0"/>
-              </a:rPr>
-              <a:t>), %</a:t>
-            </a:r>
-            <a:r>
-              <a:rPr lang="en-US" sz="1400" dirty="0" err="1">
-                <a:solidFill>
-                  <a:prstClr val="black"/>
-                </a:solidFill>
-                <a:latin typeface="Consolas" panose="020B0609020204030204" pitchFamily="49" charset="0"/>
-                <a:cs typeface="Consolas" panose="020B0609020204030204" pitchFamily="49" charset="0"/>
-              </a:rPr>
-              <a:t>rsp</a:t>
-            </a:r>
-            <a:r>
-              <a:rPr lang="en-US" sz="1400" dirty="0">
-                <a:solidFill>
-                  <a:prstClr val="black"/>
-                </a:solidFill>
-                <a:latin typeface="Consolas" panose="020B0609020204030204" pitchFamily="49" charset="0"/>
-                <a:cs typeface="Consolas" panose="020B0609020204030204" pitchFamily="49" charset="0"/>
-              </a:rPr>
-              <a:t> ...</a:t>
-            </a:r>
-          </a:p>
-          <a:p>
-            <a:pPr defTabSz="457200">
-              <a:defRPr/>
-            </a:pPr>
-            <a:r>
-              <a:rPr lang="en-US" sz="1398" dirty="0">
-                <a:solidFill>
-                  <a:schemeClr val="accent6">
-                    <a:lumMod val="75000"/>
-                  </a:schemeClr>
-                </a:solidFill>
-                <a:latin typeface="Consolas" panose="020B0609020204030204" pitchFamily="49" charset="0"/>
-                <a:cs typeface="Consolas" panose="020B0609020204030204" pitchFamily="49" charset="0"/>
-              </a:rPr>
-              <a:t>// invoke REX user program</a:t>
-            </a:r>
-          </a:p>
-          <a:p>
-            <a:pPr defTabSz="914400">
-              <a:defRPr/>
-            </a:pPr>
-            <a:r>
-              <a:rPr lang="en-US" sz="1400" b="1" dirty="0">
-                <a:solidFill>
-                  <a:prstClr val="black"/>
-                </a:solidFill>
-                <a:latin typeface="Consolas" panose="020B0609020204030204" pitchFamily="49" charset="0"/>
-                <a:cs typeface="Consolas" panose="020B0609020204030204" pitchFamily="49" charset="0"/>
-              </a:rPr>
-              <a:t>call *%</a:t>
-            </a:r>
-            <a:r>
-              <a:rPr lang="en-US" sz="1400" b="1" dirty="0" err="1">
-                <a:solidFill>
-                  <a:prstClr val="black"/>
-                </a:solidFill>
-                <a:latin typeface="Consolas" panose="020B0609020204030204" pitchFamily="49" charset="0"/>
-                <a:cs typeface="Consolas" panose="020B0609020204030204" pitchFamily="49" charset="0"/>
-              </a:rPr>
-              <a:t>rdx</a:t>
-            </a:r>
-            <a:endParaRPr lang="en-US" sz="1400" dirty="0">
+              </a:endParaRPr>
+            </a:p>
+          </p:txBody>
+        </p:sp>
+        <p:cxnSp>
+          <p:nvCxnSpPr>
+            <p:cNvPr id="25" name="Elbow Connector 24">
+              <a:extLst>
+                <a:ext uri="{FF2B5EF4-FFF2-40B4-BE49-F238E27FC236}">
+                  <a16:creationId xmlns:a16="http://schemas.microsoft.com/office/drawing/2014/main" id="{2F54CABE-64E2-06DB-D490-8B90FE20D1FD}"/>
+                </a:ext>
+              </a:extLst>
+            </p:cNvPr>
+            <p:cNvCxnSpPr>
+              <a:cxnSpLocks/>
+              <a:stCxn id="40" idx="10"/>
+              <a:endCxn id="9" idx="1"/>
+            </p:cNvCxnSpPr>
+            <p:nvPr/>
+          </p:nvCxnSpPr>
+          <p:spPr>
+            <a:xfrm rot="10800000" flipV="1">
+              <a:off x="5182428" y="1641927"/>
+              <a:ext cx="79829" cy="1058831"/>
+            </a:xfrm>
+            <a:prstGeom prst="bentConnector3">
+              <a:avLst>
+                <a:gd name="adj1" fmla="val 490493"/>
+              </a:avLst>
+            </a:prstGeom>
+            <a:ln w="34925">
               <a:solidFill>
-                <a:prstClr val="black"/>
+                <a:srgbClr val="C00000"/>
               </a:solidFill>
-              <a:latin typeface="Consolas" panose="020B0609020204030204" pitchFamily="49" charset="0"/>
-              <a:cs typeface="Consolas" panose="020B0609020204030204" pitchFamily="49" charset="0"/>
-            </a:endParaRPr>
-          </a:p>
-          <a:p>
-            <a:pPr defTabSz="914400">
-              <a:defRPr/>
-            </a:pPr>
-            <a:endParaRPr lang="en-US" sz="1400" dirty="0">
+              <a:prstDash val="sysDot"/>
+              <a:round/>
+              <a:tailEnd type="triangle"/>
+            </a:ln>
+          </p:spPr>
+          <p:style>
+            <a:lnRef idx="2">
+              <a:schemeClr val="accent1"/>
+            </a:lnRef>
+            <a:fillRef idx="0">
+              <a:schemeClr val="accent1"/>
+            </a:fillRef>
+            <a:effectRef idx="1">
+              <a:schemeClr val="accent1"/>
+            </a:effectRef>
+            <a:fontRef idx="minor">
+              <a:schemeClr val="tx1"/>
+            </a:fontRef>
+          </p:style>
+        </p:cxnSp>
+        <p:cxnSp>
+          <p:nvCxnSpPr>
+            <p:cNvPr id="30" name="Elbow Connector 29">
+              <a:extLst>
+                <a:ext uri="{FF2B5EF4-FFF2-40B4-BE49-F238E27FC236}">
+                  <a16:creationId xmlns:a16="http://schemas.microsoft.com/office/drawing/2014/main" id="{C8356E87-ED45-E11E-3550-C91B39E5519C}"/>
+                </a:ext>
+              </a:extLst>
+            </p:cNvPr>
+            <p:cNvCxnSpPr>
+              <a:cxnSpLocks/>
+              <a:stCxn id="17" idx="1"/>
+              <a:endCxn id="35" idx="3"/>
+            </p:cNvCxnSpPr>
+            <p:nvPr/>
+          </p:nvCxnSpPr>
+          <p:spPr>
+            <a:xfrm rot="10800000">
+              <a:off x="1107947" y="2575190"/>
+              <a:ext cx="4074482" cy="1003934"/>
+            </a:xfrm>
+            <a:prstGeom prst="bentConnector3">
+              <a:avLst>
+                <a:gd name="adj1" fmla="val 15347"/>
+              </a:avLst>
+            </a:prstGeom>
+            <a:ln w="34925">
               <a:solidFill>
-                <a:prstClr val="black"/>
+                <a:srgbClr val="C00000"/>
               </a:solidFill>
-              <a:latin typeface="Consolas" panose="020B0609020204030204" pitchFamily="49" charset="0"/>
-              <a:cs typeface="Consolas" panose="020B0609020204030204" pitchFamily="49" charset="0"/>
-            </a:endParaRPr>
-          </a:p>
-          <a:p>
-            <a:pPr defTabSz="914400">
-              <a:defRPr/>
-            </a:pPr>
-            <a:r>
-              <a:rPr lang="en-US" sz="1400" b="1" dirty="0" err="1">
-                <a:solidFill>
-                  <a:prstClr val="black"/>
-                </a:solidFill>
-                <a:latin typeface="Consolas" panose="020B0609020204030204" pitchFamily="49" charset="0"/>
-                <a:cs typeface="Consolas" panose="020B0609020204030204" pitchFamily="49" charset="0"/>
-              </a:rPr>
-              <a:t>rex_exit</a:t>
-            </a:r>
-            <a:r>
-              <a:rPr lang="en-US" sz="1400" b="1" dirty="0">
-                <a:solidFill>
-                  <a:prstClr val="black"/>
-                </a:solidFill>
-                <a:latin typeface="Consolas" panose="020B0609020204030204" pitchFamily="49" charset="0"/>
-                <a:cs typeface="Consolas" panose="020B0609020204030204" pitchFamily="49" charset="0"/>
-              </a:rPr>
-              <a:t>:</a:t>
-            </a:r>
-          </a:p>
-          <a:p>
-            <a:pPr defTabSz="457200">
-              <a:defRPr/>
-            </a:pPr>
-            <a:r>
-              <a:rPr lang="en-US" sz="1398" dirty="0">
-                <a:solidFill>
-                  <a:schemeClr val="accent6">
-                    <a:lumMod val="75000"/>
-                  </a:schemeClr>
-                </a:solidFill>
-                <a:latin typeface="Consolas" panose="020B0609020204030204" pitchFamily="49" charset="0"/>
-                <a:cs typeface="Consolas" panose="020B0609020204030204" pitchFamily="49" charset="0"/>
-              </a:rPr>
-              <a:t>// restore old stack and frame pointer</a:t>
-            </a:r>
-          </a:p>
-          <a:p>
-            <a:pPr defTabSz="914400">
-              <a:defRPr/>
-            </a:pPr>
-            <a:r>
-              <a:rPr lang="en-US" sz="1400" dirty="0" err="1">
-                <a:solidFill>
-                  <a:prstClr val="black"/>
-                </a:solidFill>
-                <a:latin typeface="Consolas" panose="020B0609020204030204" pitchFamily="49" charset="0"/>
-                <a:cs typeface="Consolas" panose="020B0609020204030204" pitchFamily="49" charset="0"/>
-              </a:rPr>
-              <a:t>movq</a:t>
-            </a:r>
-            <a:r>
-              <a:rPr lang="en-US" sz="1400" dirty="0">
-                <a:solidFill>
-                  <a:prstClr val="black"/>
-                </a:solidFill>
-                <a:latin typeface="Consolas" panose="020B0609020204030204" pitchFamily="49" charset="0"/>
-                <a:cs typeface="Consolas" panose="020B0609020204030204" pitchFamily="49" charset="0"/>
-              </a:rPr>
-              <a:t> PER_CPU_VAR(</a:t>
-            </a:r>
-            <a:r>
-              <a:rPr lang="en-US" sz="1400" dirty="0" err="1">
-                <a:solidFill>
-                  <a:prstClr val="black"/>
-                </a:solidFill>
-                <a:latin typeface="Consolas" panose="020B0609020204030204" pitchFamily="49" charset="0"/>
-                <a:cs typeface="Consolas" panose="020B0609020204030204" pitchFamily="49" charset="0"/>
-              </a:rPr>
-              <a:t>rex_old_sp</a:t>
-            </a:r>
-            <a:r>
-              <a:rPr lang="en-US" sz="1400" dirty="0">
-                <a:solidFill>
-                  <a:prstClr val="black"/>
-                </a:solidFill>
-                <a:latin typeface="Consolas" panose="020B0609020204030204" pitchFamily="49" charset="0"/>
-                <a:cs typeface="Consolas" panose="020B0609020204030204" pitchFamily="49" charset="0"/>
-              </a:rPr>
-              <a:t>), %</a:t>
-            </a:r>
-            <a:r>
-              <a:rPr lang="en-US" sz="1400" dirty="0" err="1">
-                <a:solidFill>
-                  <a:prstClr val="black"/>
-                </a:solidFill>
-                <a:latin typeface="Consolas" panose="020B0609020204030204" pitchFamily="49" charset="0"/>
-                <a:cs typeface="Consolas" panose="020B0609020204030204" pitchFamily="49" charset="0"/>
-              </a:rPr>
-              <a:t>rsp</a:t>
-            </a:r>
-            <a:endParaRPr lang="en-US" sz="1400" dirty="0">
+              <a:prstDash val="sysDot"/>
+              <a:round/>
+              <a:tailEnd type="triangle"/>
+            </a:ln>
+          </p:spPr>
+          <p:style>
+            <a:lnRef idx="2">
+              <a:schemeClr val="accent1"/>
+            </a:lnRef>
+            <a:fillRef idx="0">
+              <a:schemeClr val="accent1"/>
+            </a:fillRef>
+            <a:effectRef idx="1">
+              <a:schemeClr val="accent1"/>
+            </a:effectRef>
+            <a:fontRef idx="minor">
+              <a:schemeClr val="tx1"/>
+            </a:fontRef>
+          </p:style>
+        </p:cxnSp>
+        <p:sp>
+          <p:nvSpPr>
+            <p:cNvPr id="40" name="16-Point Star 39">
+              <a:extLst>
+                <a:ext uri="{FF2B5EF4-FFF2-40B4-BE49-F238E27FC236}">
+                  <a16:creationId xmlns:a16="http://schemas.microsoft.com/office/drawing/2014/main" id="{E0C00056-8436-14D3-AF56-F2F1B14659C5}"/>
+                </a:ext>
+              </a:extLst>
+            </p:cNvPr>
+            <p:cNvSpPr/>
+            <p:nvPr/>
+          </p:nvSpPr>
+          <p:spPr>
+            <a:xfrm>
+              <a:off x="5262256" y="1328877"/>
+              <a:ext cx="1266951" cy="626102"/>
+            </a:xfrm>
+            <a:prstGeom prst="star16">
+              <a:avLst/>
+            </a:prstGeom>
+            <a:solidFill>
+              <a:srgbClr val="FFFF00"/>
+            </a:solidFill>
+          </p:spPr>
+          <p:style>
+            <a:lnRef idx="2">
+              <a:schemeClr val="accent1">
+                <a:shade val="15000"/>
+              </a:schemeClr>
+            </a:lnRef>
+            <a:fillRef idx="1">
+              <a:schemeClr val="accent1"/>
+            </a:fillRef>
+            <a:effectRef idx="0">
+              <a:schemeClr val="accent1"/>
+            </a:effectRef>
+            <a:fontRef idx="minor">
+              <a:schemeClr val="lt1"/>
+            </a:fontRef>
+          </p:style>
+          <p:txBody>
+            <a:bodyPr rtlCol="0" anchor="ctr"/>
+            <a:lstStyle/>
+            <a:p>
+              <a:pPr algn="ctr"/>
+              <a:r>
+                <a:rPr lang="en-US" sz="1600" dirty="0">
+                  <a:solidFill>
+                    <a:schemeClr val="tx1"/>
+                  </a:solidFill>
+                </a:rPr>
+                <a:t>Panic</a:t>
+              </a:r>
+              <a:endParaRPr lang="en-US" sz="1600" dirty="0"/>
+            </a:p>
+          </p:txBody>
+        </p:sp>
+        <p:sp>
+          <p:nvSpPr>
+            <p:cNvPr id="9" name="Rectangle 8">
+              <a:extLst>
+                <a:ext uri="{FF2B5EF4-FFF2-40B4-BE49-F238E27FC236}">
+                  <a16:creationId xmlns:a16="http://schemas.microsoft.com/office/drawing/2014/main" id="{5EDB9AA2-1D81-1C8E-BD4D-8E31340F0699}"/>
+                </a:ext>
+              </a:extLst>
+            </p:cNvPr>
+            <p:cNvSpPr/>
+            <p:nvPr/>
+          </p:nvSpPr>
+          <p:spPr>
+            <a:xfrm>
+              <a:off x="5182427" y="2575190"/>
+              <a:ext cx="1540921" cy="251137"/>
+            </a:xfrm>
+            <a:prstGeom prst="rect">
+              <a:avLst/>
+            </a:prstGeom>
+            <a:solidFill>
+              <a:schemeClr val="accent1">
+                <a:alpha val="0"/>
+              </a:schemeClr>
+            </a:solidFill>
+            <a:ln>
+              <a:noFill/>
+            </a:ln>
+          </p:spPr>
+          <p:style>
+            <a:lnRef idx="2">
+              <a:schemeClr val="accent1">
+                <a:shade val="15000"/>
+              </a:schemeClr>
+            </a:lnRef>
+            <a:fillRef idx="1">
+              <a:schemeClr val="accent1"/>
+            </a:fillRef>
+            <a:effectRef idx="0">
+              <a:schemeClr val="accent1"/>
+            </a:effectRef>
+            <a:fontRef idx="minor">
+              <a:schemeClr val="lt1"/>
+            </a:fontRef>
+          </p:style>
+          <p:txBody>
+            <a:bodyPr rtlCol="0" anchor="ctr"/>
+            <a:lstStyle/>
+            <a:p>
+              <a:pPr algn="ctr"/>
+              <a:endParaRPr lang="en-US" dirty="0"/>
+            </a:p>
+          </p:txBody>
+        </p:sp>
+        <p:cxnSp>
+          <p:nvCxnSpPr>
+            <p:cNvPr id="15" name="Elbow Connector 14">
+              <a:extLst>
+                <a:ext uri="{FF2B5EF4-FFF2-40B4-BE49-F238E27FC236}">
+                  <a16:creationId xmlns:a16="http://schemas.microsoft.com/office/drawing/2014/main" id="{810763AC-E56E-511C-01EB-3FFB1CCA76FC}"/>
+                </a:ext>
+              </a:extLst>
+            </p:cNvPr>
+            <p:cNvCxnSpPr>
+              <a:cxnSpLocks/>
+              <a:stCxn id="22" idx="3"/>
+              <a:endCxn id="40" idx="14"/>
+            </p:cNvCxnSpPr>
+            <p:nvPr/>
+          </p:nvCxnSpPr>
+          <p:spPr>
+            <a:xfrm>
+              <a:off x="5486400" y="896555"/>
+              <a:ext cx="409332" cy="432322"/>
+            </a:xfrm>
+            <a:prstGeom prst="bentConnector2">
+              <a:avLst/>
+            </a:prstGeom>
+            <a:ln w="34925">
               <a:solidFill>
-                <a:prstClr val="black"/>
+                <a:srgbClr val="C00000"/>
               </a:solidFill>
-              <a:latin typeface="Consolas" panose="020B0609020204030204" pitchFamily="49" charset="0"/>
-              <a:cs typeface="Consolas" panose="020B0609020204030204" pitchFamily="49" charset="0"/>
-            </a:endParaRPr>
-          </a:p>
-          <a:p>
-            <a:pPr defTabSz="914400">
-              <a:defRPr/>
-            </a:pPr>
-            <a:endParaRPr lang="en-US" sz="1400" dirty="0">
-              <a:solidFill>
-                <a:prstClr val="black"/>
-              </a:solidFill>
-              <a:latin typeface="Consolas" panose="020B0609020204030204" pitchFamily="49" charset="0"/>
-              <a:cs typeface="Consolas" panose="020B0609020204030204" pitchFamily="49" charset="0"/>
-            </a:endParaRPr>
-          </a:p>
-          <a:p>
-            <a:pPr defTabSz="457200">
-              <a:defRPr/>
-            </a:pPr>
-            <a:r>
-              <a:rPr lang="en-US" sz="1398" dirty="0">
-                <a:solidFill>
-                  <a:schemeClr val="accent6">
-                    <a:lumMod val="75000"/>
-                  </a:schemeClr>
-                </a:solidFill>
-                <a:latin typeface="Consolas" panose="020B0609020204030204" pitchFamily="49" charset="0"/>
-                <a:cs typeface="Consolas" panose="020B0609020204030204" pitchFamily="49" charset="0"/>
-              </a:rPr>
-              <a:t>// restore the callee-saved registers</a:t>
-            </a:r>
-          </a:p>
-          <a:p>
-            <a:pPr defTabSz="914400">
-              <a:defRPr/>
-            </a:pPr>
-            <a:r>
-              <a:rPr lang="en-US" sz="1400" dirty="0" err="1">
-                <a:solidFill>
-                  <a:prstClr val="black"/>
-                </a:solidFill>
-                <a:latin typeface="Consolas" panose="020B0609020204030204" pitchFamily="49" charset="0"/>
-                <a:cs typeface="Consolas" panose="020B0609020204030204" pitchFamily="49" charset="0"/>
-              </a:rPr>
-              <a:t>popq</a:t>
-            </a:r>
-            <a:r>
-              <a:rPr lang="en-US" sz="1400" dirty="0">
-                <a:solidFill>
-                  <a:prstClr val="black"/>
-                </a:solidFill>
-                <a:latin typeface="Consolas" panose="020B0609020204030204" pitchFamily="49" charset="0"/>
-                <a:cs typeface="Consolas" panose="020B0609020204030204" pitchFamily="49" charset="0"/>
-              </a:rPr>
-              <a:t> ...</a:t>
-            </a:r>
-          </a:p>
-          <a:p>
-            <a:pPr defTabSz="914400">
-              <a:defRPr/>
-            </a:pPr>
-            <a:endParaRPr lang="en-US" sz="500" dirty="0">
-              <a:solidFill>
-                <a:prstClr val="black"/>
-              </a:solidFill>
-              <a:latin typeface="Consolas" panose="020B0609020204030204" pitchFamily="49" charset="0"/>
-              <a:cs typeface="Consolas" panose="020B0609020204030204" pitchFamily="49" charset="0"/>
-            </a:endParaRPr>
-          </a:p>
-        </p:txBody>
-      </p:sp>
-      <p:cxnSp>
-        <p:nvCxnSpPr>
-          <p:cNvPr id="12" name="Elbow Connector 11">
-            <a:extLst>
-              <a:ext uri="{FF2B5EF4-FFF2-40B4-BE49-F238E27FC236}">
-                <a16:creationId xmlns:a16="http://schemas.microsoft.com/office/drawing/2014/main" id="{A3231205-109F-A30C-CF11-C6E1F95CDE41}"/>
-              </a:ext>
-            </a:extLst>
-          </p:cNvPr>
-          <p:cNvCxnSpPr>
-            <a:cxnSpLocks/>
-            <a:stCxn id="8" idx="3"/>
-            <a:endCxn id="13" idx="1"/>
-          </p:cNvCxnSpPr>
-          <p:nvPr/>
-        </p:nvCxnSpPr>
-        <p:spPr>
-          <a:xfrm flipV="1">
-            <a:off x="2712781" y="653495"/>
-            <a:ext cx="2334426" cy="1390305"/>
-          </a:xfrm>
-          <a:prstGeom prst="bentConnector3">
-            <a:avLst>
-              <a:gd name="adj1" fmla="val 79378"/>
-            </a:avLst>
-          </a:prstGeom>
-          <a:ln w="34925">
-            <a:prstDash val="sysDot"/>
-            <a:round/>
-            <a:tailEnd type="triangle"/>
-          </a:ln>
-        </p:spPr>
-        <p:style>
-          <a:lnRef idx="2">
-            <a:schemeClr val="accent1"/>
-          </a:lnRef>
-          <a:fillRef idx="0">
-            <a:schemeClr val="accent1"/>
-          </a:fillRef>
-          <a:effectRef idx="1">
-            <a:schemeClr val="accent1"/>
-          </a:effectRef>
-          <a:fontRef idx="minor">
-            <a:schemeClr val="tx1"/>
-          </a:fontRef>
-        </p:style>
-      </p:cxnSp>
-      <p:sp>
-        <p:nvSpPr>
-          <p:cNvPr id="14" name="TextBox 13">
-            <a:extLst>
-              <a:ext uri="{FF2B5EF4-FFF2-40B4-BE49-F238E27FC236}">
-                <a16:creationId xmlns:a16="http://schemas.microsoft.com/office/drawing/2014/main" id="{A65E88A0-512F-D08C-B8AB-6BEAC25C63D9}"/>
-              </a:ext>
-            </a:extLst>
-          </p:cNvPr>
-          <p:cNvSpPr txBox="1"/>
-          <p:nvPr/>
-        </p:nvSpPr>
-        <p:spPr>
-          <a:xfrm>
-            <a:off x="5115182" y="1988802"/>
-            <a:ext cx="3012130" cy="1921672"/>
-          </a:xfrm>
-          <a:prstGeom prst="rect">
-            <a:avLst/>
-          </a:prstGeom>
-          <a:noFill/>
-          <a:ln>
+              <a:prstDash val="sysDot"/>
+              <a:round/>
+              <a:tailEnd type="triangle"/>
+            </a:ln>
+          </p:spPr>
+          <p:style>
+            <a:lnRef idx="2">
+              <a:schemeClr val="accent1"/>
+            </a:lnRef>
+            <a:fillRef idx="0">
+              <a:schemeClr val="accent1"/>
+            </a:fillRef>
+            <a:effectRef idx="1">
+              <a:schemeClr val="accent1"/>
+            </a:effectRef>
+            <a:fontRef idx="minor">
+              <a:schemeClr val="tx1"/>
+            </a:fontRef>
+          </p:style>
+        </p:cxnSp>
+        <p:sp>
+          <p:nvSpPr>
+            <p:cNvPr id="22" name="Rectangle 21">
+              <a:extLst>
+                <a:ext uri="{FF2B5EF4-FFF2-40B4-BE49-F238E27FC236}">
+                  <a16:creationId xmlns:a16="http://schemas.microsoft.com/office/drawing/2014/main" id="{17C96EE5-C1CA-1C2F-7300-AA9E703BD53E}"/>
+                </a:ext>
+              </a:extLst>
+            </p:cNvPr>
+            <p:cNvSpPr/>
+            <p:nvPr/>
+          </p:nvSpPr>
+          <p:spPr>
+            <a:xfrm>
+              <a:off x="5128639" y="794327"/>
+              <a:ext cx="357761" cy="204455"/>
+            </a:xfrm>
+            <a:prstGeom prst="rect">
+              <a:avLst/>
+            </a:prstGeom>
             <a:solidFill>
+              <a:schemeClr val="accent1">
+                <a:alpha val="0"/>
+              </a:schemeClr>
+            </a:solidFill>
+            <a:ln>
+              <a:noFill/>
+            </a:ln>
+          </p:spPr>
+          <p:style>
+            <a:lnRef idx="2">
+              <a:schemeClr val="accent1">
+                <a:shade val="15000"/>
+              </a:schemeClr>
+            </a:lnRef>
+            <a:fillRef idx="1">
               <a:schemeClr val="accent1"/>
-            </a:solidFill>
-          </a:ln>
-        </p:spPr>
-        <p:txBody>
-          <a:bodyPr wrap="square" rtlCol="0">
-            <a:noAutofit/>
-          </a:bodyPr>
-          <a:lstStyle/>
-          <a:p>
-            <a:r>
-              <a:rPr lang="en-US" dirty="0">
-                <a:latin typeface="Times New Roman" panose="02020603050405020304" pitchFamily="18" charset="0"/>
-                <a:cs typeface="Times New Roman" panose="02020603050405020304" pitchFamily="18" charset="0"/>
-              </a:rPr>
-              <a:t>In-kernel </a:t>
-            </a:r>
-            <a:r>
-              <a:rPr lang="en-US" dirty="0" err="1">
-                <a:latin typeface="Times New Roman" panose="02020603050405020304" pitchFamily="18" charset="0"/>
-                <a:cs typeface="Times New Roman" panose="02020603050405020304" pitchFamily="18" charset="0"/>
-              </a:rPr>
-              <a:t>landingpad</a:t>
-            </a:r>
-            <a:endParaRPr lang="en-US" dirty="0">
-              <a:latin typeface="Times New Roman" panose="02020603050405020304" pitchFamily="18" charset="0"/>
-              <a:cs typeface="Times New Roman" panose="02020603050405020304" pitchFamily="18" charset="0"/>
-            </a:endParaRPr>
-          </a:p>
-          <a:p>
-            <a:endParaRPr lang="en-US" dirty="0">
-              <a:latin typeface="Times New Roman" panose="02020603050405020304" pitchFamily="18" charset="0"/>
-              <a:cs typeface="Times New Roman" panose="02020603050405020304" pitchFamily="18" charset="0"/>
-            </a:endParaRPr>
-          </a:p>
-          <a:p>
-            <a:r>
-              <a:rPr lang="en-US" sz="1400" b="1" dirty="0" err="1">
-                <a:latin typeface="Consolas" panose="020B0609020204030204" pitchFamily="49" charset="0"/>
-                <a:cs typeface="Consolas" panose="020B0609020204030204" pitchFamily="49" charset="0"/>
-              </a:rPr>
-              <a:t>rex_landingpad</a:t>
-            </a:r>
-            <a:r>
-              <a:rPr lang="en-US" sz="1400" b="1" dirty="0">
-                <a:latin typeface="Consolas" panose="020B0609020204030204" pitchFamily="49" charset="0"/>
-                <a:cs typeface="Consolas" panose="020B0609020204030204" pitchFamily="49" charset="0"/>
-              </a:rPr>
-              <a:t>:</a:t>
-            </a:r>
-          </a:p>
-          <a:p>
-            <a:r>
-              <a:rPr lang="en-US" sz="1398" dirty="0">
-                <a:solidFill>
-                  <a:schemeClr val="accent6">
-                    <a:lumMod val="75000"/>
-                  </a:schemeClr>
-                </a:solidFill>
-                <a:latin typeface="Consolas" panose="020B0609020204030204" pitchFamily="49" charset="0"/>
-                <a:cs typeface="Consolas" panose="020B0609020204030204" pitchFamily="49" charset="0"/>
-              </a:rPr>
-              <a:t>// report error</a:t>
-            </a:r>
-          </a:p>
-          <a:p>
-            <a:r>
-              <a:rPr lang="en-US" sz="1398" dirty="0">
-                <a:solidFill>
-                  <a:schemeClr val="accent6">
-                    <a:lumMod val="75000"/>
-                  </a:schemeClr>
-                </a:solidFill>
-                <a:latin typeface="Consolas" panose="020B0609020204030204" pitchFamily="49" charset="0"/>
-                <a:cs typeface="Consolas" panose="020B0609020204030204" pitchFamily="49" charset="0"/>
-              </a:rPr>
-              <a:t>// set default return value</a:t>
-            </a:r>
-          </a:p>
-          <a:p>
-            <a:r>
-              <a:rPr lang="en-US" sz="1400" dirty="0">
-                <a:latin typeface="Consolas" panose="020B0609020204030204" pitchFamily="49" charset="0"/>
-                <a:cs typeface="Consolas" panose="020B0609020204030204" pitchFamily="49" charset="0"/>
-              </a:rPr>
-              <a:t>...</a:t>
-            </a:r>
-          </a:p>
-          <a:p>
-            <a:r>
-              <a:rPr lang="en-US" sz="1400" b="1" dirty="0" err="1">
-                <a:latin typeface="Consolas" panose="020B0609020204030204" pitchFamily="49" charset="0"/>
-                <a:cs typeface="Consolas" panose="020B0609020204030204" pitchFamily="49" charset="0"/>
-              </a:rPr>
-              <a:t>jmp</a:t>
-            </a:r>
-            <a:r>
-              <a:rPr lang="en-US" sz="1400" b="1" dirty="0">
-                <a:latin typeface="Consolas" panose="020B0609020204030204" pitchFamily="49" charset="0"/>
-                <a:cs typeface="Consolas" panose="020B0609020204030204" pitchFamily="49" charset="0"/>
-              </a:rPr>
-              <a:t> </a:t>
-            </a:r>
-            <a:r>
-              <a:rPr lang="en-US" sz="1400" b="1" dirty="0" err="1">
-                <a:latin typeface="Consolas" panose="020B0609020204030204" pitchFamily="49" charset="0"/>
-                <a:cs typeface="Consolas" panose="020B0609020204030204" pitchFamily="49" charset="0"/>
-              </a:rPr>
-              <a:t>rex_exit</a:t>
-            </a:r>
-            <a:endParaRPr lang="en-US" sz="1400" b="1" dirty="0">
-              <a:latin typeface="Consolas" panose="020B0609020204030204" pitchFamily="49" charset="0"/>
-              <a:cs typeface="Consolas" panose="020B0609020204030204" pitchFamily="49" charset="0"/>
-            </a:endParaRPr>
-          </a:p>
-        </p:txBody>
-      </p:sp>
-      <p:cxnSp>
-        <p:nvCxnSpPr>
-          <p:cNvPr id="25" name="Elbow Connector 24">
-            <a:extLst>
-              <a:ext uri="{FF2B5EF4-FFF2-40B4-BE49-F238E27FC236}">
-                <a16:creationId xmlns:a16="http://schemas.microsoft.com/office/drawing/2014/main" id="{2F54CABE-64E2-06DB-D490-8B90FE20D1FD}"/>
-              </a:ext>
-            </a:extLst>
-          </p:cNvPr>
-          <p:cNvCxnSpPr>
-            <a:cxnSpLocks/>
-            <a:stCxn id="40" idx="10"/>
-            <a:endCxn id="9" idx="1"/>
-          </p:cNvCxnSpPr>
-          <p:nvPr/>
-        </p:nvCxnSpPr>
-        <p:spPr>
-          <a:xfrm rot="10800000" flipV="1">
-            <a:off x="5182428" y="1641927"/>
-            <a:ext cx="79829" cy="1058831"/>
-          </a:xfrm>
-          <a:prstGeom prst="bentConnector3">
-            <a:avLst>
-              <a:gd name="adj1" fmla="val 490493"/>
-            </a:avLst>
-          </a:prstGeom>
-          <a:ln w="34925">
-            <a:solidFill>
-              <a:srgbClr val="C00000"/>
-            </a:solidFill>
-            <a:prstDash val="sysDot"/>
-            <a:round/>
-            <a:tailEnd type="triangle"/>
-          </a:ln>
-        </p:spPr>
-        <p:style>
-          <a:lnRef idx="2">
-            <a:schemeClr val="accent1"/>
-          </a:lnRef>
-          <a:fillRef idx="0">
-            <a:schemeClr val="accent1"/>
-          </a:fillRef>
-          <a:effectRef idx="1">
-            <a:schemeClr val="accent1"/>
-          </a:effectRef>
-          <a:fontRef idx="minor">
-            <a:schemeClr val="tx1"/>
-          </a:fontRef>
-        </p:style>
-      </p:cxnSp>
-      <p:cxnSp>
-        <p:nvCxnSpPr>
-          <p:cNvPr id="30" name="Elbow Connector 29">
-            <a:extLst>
-              <a:ext uri="{FF2B5EF4-FFF2-40B4-BE49-F238E27FC236}">
-                <a16:creationId xmlns:a16="http://schemas.microsoft.com/office/drawing/2014/main" id="{C8356E87-ED45-E11E-3550-C91B39E5519C}"/>
-              </a:ext>
-            </a:extLst>
-          </p:cNvPr>
-          <p:cNvCxnSpPr>
-            <a:cxnSpLocks/>
-            <a:stCxn id="17" idx="1"/>
-            <a:endCxn id="35" idx="3"/>
-          </p:cNvCxnSpPr>
-          <p:nvPr/>
-        </p:nvCxnSpPr>
-        <p:spPr>
-          <a:xfrm rot="10800000">
-            <a:off x="1107947" y="2575190"/>
-            <a:ext cx="4074482" cy="1003934"/>
-          </a:xfrm>
-          <a:prstGeom prst="bentConnector3">
-            <a:avLst>
-              <a:gd name="adj1" fmla="val 15347"/>
-            </a:avLst>
-          </a:prstGeom>
-          <a:ln w="34925">
-            <a:solidFill>
-              <a:srgbClr val="C00000"/>
-            </a:solidFill>
-            <a:prstDash val="sysDot"/>
-            <a:round/>
-            <a:tailEnd type="triangle"/>
-          </a:ln>
-        </p:spPr>
-        <p:style>
-          <a:lnRef idx="2">
-            <a:schemeClr val="accent1"/>
-          </a:lnRef>
-          <a:fillRef idx="0">
-            <a:schemeClr val="accent1"/>
-          </a:fillRef>
-          <a:effectRef idx="1">
-            <a:schemeClr val="accent1"/>
-          </a:effectRef>
-          <a:fontRef idx="minor">
-            <a:schemeClr val="tx1"/>
-          </a:fontRef>
-        </p:style>
-      </p:cxnSp>
-      <p:sp>
-        <p:nvSpPr>
-          <p:cNvPr id="40" name="16-Point Star 39">
-            <a:extLst>
-              <a:ext uri="{FF2B5EF4-FFF2-40B4-BE49-F238E27FC236}">
-                <a16:creationId xmlns:a16="http://schemas.microsoft.com/office/drawing/2014/main" id="{E0C00056-8436-14D3-AF56-F2F1B14659C5}"/>
-              </a:ext>
-            </a:extLst>
-          </p:cNvPr>
-          <p:cNvSpPr/>
-          <p:nvPr/>
-        </p:nvSpPr>
-        <p:spPr>
-          <a:xfrm>
-            <a:off x="5262256" y="1328877"/>
-            <a:ext cx="1266951" cy="626102"/>
-          </a:xfrm>
-          <a:prstGeom prst="star16">
-            <a:avLst/>
-          </a:prstGeom>
-          <a:solidFill>
-            <a:srgbClr val="FFFF00"/>
-          </a:solidFill>
-        </p:spPr>
-        <p:style>
-          <a:lnRef idx="2">
-            <a:schemeClr val="accent1">
-              <a:shade val="15000"/>
-            </a:schemeClr>
-          </a:lnRef>
-          <a:fillRef idx="1">
-            <a:schemeClr val="accent1"/>
-          </a:fillRef>
-          <a:effectRef idx="0">
-            <a:schemeClr val="accent1"/>
-          </a:effectRef>
-          <a:fontRef idx="minor">
-            <a:schemeClr val="lt1"/>
-          </a:fontRef>
-        </p:style>
-        <p:txBody>
-          <a:bodyPr rtlCol="0" anchor="ctr"/>
-          <a:lstStyle/>
-          <a:p>
-            <a:pPr algn="ctr"/>
-            <a:r>
-              <a:rPr lang="en-US" sz="1600" dirty="0">
-                <a:solidFill>
-                  <a:schemeClr val="tx1"/>
-                </a:solidFill>
-              </a:rPr>
-              <a:t>Panic</a:t>
-            </a:r>
-            <a:endParaRPr lang="en-US" sz="1600" dirty="0"/>
-          </a:p>
-        </p:txBody>
-      </p:sp>
-      <p:sp>
-        <p:nvSpPr>
-          <p:cNvPr id="9" name="Rectangle 8">
-            <a:extLst>
-              <a:ext uri="{FF2B5EF4-FFF2-40B4-BE49-F238E27FC236}">
-                <a16:creationId xmlns:a16="http://schemas.microsoft.com/office/drawing/2014/main" id="{5EDB9AA2-1D81-1C8E-BD4D-8E31340F0699}"/>
-              </a:ext>
-            </a:extLst>
-          </p:cNvPr>
-          <p:cNvSpPr/>
-          <p:nvPr/>
-        </p:nvSpPr>
-        <p:spPr>
-          <a:xfrm>
-            <a:off x="5182427" y="2575190"/>
-            <a:ext cx="1540921" cy="251137"/>
-          </a:xfrm>
-          <a:prstGeom prst="rect">
-            <a:avLst/>
-          </a:prstGeom>
-          <a:solidFill>
-            <a:schemeClr val="accent1">
-              <a:alpha val="0"/>
-            </a:schemeClr>
-          </a:solidFill>
-          <a:ln>
-            <a:noFill/>
-          </a:ln>
-        </p:spPr>
-        <p:style>
-          <a:lnRef idx="2">
-            <a:schemeClr val="accent1">
-              <a:shade val="15000"/>
-            </a:schemeClr>
-          </a:lnRef>
-          <a:fillRef idx="1">
-            <a:schemeClr val="accent1"/>
-          </a:fillRef>
-          <a:effectRef idx="0">
-            <a:schemeClr val="accent1"/>
-          </a:effectRef>
-          <a:fontRef idx="minor">
-            <a:schemeClr val="lt1"/>
-          </a:fontRef>
-        </p:style>
-        <p:txBody>
-          <a:bodyPr rtlCol="0" anchor="ctr"/>
-          <a:lstStyle/>
-          <a:p>
-            <a:pPr algn="ctr"/>
-            <a:endParaRPr lang="en-US" dirty="0"/>
-          </a:p>
-        </p:txBody>
-      </p:sp>
-      <p:cxnSp>
-        <p:nvCxnSpPr>
-          <p:cNvPr id="15" name="Elbow Connector 14">
-            <a:extLst>
-              <a:ext uri="{FF2B5EF4-FFF2-40B4-BE49-F238E27FC236}">
-                <a16:creationId xmlns:a16="http://schemas.microsoft.com/office/drawing/2014/main" id="{810763AC-E56E-511C-01EB-3FFB1CCA76FC}"/>
-              </a:ext>
-            </a:extLst>
-          </p:cNvPr>
-          <p:cNvCxnSpPr>
-            <a:cxnSpLocks/>
-            <a:stCxn id="22" idx="3"/>
-            <a:endCxn id="40" idx="14"/>
-          </p:cNvCxnSpPr>
-          <p:nvPr/>
-        </p:nvCxnSpPr>
-        <p:spPr>
-          <a:xfrm>
-            <a:off x="5486400" y="896555"/>
-            <a:ext cx="409332" cy="432322"/>
-          </a:xfrm>
-          <a:prstGeom prst="bentConnector2">
-            <a:avLst/>
-          </a:prstGeom>
-          <a:ln w="34925">
-            <a:solidFill>
-              <a:srgbClr val="C00000"/>
-            </a:solidFill>
-            <a:prstDash val="sysDot"/>
-            <a:round/>
-            <a:tailEnd type="triangle"/>
-          </a:ln>
-        </p:spPr>
-        <p:style>
-          <a:lnRef idx="2">
-            <a:schemeClr val="accent1"/>
-          </a:lnRef>
-          <a:fillRef idx="0">
-            <a:schemeClr val="accent1"/>
-          </a:fillRef>
-          <a:effectRef idx="1">
-            <a:schemeClr val="accent1"/>
-          </a:effectRef>
-          <a:fontRef idx="minor">
-            <a:schemeClr val="tx1"/>
-          </a:fontRef>
-        </p:style>
-      </p:cxnSp>
-      <p:sp>
-        <p:nvSpPr>
-          <p:cNvPr id="22" name="Rectangle 21">
-            <a:extLst>
-              <a:ext uri="{FF2B5EF4-FFF2-40B4-BE49-F238E27FC236}">
-                <a16:creationId xmlns:a16="http://schemas.microsoft.com/office/drawing/2014/main" id="{17C96EE5-C1CA-1C2F-7300-AA9E703BD53E}"/>
-              </a:ext>
-            </a:extLst>
-          </p:cNvPr>
-          <p:cNvSpPr/>
-          <p:nvPr/>
-        </p:nvSpPr>
-        <p:spPr>
-          <a:xfrm>
-            <a:off x="5128639" y="794327"/>
-            <a:ext cx="357761" cy="204455"/>
-          </a:xfrm>
-          <a:prstGeom prst="rect">
-            <a:avLst/>
-          </a:prstGeom>
-          <a:solidFill>
-            <a:schemeClr val="accent1">
-              <a:alpha val="0"/>
-            </a:schemeClr>
-          </a:solidFill>
-          <a:ln>
-            <a:noFill/>
-          </a:ln>
-        </p:spPr>
-        <p:style>
-          <a:lnRef idx="2">
-            <a:schemeClr val="accent1">
-              <a:shade val="15000"/>
-            </a:schemeClr>
-          </a:lnRef>
-          <a:fillRef idx="1">
-            <a:schemeClr val="accent1"/>
-          </a:fillRef>
-          <a:effectRef idx="0">
-            <a:schemeClr val="accent1"/>
-          </a:effectRef>
-          <a:fontRef idx="minor">
-            <a:schemeClr val="lt1"/>
-          </a:fontRef>
-        </p:style>
-        <p:txBody>
-          <a:bodyPr rtlCol="0" anchor="ctr"/>
-          <a:lstStyle/>
-          <a:p>
-            <a:pPr algn="ctr"/>
-            <a:endParaRPr lang="en-US"/>
-          </a:p>
-        </p:txBody>
-      </p:sp>
+            </a:fillRef>
+            <a:effectRef idx="0">
+              <a:schemeClr val="accent1"/>
+            </a:effectRef>
+            <a:fontRef idx="minor">
+              <a:schemeClr val="lt1"/>
+            </a:fontRef>
+          </p:style>
+          <p:txBody>
+            <a:bodyPr rtlCol="0" anchor="ctr"/>
+            <a:lstStyle/>
+            <a:p>
+              <a:pPr algn="ctr"/>
+              <a:endParaRPr lang="en-US"/>
+            </a:p>
+          </p:txBody>
+        </p:sp>
+      </p:grpSp>
     </p:spTree>
     <p:extLst>
       <p:ext uri="{BB962C8B-B14F-4D97-AF65-F5344CB8AC3E}">

</xml_diff>

<commit_message>
Add panic handler for exception fig
</commit_message>
<xml_diff>
--- a/figs/exception_handling.pptx
+++ b/figs/exception_handling.pptx
@@ -2,12 +2,12 @@
 <file path=ppt/presentation.xml><?xml version="1.0" encoding="utf-8"?>
 <p:presentation xmlns:a="http://schemas.openxmlformats.org/drawingml/2006/main" xmlns:r="http://schemas.openxmlformats.org/officeDocument/2006/relationships" xmlns:p="http://schemas.openxmlformats.org/presentationml/2006/main" saveSubsetFonts="1" autoCompressPictures="0">
   <p:sldMasterIdLst>
-    <p:sldMasterId id="2147483672" r:id="rId1"/>
+    <p:sldMasterId id="2147483708" r:id="rId1"/>
   </p:sldMasterIdLst>
   <p:sldIdLst>
     <p:sldId id="256" r:id="rId2"/>
   </p:sldIdLst>
-  <p:sldSz cx="8229600" cy="4114800"/>
+  <p:sldSz cx="9144000" cy="4754563"/>
   <p:notesSz cx="6858000" cy="9144000"/>
   <p:defaultTextStyle>
     <a:defPPr>
@@ -141,15 +141,15 @@
         </p:nvSpPr>
         <p:spPr>
           <a:xfrm>
-            <a:off x="1028700" y="673418"/>
-            <a:ext cx="6172200" cy="1432560"/>
+            <a:off x="1143000" y="778120"/>
+            <a:ext cx="6858000" cy="1655292"/>
           </a:xfrm>
         </p:spPr>
         <p:txBody>
           <a:bodyPr anchor="b"/>
           <a:lstStyle>
             <a:lvl1pPr algn="ctr">
-              <a:defRPr sz="3600"/>
+              <a:defRPr sz="4160"/>
             </a:lvl1pPr>
           </a:lstStyle>
           <a:p>
@@ -173,8 +173,8 @@
         </p:nvSpPr>
         <p:spPr>
           <a:xfrm>
-            <a:off x="1028700" y="2161223"/>
-            <a:ext cx="6172200" cy="993457"/>
+            <a:off x="1143000" y="2497247"/>
+            <a:ext cx="6858000" cy="1147918"/>
           </a:xfrm>
         </p:spPr>
         <p:txBody>
@@ -182,39 +182,39 @@
           <a:lstStyle>
             <a:lvl1pPr marL="0" indent="0" algn="ctr">
               <a:buNone/>
-              <a:defRPr sz="1440"/>
+              <a:defRPr sz="1664"/>
             </a:lvl1pPr>
-            <a:lvl2pPr marL="274320" indent="0" algn="ctr">
-              <a:buNone/>
-              <a:defRPr sz="1200"/>
+            <a:lvl2pPr marL="316977" indent="0" algn="ctr">
+              <a:buNone/>
+              <a:defRPr sz="1387"/>
             </a:lvl2pPr>
-            <a:lvl3pPr marL="548640" indent="0" algn="ctr">
-              <a:buNone/>
-              <a:defRPr sz="1080"/>
+            <a:lvl3pPr marL="633954" indent="0" algn="ctr">
+              <a:buNone/>
+              <a:defRPr sz="1248"/>
             </a:lvl3pPr>
-            <a:lvl4pPr marL="822960" indent="0" algn="ctr">
-              <a:buNone/>
-              <a:defRPr sz="960"/>
+            <a:lvl4pPr marL="950930" indent="0" algn="ctr">
+              <a:buNone/>
+              <a:defRPr sz="1109"/>
             </a:lvl4pPr>
-            <a:lvl5pPr marL="1097280" indent="0" algn="ctr">
-              <a:buNone/>
-              <a:defRPr sz="960"/>
+            <a:lvl5pPr marL="1267907" indent="0" algn="ctr">
+              <a:buNone/>
+              <a:defRPr sz="1109"/>
             </a:lvl5pPr>
-            <a:lvl6pPr marL="1371600" indent="0" algn="ctr">
-              <a:buNone/>
-              <a:defRPr sz="960"/>
+            <a:lvl6pPr marL="1584884" indent="0" algn="ctr">
+              <a:buNone/>
+              <a:defRPr sz="1109"/>
             </a:lvl6pPr>
-            <a:lvl7pPr marL="1645920" indent="0" algn="ctr">
-              <a:buNone/>
-              <a:defRPr sz="960"/>
+            <a:lvl7pPr marL="1901861" indent="0" algn="ctr">
+              <a:buNone/>
+              <a:defRPr sz="1109"/>
             </a:lvl7pPr>
-            <a:lvl8pPr marL="1920240" indent="0" algn="ctr">
-              <a:buNone/>
-              <a:defRPr sz="960"/>
+            <a:lvl8pPr marL="2218837" indent="0" algn="ctr">
+              <a:buNone/>
+              <a:defRPr sz="1109"/>
             </a:lvl8pPr>
-            <a:lvl9pPr marL="2194560" indent="0" algn="ctr">
-              <a:buNone/>
-              <a:defRPr sz="960"/>
+            <a:lvl9pPr marL="2535814" indent="0" algn="ctr">
+              <a:buNone/>
+              <a:defRPr sz="1109"/>
             </a:lvl9pPr>
           </a:lstStyle>
           <a:p>
@@ -243,7 +243,7 @@
           <a:p>
             <a:fld id="{88D6F949-A4F1-0042-881D-6E96888E80B7}" type="datetimeFigureOut">
               <a:rPr lang="en-US" smtClean="0"/>
-              <a:t>4/17/24</a:t>
+              <a:t>4/18/24</a:t>
             </a:fld>
             <a:endParaRPr lang="en-US"/>
           </a:p>
@@ -294,7 +294,7 @@
     </p:spTree>
     <p:extLst>
       <p:ext uri="{BB962C8B-B14F-4D97-AF65-F5344CB8AC3E}">
-        <p14:creationId xmlns:p14="http://schemas.microsoft.com/office/powerpoint/2010/main" val="478280549"/>
+        <p14:creationId xmlns:p14="http://schemas.microsoft.com/office/powerpoint/2010/main" val="3268369724"/>
       </p:ext>
     </p:extLst>
   </p:cSld>
@@ -413,7 +413,7 @@
           <a:p>
             <a:fld id="{88D6F949-A4F1-0042-881D-6E96888E80B7}" type="datetimeFigureOut">
               <a:rPr lang="en-US" smtClean="0"/>
-              <a:t>4/17/24</a:t>
+              <a:t>4/18/24</a:t>
             </a:fld>
             <a:endParaRPr lang="en-US"/>
           </a:p>
@@ -464,7 +464,7 @@
     </p:spTree>
     <p:extLst>
       <p:ext uri="{BB962C8B-B14F-4D97-AF65-F5344CB8AC3E}">
-        <p14:creationId xmlns:p14="http://schemas.microsoft.com/office/powerpoint/2010/main" val="3935492441"/>
+        <p14:creationId xmlns:p14="http://schemas.microsoft.com/office/powerpoint/2010/main" val="1189472376"/>
       </p:ext>
     </p:extLst>
   </p:cSld>
@@ -503,8 +503,8 @@
         </p:nvSpPr>
         <p:spPr>
           <a:xfrm>
-            <a:off x="5889307" y="219075"/>
-            <a:ext cx="1774508" cy="3487103"/>
+            <a:off x="6543675" y="253137"/>
+            <a:ext cx="1971675" cy="4029272"/>
           </a:xfrm>
         </p:spPr>
         <p:txBody>
@@ -531,8 +531,8 @@
         </p:nvSpPr>
         <p:spPr>
           <a:xfrm>
-            <a:off x="565785" y="219075"/>
-            <a:ext cx="5220653" cy="3487103"/>
+            <a:off x="628650" y="253137"/>
+            <a:ext cx="5800725" cy="4029272"/>
           </a:xfrm>
         </p:spPr>
         <p:txBody>
@@ -593,7 +593,7 @@
           <a:p>
             <a:fld id="{88D6F949-A4F1-0042-881D-6E96888E80B7}" type="datetimeFigureOut">
               <a:rPr lang="en-US" smtClean="0"/>
-              <a:t>4/17/24</a:t>
+              <a:t>4/18/24</a:t>
             </a:fld>
             <a:endParaRPr lang="en-US"/>
           </a:p>
@@ -644,7 +644,7 @@
     </p:spTree>
     <p:extLst>
       <p:ext uri="{BB962C8B-B14F-4D97-AF65-F5344CB8AC3E}">
-        <p14:creationId xmlns:p14="http://schemas.microsoft.com/office/powerpoint/2010/main" val="3375561132"/>
+        <p14:creationId xmlns:p14="http://schemas.microsoft.com/office/powerpoint/2010/main" val="1896532530"/>
       </p:ext>
     </p:extLst>
   </p:cSld>
@@ -763,7 +763,7 @@
           <a:p>
             <a:fld id="{88D6F949-A4F1-0042-881D-6E96888E80B7}" type="datetimeFigureOut">
               <a:rPr lang="en-US" smtClean="0"/>
-              <a:t>4/17/24</a:t>
+              <a:t>4/18/24</a:t>
             </a:fld>
             <a:endParaRPr lang="en-US"/>
           </a:p>
@@ -814,7 +814,7 @@
     </p:spTree>
     <p:extLst>
       <p:ext uri="{BB962C8B-B14F-4D97-AF65-F5344CB8AC3E}">
-        <p14:creationId xmlns:p14="http://schemas.microsoft.com/office/powerpoint/2010/main" val="1033543283"/>
+        <p14:creationId xmlns:p14="http://schemas.microsoft.com/office/powerpoint/2010/main" val="1821776340"/>
       </p:ext>
     </p:extLst>
   </p:cSld>
@@ -853,15 +853,15 @@
         </p:nvSpPr>
         <p:spPr>
           <a:xfrm>
-            <a:off x="561499" y="1025843"/>
-            <a:ext cx="7098030" cy="1711642"/>
+            <a:off x="623887" y="1185340"/>
+            <a:ext cx="7886700" cy="1977766"/>
           </a:xfrm>
         </p:spPr>
         <p:txBody>
           <a:bodyPr anchor="b"/>
           <a:lstStyle>
             <a:lvl1pPr>
-              <a:defRPr sz="3600"/>
+              <a:defRPr sz="4160"/>
             </a:lvl1pPr>
           </a:lstStyle>
           <a:p>
@@ -885,8 +885,8 @@
         </p:nvSpPr>
         <p:spPr>
           <a:xfrm>
-            <a:off x="561499" y="2753678"/>
-            <a:ext cx="7098030" cy="900112"/>
+            <a:off x="623887" y="3181816"/>
+            <a:ext cx="7886700" cy="1040060"/>
           </a:xfrm>
         </p:spPr>
         <p:txBody>
@@ -894,7 +894,7 @@
           <a:lstStyle>
             <a:lvl1pPr marL="0" indent="0">
               <a:buNone/>
-              <a:defRPr sz="1440">
+              <a:defRPr sz="1664">
                 <a:solidFill>
                   <a:schemeClr val="tx1">
                     <a:tint val="82000"/>
@@ -902,9 +902,9 @@
                 </a:solidFill>
               </a:defRPr>
             </a:lvl1pPr>
-            <a:lvl2pPr marL="274320" indent="0">
-              <a:buNone/>
-              <a:defRPr sz="1200">
+            <a:lvl2pPr marL="316977" indent="0">
+              <a:buNone/>
+              <a:defRPr sz="1387">
                 <a:solidFill>
                   <a:schemeClr val="tx1">
                     <a:tint val="82000"/>
@@ -912,9 +912,9 @@
                 </a:solidFill>
               </a:defRPr>
             </a:lvl2pPr>
-            <a:lvl3pPr marL="548640" indent="0">
-              <a:buNone/>
-              <a:defRPr sz="1080">
+            <a:lvl3pPr marL="633954" indent="0">
+              <a:buNone/>
+              <a:defRPr sz="1248">
                 <a:solidFill>
                   <a:schemeClr val="tx1">
                     <a:tint val="82000"/>
@@ -922,9 +922,9 @@
                 </a:solidFill>
               </a:defRPr>
             </a:lvl3pPr>
-            <a:lvl4pPr marL="822960" indent="0">
-              <a:buNone/>
-              <a:defRPr sz="960">
+            <a:lvl4pPr marL="950930" indent="0">
+              <a:buNone/>
+              <a:defRPr sz="1109">
                 <a:solidFill>
                   <a:schemeClr val="tx1">
                     <a:tint val="82000"/>
@@ -932,9 +932,9 @@
                 </a:solidFill>
               </a:defRPr>
             </a:lvl4pPr>
-            <a:lvl5pPr marL="1097280" indent="0">
-              <a:buNone/>
-              <a:defRPr sz="960">
+            <a:lvl5pPr marL="1267907" indent="0">
+              <a:buNone/>
+              <a:defRPr sz="1109">
                 <a:solidFill>
                   <a:schemeClr val="tx1">
                     <a:tint val="82000"/>
@@ -942,9 +942,9 @@
                 </a:solidFill>
               </a:defRPr>
             </a:lvl5pPr>
-            <a:lvl6pPr marL="1371600" indent="0">
-              <a:buNone/>
-              <a:defRPr sz="960">
+            <a:lvl6pPr marL="1584884" indent="0">
+              <a:buNone/>
+              <a:defRPr sz="1109">
                 <a:solidFill>
                   <a:schemeClr val="tx1">
                     <a:tint val="82000"/>
@@ -952,9 +952,9 @@
                 </a:solidFill>
               </a:defRPr>
             </a:lvl6pPr>
-            <a:lvl7pPr marL="1645920" indent="0">
-              <a:buNone/>
-              <a:defRPr sz="960">
+            <a:lvl7pPr marL="1901861" indent="0">
+              <a:buNone/>
+              <a:defRPr sz="1109">
                 <a:solidFill>
                   <a:schemeClr val="tx1">
                     <a:tint val="82000"/>
@@ -962,9 +962,9 @@
                 </a:solidFill>
               </a:defRPr>
             </a:lvl7pPr>
-            <a:lvl8pPr marL="1920240" indent="0">
-              <a:buNone/>
-              <a:defRPr sz="960">
+            <a:lvl8pPr marL="2218837" indent="0">
+              <a:buNone/>
+              <a:defRPr sz="1109">
                 <a:solidFill>
                   <a:schemeClr val="tx1">
                     <a:tint val="82000"/>
@@ -972,9 +972,9 @@
                 </a:solidFill>
               </a:defRPr>
             </a:lvl8pPr>
-            <a:lvl9pPr marL="2194560" indent="0">
-              <a:buNone/>
-              <a:defRPr sz="960">
+            <a:lvl9pPr marL="2535814" indent="0">
+              <a:buNone/>
+              <a:defRPr sz="1109">
                 <a:solidFill>
                   <a:schemeClr val="tx1">
                     <a:tint val="82000"/>
@@ -1009,7 +1009,7 @@
           <a:p>
             <a:fld id="{88D6F949-A4F1-0042-881D-6E96888E80B7}" type="datetimeFigureOut">
               <a:rPr lang="en-US" smtClean="0"/>
-              <a:t>4/17/24</a:t>
+              <a:t>4/18/24</a:t>
             </a:fld>
             <a:endParaRPr lang="en-US"/>
           </a:p>
@@ -1060,7 +1060,7 @@
     </p:spTree>
     <p:extLst>
       <p:ext uri="{BB962C8B-B14F-4D97-AF65-F5344CB8AC3E}">
-        <p14:creationId xmlns:p14="http://schemas.microsoft.com/office/powerpoint/2010/main" val="2728658535"/>
+        <p14:creationId xmlns:p14="http://schemas.microsoft.com/office/powerpoint/2010/main" val="584033224"/>
       </p:ext>
     </p:extLst>
   </p:cSld>
@@ -1122,8 +1122,8 @@
         </p:nvSpPr>
         <p:spPr>
           <a:xfrm>
-            <a:off x="565785" y="1095375"/>
-            <a:ext cx="3497580" cy="2610803"/>
+            <a:off x="628650" y="1265682"/>
+            <a:ext cx="3886200" cy="3016727"/>
           </a:xfrm>
         </p:spPr>
         <p:txBody>
@@ -1179,8 +1179,8 @@
         </p:nvSpPr>
         <p:spPr>
           <a:xfrm>
-            <a:off x="4166235" y="1095375"/>
-            <a:ext cx="3497580" cy="2610803"/>
+            <a:off x="4629150" y="1265682"/>
+            <a:ext cx="3886200" cy="3016727"/>
           </a:xfrm>
         </p:spPr>
         <p:txBody>
@@ -1241,7 +1241,7 @@
           <a:p>
             <a:fld id="{88D6F949-A4F1-0042-881D-6E96888E80B7}" type="datetimeFigureOut">
               <a:rPr lang="en-US" smtClean="0"/>
-              <a:t>4/17/24</a:t>
+              <a:t>4/18/24</a:t>
             </a:fld>
             <a:endParaRPr lang="en-US"/>
           </a:p>
@@ -1292,7 +1292,7 @@
     </p:spTree>
     <p:extLst>
       <p:ext uri="{BB962C8B-B14F-4D97-AF65-F5344CB8AC3E}">
-        <p14:creationId xmlns:p14="http://schemas.microsoft.com/office/powerpoint/2010/main" val="3478892021"/>
+        <p14:creationId xmlns:p14="http://schemas.microsoft.com/office/powerpoint/2010/main" val="3857217388"/>
       </p:ext>
     </p:extLst>
   </p:cSld>
@@ -1331,8 +1331,8 @@
         </p:nvSpPr>
         <p:spPr>
           <a:xfrm>
-            <a:off x="566857" y="219075"/>
-            <a:ext cx="7098030" cy="795338"/>
+            <a:off x="629841" y="253137"/>
+            <a:ext cx="7886700" cy="918996"/>
           </a:xfrm>
         </p:spPr>
         <p:txBody>
@@ -1359,8 +1359,8 @@
         </p:nvSpPr>
         <p:spPr>
           <a:xfrm>
-            <a:off x="566857" y="1008698"/>
-            <a:ext cx="3481506" cy="494347"/>
+            <a:off x="629842" y="1165528"/>
+            <a:ext cx="3868340" cy="571208"/>
           </a:xfrm>
         </p:spPr>
         <p:txBody>
@@ -1368,39 +1368,39 @@
           <a:lstStyle>
             <a:lvl1pPr marL="0" indent="0">
               <a:buNone/>
-              <a:defRPr sz="1440" b="1"/>
+              <a:defRPr sz="1664" b="1"/>
             </a:lvl1pPr>
-            <a:lvl2pPr marL="274320" indent="0">
-              <a:buNone/>
-              <a:defRPr sz="1200" b="1"/>
+            <a:lvl2pPr marL="316977" indent="0">
+              <a:buNone/>
+              <a:defRPr sz="1387" b="1"/>
             </a:lvl2pPr>
-            <a:lvl3pPr marL="548640" indent="0">
-              <a:buNone/>
-              <a:defRPr sz="1080" b="1"/>
+            <a:lvl3pPr marL="633954" indent="0">
+              <a:buNone/>
+              <a:defRPr sz="1248" b="1"/>
             </a:lvl3pPr>
-            <a:lvl4pPr marL="822960" indent="0">
-              <a:buNone/>
-              <a:defRPr sz="960" b="1"/>
+            <a:lvl4pPr marL="950930" indent="0">
+              <a:buNone/>
+              <a:defRPr sz="1109" b="1"/>
             </a:lvl4pPr>
-            <a:lvl5pPr marL="1097280" indent="0">
-              <a:buNone/>
-              <a:defRPr sz="960" b="1"/>
+            <a:lvl5pPr marL="1267907" indent="0">
+              <a:buNone/>
+              <a:defRPr sz="1109" b="1"/>
             </a:lvl5pPr>
-            <a:lvl6pPr marL="1371600" indent="0">
-              <a:buNone/>
-              <a:defRPr sz="960" b="1"/>
+            <a:lvl6pPr marL="1584884" indent="0">
+              <a:buNone/>
+              <a:defRPr sz="1109" b="1"/>
             </a:lvl6pPr>
-            <a:lvl7pPr marL="1645920" indent="0">
-              <a:buNone/>
-              <a:defRPr sz="960" b="1"/>
+            <a:lvl7pPr marL="1901861" indent="0">
+              <a:buNone/>
+              <a:defRPr sz="1109" b="1"/>
             </a:lvl7pPr>
-            <a:lvl8pPr marL="1920240" indent="0">
-              <a:buNone/>
-              <a:defRPr sz="960" b="1"/>
+            <a:lvl8pPr marL="2218837" indent="0">
+              <a:buNone/>
+              <a:defRPr sz="1109" b="1"/>
             </a:lvl8pPr>
-            <a:lvl9pPr marL="2194560" indent="0">
-              <a:buNone/>
-              <a:defRPr sz="960" b="1"/>
+            <a:lvl9pPr marL="2535814" indent="0">
+              <a:buNone/>
+              <a:defRPr sz="1109" b="1"/>
             </a:lvl9pPr>
           </a:lstStyle>
           <a:p>
@@ -1424,8 +1424,8 @@
         </p:nvSpPr>
         <p:spPr>
           <a:xfrm>
-            <a:off x="566857" y="1503045"/>
-            <a:ext cx="3481506" cy="2210753"/>
+            <a:off x="629842" y="1736736"/>
+            <a:ext cx="3868340" cy="2554477"/>
           </a:xfrm>
         </p:spPr>
         <p:txBody>
@@ -1481,8 +1481,8 @@
         </p:nvSpPr>
         <p:spPr>
           <a:xfrm>
-            <a:off x="4166235" y="1008698"/>
-            <a:ext cx="3498652" cy="494347"/>
+            <a:off x="4629150" y="1165528"/>
+            <a:ext cx="3887391" cy="571208"/>
           </a:xfrm>
         </p:spPr>
         <p:txBody>
@@ -1490,39 +1490,39 @@
           <a:lstStyle>
             <a:lvl1pPr marL="0" indent="0">
               <a:buNone/>
-              <a:defRPr sz="1440" b="1"/>
+              <a:defRPr sz="1664" b="1"/>
             </a:lvl1pPr>
-            <a:lvl2pPr marL="274320" indent="0">
-              <a:buNone/>
-              <a:defRPr sz="1200" b="1"/>
+            <a:lvl2pPr marL="316977" indent="0">
+              <a:buNone/>
+              <a:defRPr sz="1387" b="1"/>
             </a:lvl2pPr>
-            <a:lvl3pPr marL="548640" indent="0">
-              <a:buNone/>
-              <a:defRPr sz="1080" b="1"/>
+            <a:lvl3pPr marL="633954" indent="0">
+              <a:buNone/>
+              <a:defRPr sz="1248" b="1"/>
             </a:lvl3pPr>
-            <a:lvl4pPr marL="822960" indent="0">
-              <a:buNone/>
-              <a:defRPr sz="960" b="1"/>
+            <a:lvl4pPr marL="950930" indent="0">
+              <a:buNone/>
+              <a:defRPr sz="1109" b="1"/>
             </a:lvl4pPr>
-            <a:lvl5pPr marL="1097280" indent="0">
-              <a:buNone/>
-              <a:defRPr sz="960" b="1"/>
+            <a:lvl5pPr marL="1267907" indent="0">
+              <a:buNone/>
+              <a:defRPr sz="1109" b="1"/>
             </a:lvl5pPr>
-            <a:lvl6pPr marL="1371600" indent="0">
-              <a:buNone/>
-              <a:defRPr sz="960" b="1"/>
+            <a:lvl6pPr marL="1584884" indent="0">
+              <a:buNone/>
+              <a:defRPr sz="1109" b="1"/>
             </a:lvl6pPr>
-            <a:lvl7pPr marL="1645920" indent="0">
-              <a:buNone/>
-              <a:defRPr sz="960" b="1"/>
+            <a:lvl7pPr marL="1901861" indent="0">
+              <a:buNone/>
+              <a:defRPr sz="1109" b="1"/>
             </a:lvl7pPr>
-            <a:lvl8pPr marL="1920240" indent="0">
-              <a:buNone/>
-              <a:defRPr sz="960" b="1"/>
+            <a:lvl8pPr marL="2218837" indent="0">
+              <a:buNone/>
+              <a:defRPr sz="1109" b="1"/>
             </a:lvl8pPr>
-            <a:lvl9pPr marL="2194560" indent="0">
-              <a:buNone/>
-              <a:defRPr sz="960" b="1"/>
+            <a:lvl9pPr marL="2535814" indent="0">
+              <a:buNone/>
+              <a:defRPr sz="1109" b="1"/>
             </a:lvl9pPr>
           </a:lstStyle>
           <a:p>
@@ -1546,8 +1546,8 @@
         </p:nvSpPr>
         <p:spPr>
           <a:xfrm>
-            <a:off x="4166235" y="1503045"/>
-            <a:ext cx="3498652" cy="2210753"/>
+            <a:off x="4629150" y="1736736"/>
+            <a:ext cx="3887391" cy="2554477"/>
           </a:xfrm>
         </p:spPr>
         <p:txBody>
@@ -1608,7 +1608,7 @@
           <a:p>
             <a:fld id="{88D6F949-A4F1-0042-881D-6E96888E80B7}" type="datetimeFigureOut">
               <a:rPr lang="en-US" smtClean="0"/>
-              <a:t>4/17/24</a:t>
+              <a:t>4/18/24</a:t>
             </a:fld>
             <a:endParaRPr lang="en-US"/>
           </a:p>
@@ -1659,7 +1659,7 @@
     </p:spTree>
     <p:extLst>
       <p:ext uri="{BB962C8B-B14F-4D97-AF65-F5344CB8AC3E}">
-        <p14:creationId xmlns:p14="http://schemas.microsoft.com/office/powerpoint/2010/main" val="2097540889"/>
+        <p14:creationId xmlns:p14="http://schemas.microsoft.com/office/powerpoint/2010/main" val="1876826915"/>
       </p:ext>
     </p:extLst>
   </p:cSld>
@@ -1726,7 +1726,7 @@
           <a:p>
             <a:fld id="{88D6F949-A4F1-0042-881D-6E96888E80B7}" type="datetimeFigureOut">
               <a:rPr lang="en-US" smtClean="0"/>
-              <a:t>4/17/24</a:t>
+              <a:t>4/18/24</a:t>
             </a:fld>
             <a:endParaRPr lang="en-US"/>
           </a:p>
@@ -1777,7 +1777,7 @@
     </p:spTree>
     <p:extLst>
       <p:ext uri="{BB962C8B-B14F-4D97-AF65-F5344CB8AC3E}">
-        <p14:creationId xmlns:p14="http://schemas.microsoft.com/office/powerpoint/2010/main" val="609798445"/>
+        <p14:creationId xmlns:p14="http://schemas.microsoft.com/office/powerpoint/2010/main" val="3366678977"/>
       </p:ext>
     </p:extLst>
   </p:cSld>
@@ -1821,7 +1821,7 @@
           <a:p>
             <a:fld id="{88D6F949-A4F1-0042-881D-6E96888E80B7}" type="datetimeFigureOut">
               <a:rPr lang="en-US" smtClean="0"/>
-              <a:t>4/17/24</a:t>
+              <a:t>4/18/24</a:t>
             </a:fld>
             <a:endParaRPr lang="en-US"/>
           </a:p>
@@ -1872,7 +1872,7 @@
     </p:spTree>
     <p:extLst>
       <p:ext uri="{BB962C8B-B14F-4D97-AF65-F5344CB8AC3E}">
-        <p14:creationId xmlns:p14="http://schemas.microsoft.com/office/powerpoint/2010/main" val="1340502700"/>
+        <p14:creationId xmlns:p14="http://schemas.microsoft.com/office/powerpoint/2010/main" val="582898309"/>
       </p:ext>
     </p:extLst>
   </p:cSld>
@@ -1911,15 +1911,15 @@
         </p:nvSpPr>
         <p:spPr>
           <a:xfrm>
-            <a:off x="566857" y="274320"/>
-            <a:ext cx="2654260" cy="960120"/>
+            <a:off x="629841" y="316971"/>
+            <a:ext cx="2949178" cy="1109398"/>
           </a:xfrm>
         </p:spPr>
         <p:txBody>
           <a:bodyPr anchor="b"/>
           <a:lstStyle>
             <a:lvl1pPr>
-              <a:defRPr sz="1920"/>
+              <a:defRPr sz="2219"/>
             </a:lvl1pPr>
           </a:lstStyle>
           <a:p>
@@ -1943,39 +1943,39 @@
         </p:nvSpPr>
         <p:spPr>
           <a:xfrm>
-            <a:off x="3498652" y="592455"/>
-            <a:ext cx="4166235" cy="2924175"/>
+            <a:off x="3887391" y="684570"/>
+            <a:ext cx="4629150" cy="3378821"/>
           </a:xfrm>
         </p:spPr>
         <p:txBody>
           <a:bodyPr/>
           <a:lstStyle>
             <a:lvl1pPr>
-              <a:defRPr sz="1920"/>
+              <a:defRPr sz="2219"/>
             </a:lvl1pPr>
             <a:lvl2pPr>
-              <a:defRPr sz="1680"/>
+              <a:defRPr sz="1941"/>
             </a:lvl2pPr>
             <a:lvl3pPr>
-              <a:defRPr sz="1440"/>
+              <a:defRPr sz="1664"/>
             </a:lvl3pPr>
             <a:lvl4pPr>
-              <a:defRPr sz="1200"/>
+              <a:defRPr sz="1387"/>
             </a:lvl4pPr>
             <a:lvl5pPr>
-              <a:defRPr sz="1200"/>
+              <a:defRPr sz="1387"/>
             </a:lvl5pPr>
             <a:lvl6pPr>
-              <a:defRPr sz="1200"/>
+              <a:defRPr sz="1387"/>
             </a:lvl6pPr>
             <a:lvl7pPr>
-              <a:defRPr sz="1200"/>
+              <a:defRPr sz="1387"/>
             </a:lvl7pPr>
             <a:lvl8pPr>
-              <a:defRPr sz="1200"/>
+              <a:defRPr sz="1387"/>
             </a:lvl8pPr>
             <a:lvl9pPr>
-              <a:defRPr sz="1200"/>
+              <a:defRPr sz="1387"/>
             </a:lvl9pPr>
           </a:lstStyle>
           <a:p>
@@ -2028,8 +2028,8 @@
         </p:nvSpPr>
         <p:spPr>
           <a:xfrm>
-            <a:off x="566857" y="1234440"/>
-            <a:ext cx="2654260" cy="2286953"/>
+            <a:off x="629841" y="1426369"/>
+            <a:ext cx="2949178" cy="2642525"/>
           </a:xfrm>
         </p:spPr>
         <p:txBody>
@@ -2037,39 +2037,39 @@
           <a:lstStyle>
             <a:lvl1pPr marL="0" indent="0">
               <a:buNone/>
-              <a:defRPr sz="960"/>
+              <a:defRPr sz="1109"/>
             </a:lvl1pPr>
-            <a:lvl2pPr marL="274320" indent="0">
-              <a:buNone/>
-              <a:defRPr sz="840"/>
+            <a:lvl2pPr marL="316977" indent="0">
+              <a:buNone/>
+              <a:defRPr sz="971"/>
             </a:lvl2pPr>
-            <a:lvl3pPr marL="548640" indent="0">
-              <a:buNone/>
-              <a:defRPr sz="720"/>
+            <a:lvl3pPr marL="633954" indent="0">
+              <a:buNone/>
+              <a:defRPr sz="832"/>
             </a:lvl3pPr>
-            <a:lvl4pPr marL="822960" indent="0">
-              <a:buNone/>
-              <a:defRPr sz="600"/>
+            <a:lvl4pPr marL="950930" indent="0">
+              <a:buNone/>
+              <a:defRPr sz="693"/>
             </a:lvl4pPr>
-            <a:lvl5pPr marL="1097280" indent="0">
-              <a:buNone/>
-              <a:defRPr sz="600"/>
+            <a:lvl5pPr marL="1267907" indent="0">
+              <a:buNone/>
+              <a:defRPr sz="693"/>
             </a:lvl5pPr>
-            <a:lvl6pPr marL="1371600" indent="0">
-              <a:buNone/>
-              <a:defRPr sz="600"/>
+            <a:lvl6pPr marL="1584884" indent="0">
+              <a:buNone/>
+              <a:defRPr sz="693"/>
             </a:lvl6pPr>
-            <a:lvl7pPr marL="1645920" indent="0">
-              <a:buNone/>
-              <a:defRPr sz="600"/>
+            <a:lvl7pPr marL="1901861" indent="0">
+              <a:buNone/>
+              <a:defRPr sz="693"/>
             </a:lvl7pPr>
-            <a:lvl8pPr marL="1920240" indent="0">
-              <a:buNone/>
-              <a:defRPr sz="600"/>
+            <a:lvl8pPr marL="2218837" indent="0">
+              <a:buNone/>
+              <a:defRPr sz="693"/>
             </a:lvl8pPr>
-            <a:lvl9pPr marL="2194560" indent="0">
-              <a:buNone/>
-              <a:defRPr sz="600"/>
+            <a:lvl9pPr marL="2535814" indent="0">
+              <a:buNone/>
+              <a:defRPr sz="693"/>
             </a:lvl9pPr>
           </a:lstStyle>
           <a:p>
@@ -2098,7 +2098,7 @@
           <a:p>
             <a:fld id="{88D6F949-A4F1-0042-881D-6E96888E80B7}" type="datetimeFigureOut">
               <a:rPr lang="en-US" smtClean="0"/>
-              <a:t>4/17/24</a:t>
+              <a:t>4/18/24</a:t>
             </a:fld>
             <a:endParaRPr lang="en-US"/>
           </a:p>
@@ -2149,7 +2149,7 @@
     </p:spTree>
     <p:extLst>
       <p:ext uri="{BB962C8B-B14F-4D97-AF65-F5344CB8AC3E}">
-        <p14:creationId xmlns:p14="http://schemas.microsoft.com/office/powerpoint/2010/main" val="2596401696"/>
+        <p14:creationId xmlns:p14="http://schemas.microsoft.com/office/powerpoint/2010/main" val="708816406"/>
       </p:ext>
     </p:extLst>
   </p:cSld>
@@ -2188,15 +2188,15 @@
         </p:nvSpPr>
         <p:spPr>
           <a:xfrm>
-            <a:off x="566857" y="274320"/>
-            <a:ext cx="2654260" cy="960120"/>
+            <a:off x="629841" y="316971"/>
+            <a:ext cx="2949178" cy="1109398"/>
           </a:xfrm>
         </p:spPr>
         <p:txBody>
           <a:bodyPr anchor="b"/>
           <a:lstStyle>
             <a:lvl1pPr>
-              <a:defRPr sz="1920"/>
+              <a:defRPr sz="2219"/>
             </a:lvl1pPr>
           </a:lstStyle>
           <a:p>
@@ -2220,8 +2220,8 @@
         </p:nvSpPr>
         <p:spPr>
           <a:xfrm>
-            <a:off x="3498652" y="592455"/>
-            <a:ext cx="4166235" cy="2924175"/>
+            <a:off x="3887391" y="684570"/>
+            <a:ext cx="4629150" cy="3378821"/>
           </a:xfrm>
         </p:spPr>
         <p:txBody>
@@ -2229,39 +2229,39 @@
           <a:lstStyle>
             <a:lvl1pPr marL="0" indent="0">
               <a:buNone/>
-              <a:defRPr sz="1920"/>
+              <a:defRPr sz="2219"/>
             </a:lvl1pPr>
-            <a:lvl2pPr marL="274320" indent="0">
-              <a:buNone/>
-              <a:defRPr sz="1680"/>
+            <a:lvl2pPr marL="316977" indent="0">
+              <a:buNone/>
+              <a:defRPr sz="1941"/>
             </a:lvl2pPr>
-            <a:lvl3pPr marL="548640" indent="0">
-              <a:buNone/>
-              <a:defRPr sz="1440"/>
+            <a:lvl3pPr marL="633954" indent="0">
+              <a:buNone/>
+              <a:defRPr sz="1664"/>
             </a:lvl3pPr>
-            <a:lvl4pPr marL="822960" indent="0">
-              <a:buNone/>
-              <a:defRPr sz="1200"/>
+            <a:lvl4pPr marL="950930" indent="0">
+              <a:buNone/>
+              <a:defRPr sz="1387"/>
             </a:lvl4pPr>
-            <a:lvl5pPr marL="1097280" indent="0">
-              <a:buNone/>
-              <a:defRPr sz="1200"/>
+            <a:lvl5pPr marL="1267907" indent="0">
+              <a:buNone/>
+              <a:defRPr sz="1387"/>
             </a:lvl5pPr>
-            <a:lvl6pPr marL="1371600" indent="0">
-              <a:buNone/>
-              <a:defRPr sz="1200"/>
+            <a:lvl6pPr marL="1584884" indent="0">
+              <a:buNone/>
+              <a:defRPr sz="1387"/>
             </a:lvl6pPr>
-            <a:lvl7pPr marL="1645920" indent="0">
-              <a:buNone/>
-              <a:defRPr sz="1200"/>
+            <a:lvl7pPr marL="1901861" indent="0">
+              <a:buNone/>
+              <a:defRPr sz="1387"/>
             </a:lvl7pPr>
-            <a:lvl8pPr marL="1920240" indent="0">
-              <a:buNone/>
-              <a:defRPr sz="1200"/>
+            <a:lvl8pPr marL="2218837" indent="0">
+              <a:buNone/>
+              <a:defRPr sz="1387"/>
             </a:lvl8pPr>
-            <a:lvl9pPr marL="2194560" indent="0">
-              <a:buNone/>
-              <a:defRPr sz="1200"/>
+            <a:lvl9pPr marL="2535814" indent="0">
+              <a:buNone/>
+              <a:defRPr sz="1387"/>
             </a:lvl9pPr>
           </a:lstStyle>
           <a:p>
@@ -2285,8 +2285,8 @@
         </p:nvSpPr>
         <p:spPr>
           <a:xfrm>
-            <a:off x="566857" y="1234440"/>
-            <a:ext cx="2654260" cy="2286953"/>
+            <a:off x="629841" y="1426369"/>
+            <a:ext cx="2949178" cy="2642525"/>
           </a:xfrm>
         </p:spPr>
         <p:txBody>
@@ -2294,39 +2294,39 @@
           <a:lstStyle>
             <a:lvl1pPr marL="0" indent="0">
               <a:buNone/>
-              <a:defRPr sz="960"/>
+              <a:defRPr sz="1109"/>
             </a:lvl1pPr>
-            <a:lvl2pPr marL="274320" indent="0">
-              <a:buNone/>
-              <a:defRPr sz="840"/>
+            <a:lvl2pPr marL="316977" indent="0">
+              <a:buNone/>
+              <a:defRPr sz="971"/>
             </a:lvl2pPr>
-            <a:lvl3pPr marL="548640" indent="0">
-              <a:buNone/>
-              <a:defRPr sz="720"/>
+            <a:lvl3pPr marL="633954" indent="0">
+              <a:buNone/>
+              <a:defRPr sz="832"/>
             </a:lvl3pPr>
-            <a:lvl4pPr marL="822960" indent="0">
-              <a:buNone/>
-              <a:defRPr sz="600"/>
+            <a:lvl4pPr marL="950930" indent="0">
+              <a:buNone/>
+              <a:defRPr sz="693"/>
             </a:lvl4pPr>
-            <a:lvl5pPr marL="1097280" indent="0">
-              <a:buNone/>
-              <a:defRPr sz="600"/>
+            <a:lvl5pPr marL="1267907" indent="0">
+              <a:buNone/>
+              <a:defRPr sz="693"/>
             </a:lvl5pPr>
-            <a:lvl6pPr marL="1371600" indent="0">
-              <a:buNone/>
-              <a:defRPr sz="600"/>
+            <a:lvl6pPr marL="1584884" indent="0">
+              <a:buNone/>
+              <a:defRPr sz="693"/>
             </a:lvl6pPr>
-            <a:lvl7pPr marL="1645920" indent="0">
-              <a:buNone/>
-              <a:defRPr sz="600"/>
+            <a:lvl7pPr marL="1901861" indent="0">
+              <a:buNone/>
+              <a:defRPr sz="693"/>
             </a:lvl7pPr>
-            <a:lvl8pPr marL="1920240" indent="0">
-              <a:buNone/>
-              <a:defRPr sz="600"/>
+            <a:lvl8pPr marL="2218837" indent="0">
+              <a:buNone/>
+              <a:defRPr sz="693"/>
             </a:lvl8pPr>
-            <a:lvl9pPr marL="2194560" indent="0">
-              <a:buNone/>
-              <a:defRPr sz="600"/>
+            <a:lvl9pPr marL="2535814" indent="0">
+              <a:buNone/>
+              <a:defRPr sz="693"/>
             </a:lvl9pPr>
           </a:lstStyle>
           <a:p>
@@ -2355,7 +2355,7 @@
           <a:p>
             <a:fld id="{88D6F949-A4F1-0042-881D-6E96888E80B7}" type="datetimeFigureOut">
               <a:rPr lang="en-US" smtClean="0"/>
-              <a:t>4/17/24</a:t>
+              <a:t>4/18/24</a:t>
             </a:fld>
             <a:endParaRPr lang="en-US"/>
           </a:p>
@@ -2406,7 +2406,7 @@
     </p:spTree>
     <p:extLst>
       <p:ext uri="{BB962C8B-B14F-4D97-AF65-F5344CB8AC3E}">
-        <p14:creationId xmlns:p14="http://schemas.microsoft.com/office/powerpoint/2010/main" val="4178780783"/>
+        <p14:creationId xmlns:p14="http://schemas.microsoft.com/office/powerpoint/2010/main" val="2430586481"/>
       </p:ext>
     </p:extLst>
   </p:cSld>
@@ -2450,8 +2450,8 @@
         </p:nvSpPr>
         <p:spPr>
           <a:xfrm>
-            <a:off x="565785" y="219075"/>
-            <a:ext cx="7098030" cy="795338"/>
+            <a:off x="628650" y="253137"/>
+            <a:ext cx="7886700" cy="918996"/>
           </a:xfrm>
           <a:prstGeom prst="rect">
             <a:avLst/>
@@ -2483,8 +2483,8 @@
         </p:nvSpPr>
         <p:spPr>
           <a:xfrm>
-            <a:off x="565785" y="1095375"/>
-            <a:ext cx="7098030" cy="2610803"/>
+            <a:off x="628650" y="1265682"/>
+            <a:ext cx="7886700" cy="3016727"/>
           </a:xfrm>
           <a:prstGeom prst="rect">
             <a:avLst/>
@@ -2545,8 +2545,8 @@
         </p:nvSpPr>
         <p:spPr>
           <a:xfrm>
-            <a:off x="565785" y="3813810"/>
-            <a:ext cx="1851660" cy="219075"/>
+            <a:off x="628650" y="4406776"/>
+            <a:ext cx="2057400" cy="253136"/>
           </a:xfrm>
           <a:prstGeom prst="rect">
             <a:avLst/>
@@ -2556,7 +2556,7 @@
           <a:bodyPr vert="horz" lIns="91440" tIns="45720" rIns="91440" bIns="45720" rtlCol="0" anchor="ctr"/>
           <a:lstStyle>
             <a:lvl1pPr algn="l">
-              <a:defRPr sz="720">
+              <a:defRPr sz="832">
                 <a:solidFill>
                   <a:schemeClr val="tx1">
                     <a:tint val="82000"/>
@@ -2568,7 +2568,7 @@
           <a:p>
             <a:fld id="{88D6F949-A4F1-0042-881D-6E96888E80B7}" type="datetimeFigureOut">
               <a:rPr lang="en-US" smtClean="0"/>
-              <a:t>4/17/24</a:t>
+              <a:t>4/18/24</a:t>
             </a:fld>
             <a:endParaRPr lang="en-US"/>
           </a:p>
@@ -2586,8 +2586,8 @@
         </p:nvSpPr>
         <p:spPr>
           <a:xfrm>
-            <a:off x="2726055" y="3813810"/>
-            <a:ext cx="2777490" cy="219075"/>
+            <a:off x="3028950" y="4406776"/>
+            <a:ext cx="3086100" cy="253136"/>
           </a:xfrm>
           <a:prstGeom prst="rect">
             <a:avLst/>
@@ -2597,7 +2597,7 @@
           <a:bodyPr vert="horz" lIns="91440" tIns="45720" rIns="91440" bIns="45720" rtlCol="0" anchor="ctr"/>
           <a:lstStyle>
             <a:lvl1pPr algn="ctr">
-              <a:defRPr sz="720">
+              <a:defRPr sz="832">
                 <a:solidFill>
                   <a:schemeClr val="tx1">
                     <a:tint val="82000"/>
@@ -2623,8 +2623,8 @@
         </p:nvSpPr>
         <p:spPr>
           <a:xfrm>
-            <a:off x="5812155" y="3813810"/>
-            <a:ext cx="1851660" cy="219075"/>
+            <a:off x="6457950" y="4406776"/>
+            <a:ext cx="2057400" cy="253136"/>
           </a:xfrm>
           <a:prstGeom prst="rect">
             <a:avLst/>
@@ -2634,7 +2634,7 @@
           <a:bodyPr vert="horz" lIns="91440" tIns="45720" rIns="91440" bIns="45720" rtlCol="0" anchor="ctr"/>
           <a:lstStyle>
             <a:lvl1pPr algn="r">
-              <a:defRPr sz="720">
+              <a:defRPr sz="832">
                 <a:solidFill>
                   <a:schemeClr val="tx1">
                     <a:tint val="82000"/>
@@ -2655,27 +2655,27 @@
     </p:spTree>
     <p:extLst>
       <p:ext uri="{BB962C8B-B14F-4D97-AF65-F5344CB8AC3E}">
-        <p14:creationId xmlns:p14="http://schemas.microsoft.com/office/powerpoint/2010/main" val="1261275162"/>
+        <p14:creationId xmlns:p14="http://schemas.microsoft.com/office/powerpoint/2010/main" val="1445071300"/>
       </p:ext>
     </p:extLst>
   </p:cSld>
   <p:clrMap bg1="lt1" tx1="dk1" bg2="lt2" tx2="dk2" accent1="accent1" accent2="accent2" accent3="accent3" accent4="accent4" accent5="accent5" accent6="accent6" hlink="hlink" folHlink="folHlink"/>
   <p:sldLayoutIdLst>
-    <p:sldLayoutId id="2147483673" r:id="rId1"/>
-    <p:sldLayoutId id="2147483674" r:id="rId2"/>
-    <p:sldLayoutId id="2147483675" r:id="rId3"/>
-    <p:sldLayoutId id="2147483676" r:id="rId4"/>
-    <p:sldLayoutId id="2147483677" r:id="rId5"/>
-    <p:sldLayoutId id="2147483678" r:id="rId6"/>
-    <p:sldLayoutId id="2147483679" r:id="rId7"/>
-    <p:sldLayoutId id="2147483680" r:id="rId8"/>
-    <p:sldLayoutId id="2147483681" r:id="rId9"/>
-    <p:sldLayoutId id="2147483682" r:id="rId10"/>
-    <p:sldLayoutId id="2147483683" r:id="rId11"/>
+    <p:sldLayoutId id="2147483709" r:id="rId1"/>
+    <p:sldLayoutId id="2147483710" r:id="rId2"/>
+    <p:sldLayoutId id="2147483711" r:id="rId3"/>
+    <p:sldLayoutId id="2147483712" r:id="rId4"/>
+    <p:sldLayoutId id="2147483713" r:id="rId5"/>
+    <p:sldLayoutId id="2147483714" r:id="rId6"/>
+    <p:sldLayoutId id="2147483715" r:id="rId7"/>
+    <p:sldLayoutId id="2147483716" r:id="rId8"/>
+    <p:sldLayoutId id="2147483717" r:id="rId9"/>
+    <p:sldLayoutId id="2147483718" r:id="rId10"/>
+    <p:sldLayoutId id="2147483719" r:id="rId11"/>
   </p:sldLayoutIdLst>
   <p:txStyles>
     <p:titleStyle>
-      <a:lvl1pPr algn="l" defTabSz="548640" rtl="0" eaLnBrk="1" latinLnBrk="0" hangingPunct="1">
+      <a:lvl1pPr algn="l" defTabSz="633954" rtl="0" eaLnBrk="1" latinLnBrk="0" hangingPunct="1">
         <a:lnSpc>
           <a:spcPct val="90000"/>
         </a:lnSpc>
@@ -2683,7 +2683,7 @@
           <a:spcPct val="0"/>
         </a:spcBef>
         <a:buNone/>
-        <a:defRPr sz="2640" kern="1200">
+        <a:defRPr sz="3051" kern="1200">
           <a:solidFill>
             <a:schemeClr val="tx1"/>
           </a:solidFill>
@@ -2694,16 +2694,16 @@
       </a:lvl1pPr>
     </p:titleStyle>
     <p:bodyStyle>
-      <a:lvl1pPr marL="137160" indent="-137160" algn="l" defTabSz="548640" rtl="0" eaLnBrk="1" latinLnBrk="0" hangingPunct="1">
+      <a:lvl1pPr marL="158488" indent="-158488" algn="l" defTabSz="633954" rtl="0" eaLnBrk="1" latinLnBrk="0" hangingPunct="1">
         <a:lnSpc>
           <a:spcPct val="90000"/>
         </a:lnSpc>
         <a:spcBef>
-          <a:spcPts val="600"/>
+          <a:spcPts val="693"/>
         </a:spcBef>
         <a:buFont typeface="Arial" panose="020B0604020202020204" pitchFamily="34" charset="0"/>
         <a:buChar char="•"/>
-        <a:defRPr sz="1680" kern="1200">
+        <a:defRPr sz="1941" kern="1200">
           <a:solidFill>
             <a:schemeClr val="tx1"/>
           </a:solidFill>
@@ -2712,16 +2712,16 @@
           <a:cs typeface="+mn-cs"/>
         </a:defRPr>
       </a:lvl1pPr>
-      <a:lvl2pPr marL="411480" indent="-137160" algn="l" defTabSz="548640" rtl="0" eaLnBrk="1" latinLnBrk="0" hangingPunct="1">
+      <a:lvl2pPr marL="475465" indent="-158488" algn="l" defTabSz="633954" rtl="0" eaLnBrk="1" latinLnBrk="0" hangingPunct="1">
         <a:lnSpc>
           <a:spcPct val="90000"/>
         </a:lnSpc>
         <a:spcBef>
-          <a:spcPts val="300"/>
+          <a:spcPts val="347"/>
         </a:spcBef>
         <a:buFont typeface="Arial" panose="020B0604020202020204" pitchFamily="34" charset="0"/>
         <a:buChar char="•"/>
-        <a:defRPr sz="1440" kern="1200">
+        <a:defRPr sz="1664" kern="1200">
           <a:solidFill>
             <a:schemeClr val="tx1"/>
           </a:solidFill>
@@ -2730,16 +2730,16 @@
           <a:cs typeface="+mn-cs"/>
         </a:defRPr>
       </a:lvl2pPr>
-      <a:lvl3pPr marL="685800" indent="-137160" algn="l" defTabSz="548640" rtl="0" eaLnBrk="1" latinLnBrk="0" hangingPunct="1">
+      <a:lvl3pPr marL="792442" indent="-158488" algn="l" defTabSz="633954" rtl="0" eaLnBrk="1" latinLnBrk="0" hangingPunct="1">
         <a:lnSpc>
           <a:spcPct val="90000"/>
         </a:lnSpc>
         <a:spcBef>
-          <a:spcPts val="300"/>
+          <a:spcPts val="347"/>
         </a:spcBef>
         <a:buFont typeface="Arial" panose="020B0604020202020204" pitchFamily="34" charset="0"/>
         <a:buChar char="•"/>
-        <a:defRPr sz="1200" kern="1200">
+        <a:defRPr sz="1387" kern="1200">
           <a:solidFill>
             <a:schemeClr val="tx1"/>
           </a:solidFill>
@@ -2748,16 +2748,16 @@
           <a:cs typeface="+mn-cs"/>
         </a:defRPr>
       </a:lvl3pPr>
-      <a:lvl4pPr marL="960120" indent="-137160" algn="l" defTabSz="548640" rtl="0" eaLnBrk="1" latinLnBrk="0" hangingPunct="1">
+      <a:lvl4pPr marL="1109419" indent="-158488" algn="l" defTabSz="633954" rtl="0" eaLnBrk="1" latinLnBrk="0" hangingPunct="1">
         <a:lnSpc>
           <a:spcPct val="90000"/>
         </a:lnSpc>
         <a:spcBef>
-          <a:spcPts val="300"/>
+          <a:spcPts val="347"/>
         </a:spcBef>
         <a:buFont typeface="Arial" panose="020B0604020202020204" pitchFamily="34" charset="0"/>
         <a:buChar char="•"/>
-        <a:defRPr sz="1080" kern="1200">
+        <a:defRPr sz="1248" kern="1200">
           <a:solidFill>
             <a:schemeClr val="tx1"/>
           </a:solidFill>
@@ -2766,16 +2766,16 @@
           <a:cs typeface="+mn-cs"/>
         </a:defRPr>
       </a:lvl4pPr>
-      <a:lvl5pPr marL="1234440" indent="-137160" algn="l" defTabSz="548640" rtl="0" eaLnBrk="1" latinLnBrk="0" hangingPunct="1">
+      <a:lvl5pPr marL="1426395" indent="-158488" algn="l" defTabSz="633954" rtl="0" eaLnBrk="1" latinLnBrk="0" hangingPunct="1">
         <a:lnSpc>
           <a:spcPct val="90000"/>
         </a:lnSpc>
         <a:spcBef>
-          <a:spcPts val="300"/>
+          <a:spcPts val="347"/>
         </a:spcBef>
         <a:buFont typeface="Arial" panose="020B0604020202020204" pitchFamily="34" charset="0"/>
         <a:buChar char="•"/>
-        <a:defRPr sz="1080" kern="1200">
+        <a:defRPr sz="1248" kern="1200">
           <a:solidFill>
             <a:schemeClr val="tx1"/>
           </a:solidFill>
@@ -2784,16 +2784,16 @@
           <a:cs typeface="+mn-cs"/>
         </a:defRPr>
       </a:lvl5pPr>
-      <a:lvl6pPr marL="1508760" indent="-137160" algn="l" defTabSz="548640" rtl="0" eaLnBrk="1" latinLnBrk="0" hangingPunct="1">
+      <a:lvl6pPr marL="1743372" indent="-158488" algn="l" defTabSz="633954" rtl="0" eaLnBrk="1" latinLnBrk="0" hangingPunct="1">
         <a:lnSpc>
           <a:spcPct val="90000"/>
         </a:lnSpc>
         <a:spcBef>
-          <a:spcPts val="300"/>
+          <a:spcPts val="347"/>
         </a:spcBef>
         <a:buFont typeface="Arial" panose="020B0604020202020204" pitchFamily="34" charset="0"/>
         <a:buChar char="•"/>
-        <a:defRPr sz="1080" kern="1200">
+        <a:defRPr sz="1248" kern="1200">
           <a:solidFill>
             <a:schemeClr val="tx1"/>
           </a:solidFill>
@@ -2802,16 +2802,16 @@
           <a:cs typeface="+mn-cs"/>
         </a:defRPr>
       </a:lvl6pPr>
-      <a:lvl7pPr marL="1783080" indent="-137160" algn="l" defTabSz="548640" rtl="0" eaLnBrk="1" latinLnBrk="0" hangingPunct="1">
+      <a:lvl7pPr marL="2060349" indent="-158488" algn="l" defTabSz="633954" rtl="0" eaLnBrk="1" latinLnBrk="0" hangingPunct="1">
         <a:lnSpc>
           <a:spcPct val="90000"/>
         </a:lnSpc>
         <a:spcBef>
-          <a:spcPts val="300"/>
+          <a:spcPts val="347"/>
         </a:spcBef>
         <a:buFont typeface="Arial" panose="020B0604020202020204" pitchFamily="34" charset="0"/>
         <a:buChar char="•"/>
-        <a:defRPr sz="1080" kern="1200">
+        <a:defRPr sz="1248" kern="1200">
           <a:solidFill>
             <a:schemeClr val="tx1"/>
           </a:solidFill>
@@ -2820,16 +2820,16 @@
           <a:cs typeface="+mn-cs"/>
         </a:defRPr>
       </a:lvl7pPr>
-      <a:lvl8pPr marL="2057400" indent="-137160" algn="l" defTabSz="548640" rtl="0" eaLnBrk="1" latinLnBrk="0" hangingPunct="1">
+      <a:lvl8pPr marL="2377326" indent="-158488" algn="l" defTabSz="633954" rtl="0" eaLnBrk="1" latinLnBrk="0" hangingPunct="1">
         <a:lnSpc>
           <a:spcPct val="90000"/>
         </a:lnSpc>
         <a:spcBef>
-          <a:spcPts val="300"/>
+          <a:spcPts val="347"/>
         </a:spcBef>
         <a:buFont typeface="Arial" panose="020B0604020202020204" pitchFamily="34" charset="0"/>
         <a:buChar char="•"/>
-        <a:defRPr sz="1080" kern="1200">
+        <a:defRPr sz="1248" kern="1200">
           <a:solidFill>
             <a:schemeClr val="tx1"/>
           </a:solidFill>
@@ -2838,16 +2838,16 @@
           <a:cs typeface="+mn-cs"/>
         </a:defRPr>
       </a:lvl8pPr>
-      <a:lvl9pPr marL="2331720" indent="-137160" algn="l" defTabSz="548640" rtl="0" eaLnBrk="1" latinLnBrk="0" hangingPunct="1">
+      <a:lvl9pPr marL="2694302" indent="-158488" algn="l" defTabSz="633954" rtl="0" eaLnBrk="1" latinLnBrk="0" hangingPunct="1">
         <a:lnSpc>
           <a:spcPct val="90000"/>
         </a:lnSpc>
         <a:spcBef>
-          <a:spcPts val="300"/>
+          <a:spcPts val="347"/>
         </a:spcBef>
         <a:buFont typeface="Arial" panose="020B0604020202020204" pitchFamily="34" charset="0"/>
         <a:buChar char="•"/>
-        <a:defRPr sz="1080" kern="1200">
+        <a:defRPr sz="1248" kern="1200">
           <a:solidFill>
             <a:schemeClr val="tx1"/>
           </a:solidFill>
@@ -2861,8 +2861,8 @@
       <a:defPPr>
         <a:defRPr lang="en-US"/>
       </a:defPPr>
-      <a:lvl1pPr marL="0" algn="l" defTabSz="548640" rtl="0" eaLnBrk="1" latinLnBrk="0" hangingPunct="1">
-        <a:defRPr sz="1080" kern="1200">
+      <a:lvl1pPr marL="0" algn="l" defTabSz="633954" rtl="0" eaLnBrk="1" latinLnBrk="0" hangingPunct="1">
+        <a:defRPr sz="1248" kern="1200">
           <a:solidFill>
             <a:schemeClr val="tx1"/>
           </a:solidFill>
@@ -2871,8 +2871,8 @@
           <a:cs typeface="+mn-cs"/>
         </a:defRPr>
       </a:lvl1pPr>
-      <a:lvl2pPr marL="274320" algn="l" defTabSz="548640" rtl="0" eaLnBrk="1" latinLnBrk="0" hangingPunct="1">
-        <a:defRPr sz="1080" kern="1200">
+      <a:lvl2pPr marL="316977" algn="l" defTabSz="633954" rtl="0" eaLnBrk="1" latinLnBrk="0" hangingPunct="1">
+        <a:defRPr sz="1248" kern="1200">
           <a:solidFill>
             <a:schemeClr val="tx1"/>
           </a:solidFill>
@@ -2881,8 +2881,8 @@
           <a:cs typeface="+mn-cs"/>
         </a:defRPr>
       </a:lvl2pPr>
-      <a:lvl3pPr marL="548640" algn="l" defTabSz="548640" rtl="0" eaLnBrk="1" latinLnBrk="0" hangingPunct="1">
-        <a:defRPr sz="1080" kern="1200">
+      <a:lvl3pPr marL="633954" algn="l" defTabSz="633954" rtl="0" eaLnBrk="1" latinLnBrk="0" hangingPunct="1">
+        <a:defRPr sz="1248" kern="1200">
           <a:solidFill>
             <a:schemeClr val="tx1"/>
           </a:solidFill>
@@ -2891,8 +2891,8 @@
           <a:cs typeface="+mn-cs"/>
         </a:defRPr>
       </a:lvl3pPr>
-      <a:lvl4pPr marL="822960" algn="l" defTabSz="548640" rtl="0" eaLnBrk="1" latinLnBrk="0" hangingPunct="1">
-        <a:defRPr sz="1080" kern="1200">
+      <a:lvl4pPr marL="950930" algn="l" defTabSz="633954" rtl="0" eaLnBrk="1" latinLnBrk="0" hangingPunct="1">
+        <a:defRPr sz="1248" kern="1200">
           <a:solidFill>
             <a:schemeClr val="tx1"/>
           </a:solidFill>
@@ -2901,8 +2901,8 @@
           <a:cs typeface="+mn-cs"/>
         </a:defRPr>
       </a:lvl4pPr>
-      <a:lvl5pPr marL="1097280" algn="l" defTabSz="548640" rtl="0" eaLnBrk="1" latinLnBrk="0" hangingPunct="1">
-        <a:defRPr sz="1080" kern="1200">
+      <a:lvl5pPr marL="1267907" algn="l" defTabSz="633954" rtl="0" eaLnBrk="1" latinLnBrk="0" hangingPunct="1">
+        <a:defRPr sz="1248" kern="1200">
           <a:solidFill>
             <a:schemeClr val="tx1"/>
           </a:solidFill>
@@ -2911,8 +2911,8 @@
           <a:cs typeface="+mn-cs"/>
         </a:defRPr>
       </a:lvl5pPr>
-      <a:lvl6pPr marL="1371600" algn="l" defTabSz="548640" rtl="0" eaLnBrk="1" latinLnBrk="0" hangingPunct="1">
-        <a:defRPr sz="1080" kern="1200">
+      <a:lvl6pPr marL="1584884" algn="l" defTabSz="633954" rtl="0" eaLnBrk="1" latinLnBrk="0" hangingPunct="1">
+        <a:defRPr sz="1248" kern="1200">
           <a:solidFill>
             <a:schemeClr val="tx1"/>
           </a:solidFill>
@@ -2921,8 +2921,8 @@
           <a:cs typeface="+mn-cs"/>
         </a:defRPr>
       </a:lvl6pPr>
-      <a:lvl7pPr marL="1645920" algn="l" defTabSz="548640" rtl="0" eaLnBrk="1" latinLnBrk="0" hangingPunct="1">
-        <a:defRPr sz="1080" kern="1200">
+      <a:lvl7pPr marL="1901861" algn="l" defTabSz="633954" rtl="0" eaLnBrk="1" latinLnBrk="0" hangingPunct="1">
+        <a:defRPr sz="1248" kern="1200">
           <a:solidFill>
             <a:schemeClr val="tx1"/>
           </a:solidFill>
@@ -2931,8 +2931,8 @@
           <a:cs typeface="+mn-cs"/>
         </a:defRPr>
       </a:lvl7pPr>
-      <a:lvl8pPr marL="1920240" algn="l" defTabSz="548640" rtl="0" eaLnBrk="1" latinLnBrk="0" hangingPunct="1">
-        <a:defRPr sz="1080" kern="1200">
+      <a:lvl8pPr marL="2218837" algn="l" defTabSz="633954" rtl="0" eaLnBrk="1" latinLnBrk="0" hangingPunct="1">
+        <a:defRPr sz="1248" kern="1200">
           <a:solidFill>
             <a:schemeClr val="tx1"/>
           </a:solidFill>
@@ -2941,8 +2941,8 @@
           <a:cs typeface="+mn-cs"/>
         </a:defRPr>
       </a:lvl8pPr>
-      <a:lvl9pPr marL="2194560" algn="l" defTabSz="548640" rtl="0" eaLnBrk="1" latinLnBrk="0" hangingPunct="1">
-        <a:defRPr sz="1080" kern="1200">
+      <a:lvl9pPr marL="2535814" algn="l" defTabSz="633954" rtl="0" eaLnBrk="1" latinLnBrk="0" hangingPunct="1">
+        <a:defRPr sz="1248" kern="1200">
           <a:solidFill>
             <a:schemeClr val="tx1"/>
           </a:solidFill>
@@ -2973,1575 +2973,1895 @@
           <a:chExt cx="0" cy="0"/>
         </a:xfrm>
       </p:grpSpPr>
-      <p:grpSp>
-        <p:nvGrpSpPr>
-          <p:cNvPr id="6" name="Group 5">
+      <p:sp>
+        <p:nvSpPr>
+          <p:cNvPr id="29" name="Rectangle 28">
             <a:extLst>
               <a:ext uri="{FF2B5EF4-FFF2-40B4-BE49-F238E27FC236}">
-                <a16:creationId xmlns:a16="http://schemas.microsoft.com/office/drawing/2014/main" id="{1F688F7A-4CD1-26EC-3CA2-1A9F4B175978}"/>
+                <a16:creationId xmlns:a16="http://schemas.microsoft.com/office/drawing/2014/main" id="{B6100174-AB68-4C47-F082-024C49B43148}"/>
               </a:ext>
             </a:extLst>
           </p:cNvPr>
-          <p:cNvGrpSpPr/>
+          <p:cNvSpPr/>
           <p:nvPr/>
-        </p:nvGrpSpPr>
-        <p:grpSpPr>
+        </p:nvSpPr>
+        <p:spPr>
           <a:xfrm>
-            <a:off x="92154" y="12934"/>
-            <a:ext cx="7967183" cy="3803413"/>
-            <a:chOff x="92154" y="12934"/>
-            <a:chExt cx="7967183" cy="3803413"/>
+            <a:off x="4755517" y="1705804"/>
+            <a:ext cx="4262683" cy="1309337"/>
           </a:xfrm>
-        </p:grpSpPr>
-        <p:sp>
-          <p:nvSpPr>
-            <p:cNvPr id="16" name="Rectangle 15">
-              <a:extLst>
-                <a:ext uri="{FF2B5EF4-FFF2-40B4-BE49-F238E27FC236}">
-                  <a16:creationId xmlns:a16="http://schemas.microsoft.com/office/drawing/2014/main" id="{218A518E-A5FE-9D86-1DA1-E23BCDE4656F}"/>
-                </a:ext>
-              </a:extLst>
-            </p:cNvPr>
-            <p:cNvSpPr/>
-            <p:nvPr/>
-          </p:nvSpPr>
-          <p:spPr>
-            <a:xfrm>
-              <a:off x="5114452" y="2586556"/>
-              <a:ext cx="2850754" cy="1185630"/>
-            </a:xfrm>
-            <a:prstGeom prst="rect">
-              <a:avLst/>
-            </a:prstGeom>
+          <a:prstGeom prst="rect">
+            <a:avLst/>
+          </a:prstGeom>
+          <a:solidFill>
+            <a:srgbClr val="C00000">
+              <a:alpha val="18980"/>
+            </a:srgbClr>
+          </a:solidFill>
+          <a:ln>
+            <a:noFill/>
+          </a:ln>
+        </p:spPr>
+        <p:style>
+          <a:lnRef idx="2">
+            <a:schemeClr val="accent1">
+              <a:shade val="50000"/>
+            </a:schemeClr>
+          </a:lnRef>
+          <a:fillRef idx="1">
+            <a:schemeClr val="accent1"/>
+          </a:fillRef>
+          <a:effectRef idx="0">
+            <a:schemeClr val="accent1"/>
+          </a:effectRef>
+          <a:fontRef idx="minor">
+            <a:schemeClr val="lt1"/>
+          </a:fontRef>
+        </p:style>
+        <p:txBody>
+          <a:bodyPr rtlCol="0" anchor="ctr" anchorCtr="0"/>
+          <a:lstStyle/>
+          <a:p>
+            <a:endParaRPr lang="en-US" sz="1400" dirty="0">
+              <a:solidFill>
+                <a:schemeClr val="tx1"/>
+              </a:solidFill>
+              <a:latin typeface="Consolas" panose="020B0609020204030204" pitchFamily="49" charset="0"/>
+              <a:cs typeface="Consolas" panose="020B0609020204030204" pitchFamily="49" charset="0"/>
+            </a:endParaRPr>
+          </a:p>
+        </p:txBody>
+      </p:sp>
+      <p:sp>
+        <p:nvSpPr>
+          <p:cNvPr id="31" name="TextBox 30">
+            <a:extLst>
+              <a:ext uri="{FF2B5EF4-FFF2-40B4-BE49-F238E27FC236}">
+                <a16:creationId xmlns:a16="http://schemas.microsoft.com/office/drawing/2014/main" id="{40E978B3-4DF3-0E3B-EE40-C60098DD09C9}"/>
+              </a:ext>
+            </a:extLst>
+          </p:cNvPr>
+          <p:cNvSpPr txBox="1"/>
+          <p:nvPr/>
+        </p:nvSpPr>
+        <p:spPr>
+          <a:xfrm>
+            <a:off x="4700870" y="1426935"/>
+            <a:ext cx="4371976" cy="1622040"/>
+          </a:xfrm>
+          <a:prstGeom prst="rect">
+            <a:avLst/>
+          </a:prstGeom>
+          <a:noFill/>
+          <a:ln>
             <a:solidFill>
-              <a:schemeClr val="bg2">
-                <a:lumMod val="90000"/>
-                <a:alpha val="18897"/>
-              </a:schemeClr>
+              <a:schemeClr val="accent1"/>
             </a:solidFill>
-            <a:ln>
-              <a:noFill/>
-            </a:ln>
-          </p:spPr>
-          <p:style>
-            <a:lnRef idx="2">
-              <a:schemeClr val="accent1">
-                <a:shade val="50000"/>
-              </a:schemeClr>
-            </a:lnRef>
-            <a:fillRef idx="1">
-              <a:schemeClr val="accent1"/>
-            </a:fillRef>
-            <a:effectRef idx="0">
-              <a:schemeClr val="accent1"/>
-            </a:effectRef>
-            <a:fontRef idx="minor">
-              <a:schemeClr val="lt1"/>
-            </a:fontRef>
-          </p:style>
-          <p:txBody>
-            <a:bodyPr rtlCol="0" anchor="ctr" anchorCtr="0"/>
-            <a:lstStyle/>
-            <a:p>
-              <a:endParaRPr lang="en-US" sz="1400" dirty="0">
-                <a:solidFill>
-                  <a:schemeClr val="accent5">
-                    <a:lumMod val="20000"/>
-                    <a:lumOff val="80000"/>
-                  </a:schemeClr>
-                </a:solidFill>
-              </a:endParaRPr>
-            </a:p>
-          </p:txBody>
-        </p:sp>
-        <p:sp>
-          <p:nvSpPr>
-            <p:cNvPr id="7" name="Rectangle 6">
-              <a:extLst>
-                <a:ext uri="{FF2B5EF4-FFF2-40B4-BE49-F238E27FC236}">
-                  <a16:creationId xmlns:a16="http://schemas.microsoft.com/office/drawing/2014/main" id="{1F872621-EC48-3332-CBBC-2C03012BFD07}"/>
-                </a:ext>
-              </a:extLst>
-            </p:cNvPr>
-            <p:cNvSpPr/>
-            <p:nvPr/>
-          </p:nvSpPr>
-          <p:spPr>
-            <a:xfrm>
-              <a:off x="5128640" y="454302"/>
-              <a:ext cx="2635602" cy="770347"/>
-            </a:xfrm>
-            <a:prstGeom prst="rect">
-              <a:avLst/>
-            </a:prstGeom>
-            <a:solidFill>
-              <a:schemeClr val="accent3">
-                <a:lumMod val="20000"/>
-                <a:lumOff val="80000"/>
-              </a:schemeClr>
-            </a:solidFill>
-            <a:ln>
-              <a:noFill/>
-            </a:ln>
-          </p:spPr>
-          <p:style>
-            <a:lnRef idx="2">
-              <a:schemeClr val="accent1">
-                <a:shade val="50000"/>
-              </a:schemeClr>
-            </a:lnRef>
-            <a:fillRef idx="1">
-              <a:schemeClr val="accent1"/>
-            </a:fillRef>
-            <a:effectRef idx="0">
-              <a:schemeClr val="accent1"/>
-            </a:effectRef>
-            <a:fontRef idx="minor">
-              <a:schemeClr val="lt1"/>
-            </a:fontRef>
-          </p:style>
-          <p:txBody>
-            <a:bodyPr rtlCol="0" anchor="ctr" anchorCtr="0"/>
-            <a:lstStyle/>
-            <a:p>
-              <a:endParaRPr lang="en-US" sz="1400" dirty="0">
-                <a:solidFill>
-                  <a:schemeClr val="tx1"/>
-                </a:solidFill>
-                <a:latin typeface="Consolas" panose="020B0609020204030204" pitchFamily="49" charset="0"/>
-                <a:cs typeface="Consolas" panose="020B0609020204030204" pitchFamily="49" charset="0"/>
-              </a:endParaRPr>
-            </a:p>
-          </p:txBody>
-        </p:sp>
-        <p:sp>
-          <p:nvSpPr>
-            <p:cNvPr id="17" name="Rectangle 16">
-              <a:extLst>
-                <a:ext uri="{FF2B5EF4-FFF2-40B4-BE49-F238E27FC236}">
-                  <a16:creationId xmlns:a16="http://schemas.microsoft.com/office/drawing/2014/main" id="{4A974896-1FB6-99BD-E3C1-66A923F1844A}"/>
-                </a:ext>
-              </a:extLst>
-            </p:cNvPr>
-            <p:cNvSpPr/>
-            <p:nvPr/>
-          </p:nvSpPr>
-          <p:spPr>
-            <a:xfrm>
-              <a:off x="5114451" y="3432779"/>
-              <a:ext cx="1290896" cy="265172"/>
-            </a:xfrm>
-            <a:prstGeom prst="rect">
-              <a:avLst/>
-            </a:prstGeom>
-            <a:solidFill>
-              <a:schemeClr val="accent2">
-                <a:lumMod val="20000"/>
-                <a:lumOff val="80000"/>
-                <a:alpha val="89000"/>
-              </a:schemeClr>
-            </a:solidFill>
-            <a:ln>
-              <a:noFill/>
-            </a:ln>
-          </p:spPr>
-          <p:style>
-            <a:lnRef idx="2">
-              <a:schemeClr val="accent1">
-                <a:shade val="50000"/>
-              </a:schemeClr>
-            </a:lnRef>
-            <a:fillRef idx="1">
-              <a:schemeClr val="accent1"/>
-            </a:fillRef>
-            <a:effectRef idx="0">
-              <a:schemeClr val="accent1"/>
-            </a:effectRef>
-            <a:fontRef idx="minor">
-              <a:schemeClr val="lt1"/>
-            </a:fontRef>
-          </p:style>
-          <p:txBody>
-            <a:bodyPr rtlCol="0" anchor="ctr" anchorCtr="0"/>
-            <a:lstStyle/>
-            <a:p>
-              <a:endParaRPr lang="en-US" sz="1400" b="1" dirty="0">
-                <a:solidFill>
-                  <a:schemeClr val="tx1"/>
-                </a:solidFill>
-                <a:latin typeface="Consolas" panose="020B0609020204030204" pitchFamily="49" charset="0"/>
-                <a:cs typeface="Consolas" panose="020B0609020204030204" pitchFamily="49" charset="0"/>
-              </a:endParaRPr>
-            </a:p>
-          </p:txBody>
-        </p:sp>
-        <p:sp>
-          <p:nvSpPr>
-            <p:cNvPr id="13" name="TextBox 12">
-              <a:extLst>
-                <a:ext uri="{FF2B5EF4-FFF2-40B4-BE49-F238E27FC236}">
-                  <a16:creationId xmlns:a16="http://schemas.microsoft.com/office/drawing/2014/main" id="{0B437A3A-0629-116F-D833-3529DF7AC570}"/>
-                </a:ext>
-              </a:extLst>
-            </p:cNvPr>
-            <p:cNvSpPr txBox="1"/>
-            <p:nvPr/>
-          </p:nvSpPr>
-          <p:spPr>
-            <a:xfrm>
-              <a:off x="5047207" y="12934"/>
-              <a:ext cx="2819420" cy="1281118"/>
-            </a:xfrm>
-            <a:prstGeom prst="rect">
-              <a:avLst/>
-            </a:prstGeom>
-            <a:noFill/>
-            <a:ln>
-              <a:solidFill>
-                <a:schemeClr val="accent1"/>
-              </a:solidFill>
-            </a:ln>
-          </p:spPr>
-          <p:txBody>
-            <a:bodyPr wrap="square" rtlCol="0">
-              <a:noAutofit/>
-            </a:bodyPr>
-            <a:lstStyle/>
-            <a:p>
-              <a:r>
-                <a:rPr lang="en-US" dirty="0">
-                  <a:latin typeface="Times New Roman" panose="02020603050405020304" pitchFamily="18" charset="0"/>
-                  <a:cs typeface="Times New Roman" panose="02020603050405020304" pitchFamily="18" charset="0"/>
-                </a:rPr>
-                <a:t>REX program</a:t>
-              </a:r>
-            </a:p>
-            <a:p>
-              <a:pPr defTabSz="914400">
-                <a:defRPr/>
-              </a:pPr>
-              <a:endParaRPr lang="en-US" sz="1400" b="1" dirty="0">
-                <a:solidFill>
-                  <a:prstClr val="black"/>
-                </a:solidFill>
-                <a:latin typeface="Consolas" panose="020B0609020204030204" pitchFamily="49" charset="0"/>
-                <a:cs typeface="Consolas" panose="020B0609020204030204" pitchFamily="49" charset="0"/>
-              </a:endParaRPr>
-            </a:p>
-            <a:p>
-              <a:pPr defTabSz="914400">
-                <a:defRPr/>
-              </a:pPr>
-              <a:r>
-                <a:rPr lang="en-US" sz="1400" b="1" dirty="0">
-                  <a:solidFill>
-                    <a:prstClr val="black"/>
-                  </a:solidFill>
-                  <a:latin typeface="Consolas" panose="020B0609020204030204" pitchFamily="49" charset="0"/>
-                  <a:cs typeface="Consolas" panose="020B0609020204030204" pitchFamily="49" charset="0"/>
-                </a:rPr>
-                <a:t>rex_prog1:</a:t>
-              </a:r>
-            </a:p>
-            <a:p>
-              <a:pPr defTabSz="914400">
-                <a:defRPr/>
-              </a:pPr>
-              <a:r>
-                <a:rPr lang="en-US" sz="1400" dirty="0">
-                  <a:solidFill>
-                    <a:prstClr val="black"/>
-                  </a:solidFill>
-                  <a:latin typeface="Consolas" panose="020B0609020204030204" pitchFamily="49" charset="0"/>
-                  <a:cs typeface="Consolas" panose="020B0609020204030204" pitchFamily="49" charset="0"/>
-                </a:rPr>
-                <a:t>...</a:t>
-              </a:r>
-            </a:p>
-            <a:p>
-              <a:pPr defTabSz="914400">
-                <a:defRPr/>
-              </a:pPr>
-              <a:r>
-                <a:rPr lang="en-US" sz="1400" dirty="0">
-                  <a:solidFill>
-                    <a:prstClr val="black"/>
-                  </a:solidFill>
-                  <a:latin typeface="Consolas" panose="020B0609020204030204" pitchFamily="49" charset="0"/>
-                  <a:cs typeface="Consolas" panose="020B0609020204030204" pitchFamily="49" charset="0"/>
-                </a:rPr>
-                <a:t>ret</a:t>
-              </a:r>
-            </a:p>
-          </p:txBody>
-        </p:sp>
-        <p:sp>
-          <p:nvSpPr>
-            <p:cNvPr id="35" name="Rectangle 34">
-              <a:extLst>
-                <a:ext uri="{FF2B5EF4-FFF2-40B4-BE49-F238E27FC236}">
-                  <a16:creationId xmlns:a16="http://schemas.microsoft.com/office/drawing/2014/main" id="{3649AC7D-4CBA-CEDA-1E35-C47DC495BC39}"/>
-                </a:ext>
-              </a:extLst>
-            </p:cNvPr>
-            <p:cNvSpPr/>
-            <p:nvPr/>
-          </p:nvSpPr>
-          <p:spPr>
-            <a:xfrm>
-              <a:off x="163305" y="2458192"/>
-              <a:ext cx="944643" cy="233996"/>
-            </a:xfrm>
-            <a:prstGeom prst="rect">
-              <a:avLst/>
-            </a:prstGeom>
-            <a:solidFill>
-              <a:schemeClr val="accent2">
-                <a:lumMod val="20000"/>
-                <a:lumOff val="80000"/>
-                <a:alpha val="0"/>
-              </a:schemeClr>
-            </a:solidFill>
-            <a:ln>
-              <a:noFill/>
-            </a:ln>
-          </p:spPr>
-          <p:style>
-            <a:lnRef idx="2">
-              <a:schemeClr val="accent1">
-                <a:shade val="50000"/>
-              </a:schemeClr>
-            </a:lnRef>
-            <a:fillRef idx="1">
-              <a:schemeClr val="accent1"/>
-            </a:fillRef>
-            <a:effectRef idx="0">
-              <a:schemeClr val="accent1"/>
-            </a:effectRef>
-            <a:fontRef idx="minor">
-              <a:schemeClr val="lt1"/>
-            </a:fontRef>
-          </p:style>
-          <p:txBody>
-            <a:bodyPr rtlCol="0" anchor="ctr" anchorCtr="0"/>
-            <a:lstStyle/>
-            <a:p>
-              <a:endParaRPr lang="en-US" sz="1400" dirty="0">
-                <a:solidFill>
-                  <a:schemeClr val="tx1"/>
-                </a:solidFill>
-                <a:latin typeface="Consolas" panose="020B0609020204030204" pitchFamily="49" charset="0"/>
-                <a:cs typeface="Consolas" panose="020B0609020204030204" pitchFamily="49" charset="0"/>
-              </a:endParaRPr>
-            </a:p>
-          </p:txBody>
-        </p:sp>
-        <p:sp>
-          <p:nvSpPr>
-            <p:cNvPr id="24" name="Rectangle 23">
-              <a:extLst>
-                <a:ext uri="{FF2B5EF4-FFF2-40B4-BE49-F238E27FC236}">
-                  <a16:creationId xmlns:a16="http://schemas.microsoft.com/office/drawing/2014/main" id="{BCE7C08D-EC2E-9315-CDCC-A9F3E1412C56}"/>
-                </a:ext>
-              </a:extLst>
-            </p:cNvPr>
-            <p:cNvSpPr/>
-            <p:nvPr/>
-          </p:nvSpPr>
-          <p:spPr>
-            <a:xfrm>
-              <a:off x="161813" y="2714224"/>
-              <a:ext cx="4014215" cy="1102123"/>
-            </a:xfrm>
-            <a:prstGeom prst="rect">
-              <a:avLst/>
-            </a:prstGeom>
-            <a:solidFill>
-              <a:schemeClr val="accent6">
-                <a:lumMod val="20000"/>
-                <a:lumOff val="80000"/>
-                <a:alpha val="0"/>
-              </a:schemeClr>
-            </a:solidFill>
-            <a:ln>
-              <a:noFill/>
-            </a:ln>
-          </p:spPr>
-          <p:style>
-            <a:lnRef idx="2">
-              <a:schemeClr val="accent1">
-                <a:shade val="50000"/>
-              </a:schemeClr>
-            </a:lnRef>
-            <a:fillRef idx="1">
-              <a:schemeClr val="accent1"/>
-            </a:fillRef>
-            <a:effectRef idx="0">
-              <a:schemeClr val="accent1"/>
-            </a:effectRef>
-            <a:fontRef idx="minor">
-              <a:schemeClr val="lt1"/>
-            </a:fontRef>
-          </p:style>
-          <p:txBody>
-            <a:bodyPr rtlCol="0" anchor="ctr"/>
-            <a:lstStyle/>
-            <a:p>
-              <a:pPr algn="ctr"/>
-              <a:endParaRPr lang="en-US" sz="600" dirty="0"/>
-            </a:p>
-          </p:txBody>
-        </p:sp>
-        <p:sp>
-          <p:nvSpPr>
-            <p:cNvPr id="8" name="Rectangle 7">
-              <a:extLst>
-                <a:ext uri="{FF2B5EF4-FFF2-40B4-BE49-F238E27FC236}">
-                  <a16:creationId xmlns:a16="http://schemas.microsoft.com/office/drawing/2014/main" id="{CF488771-0B9B-DFD8-B008-7EA5FC0673BC}"/>
-                </a:ext>
-              </a:extLst>
-            </p:cNvPr>
-            <p:cNvSpPr/>
-            <p:nvPr/>
-          </p:nvSpPr>
-          <p:spPr>
-            <a:xfrm>
-              <a:off x="152669" y="1854690"/>
-              <a:ext cx="2560113" cy="378219"/>
-            </a:xfrm>
-            <a:prstGeom prst="rect">
-              <a:avLst/>
-            </a:prstGeom>
-            <a:solidFill>
-              <a:schemeClr val="accent2">
-                <a:lumMod val="20000"/>
-                <a:lumOff val="80000"/>
-                <a:alpha val="0"/>
-              </a:schemeClr>
-            </a:solidFill>
-            <a:ln>
-              <a:noFill/>
-            </a:ln>
-          </p:spPr>
-          <p:style>
-            <a:lnRef idx="2">
-              <a:schemeClr val="accent1">
-                <a:shade val="50000"/>
-              </a:schemeClr>
-            </a:lnRef>
-            <a:fillRef idx="1">
-              <a:schemeClr val="accent1"/>
-            </a:fillRef>
-            <a:effectRef idx="0">
-              <a:schemeClr val="accent1"/>
-            </a:effectRef>
-            <a:fontRef idx="minor">
-              <a:schemeClr val="lt1"/>
-            </a:fontRef>
-          </p:style>
-          <p:txBody>
-            <a:bodyPr rtlCol="0" anchor="ctr" anchorCtr="0"/>
-            <a:lstStyle/>
-            <a:p>
-              <a:endParaRPr lang="en-US" sz="1400" dirty="0">
-                <a:solidFill>
-                  <a:schemeClr val="tx1"/>
-                </a:solidFill>
-                <a:latin typeface="Consolas" panose="020B0609020204030204" pitchFamily="49" charset="0"/>
-                <a:cs typeface="Consolas" panose="020B0609020204030204" pitchFamily="49" charset="0"/>
-              </a:endParaRPr>
-            </a:p>
-          </p:txBody>
-        </p:sp>
-        <p:sp>
-          <p:nvSpPr>
-            <p:cNvPr id="5" name="Rectangle 4">
-              <a:extLst>
-                <a:ext uri="{FF2B5EF4-FFF2-40B4-BE49-F238E27FC236}">
-                  <a16:creationId xmlns:a16="http://schemas.microsoft.com/office/drawing/2014/main" id="{450B10D6-AD2E-7932-C9ED-F99E35ABC865}"/>
-                </a:ext>
-              </a:extLst>
-            </p:cNvPr>
-            <p:cNvSpPr/>
-            <p:nvPr/>
-          </p:nvSpPr>
-          <p:spPr>
-            <a:xfrm>
-              <a:off x="163307" y="380328"/>
-              <a:ext cx="4010567" cy="3391858"/>
-            </a:xfrm>
-            <a:prstGeom prst="rect">
-              <a:avLst/>
-            </a:prstGeom>
-            <a:solidFill>
-              <a:schemeClr val="accent4">
-                <a:lumMod val="20000"/>
-                <a:lumOff val="80000"/>
-                <a:alpha val="50000"/>
-              </a:schemeClr>
-            </a:solidFill>
-            <a:ln>
-              <a:noFill/>
-            </a:ln>
-          </p:spPr>
-          <p:style>
-            <a:lnRef idx="2">
-              <a:schemeClr val="accent1">
-                <a:shade val="50000"/>
-              </a:schemeClr>
-            </a:lnRef>
-            <a:fillRef idx="1">
-              <a:schemeClr val="accent1"/>
-            </a:fillRef>
-            <a:effectRef idx="0">
-              <a:schemeClr val="accent1"/>
-            </a:effectRef>
-            <a:fontRef idx="minor">
-              <a:schemeClr val="lt1"/>
-            </a:fontRef>
-          </p:style>
-          <p:txBody>
-            <a:bodyPr rtlCol="0" anchor="ctr" anchorCtr="0"/>
-            <a:lstStyle/>
-            <a:p>
-              <a:endParaRPr lang="en-US" sz="1400" dirty="0">
-                <a:solidFill>
-                  <a:schemeClr val="tx1"/>
-                </a:solidFill>
-                <a:latin typeface="Consolas" panose="020B0609020204030204" pitchFamily="49" charset="0"/>
-                <a:cs typeface="Consolas" panose="020B0609020204030204" pitchFamily="49" charset="0"/>
-              </a:endParaRPr>
-            </a:p>
-          </p:txBody>
-        </p:sp>
-        <p:cxnSp>
-          <p:nvCxnSpPr>
-            <p:cNvPr id="12" name="Elbow Connector 11">
-              <a:extLst>
-                <a:ext uri="{FF2B5EF4-FFF2-40B4-BE49-F238E27FC236}">
-                  <a16:creationId xmlns:a16="http://schemas.microsoft.com/office/drawing/2014/main" id="{A3231205-109F-A30C-CF11-C6E1F95CDE41}"/>
-                </a:ext>
-              </a:extLst>
-            </p:cNvPr>
-            <p:cNvCxnSpPr>
-              <a:cxnSpLocks/>
-              <a:stCxn id="8" idx="3"/>
-              <a:endCxn id="13" idx="1"/>
-            </p:cNvCxnSpPr>
-            <p:nvPr/>
-          </p:nvCxnSpPr>
-          <p:spPr>
-            <a:xfrm flipV="1">
-              <a:off x="2712781" y="653495"/>
-              <a:ext cx="2334426" cy="1390305"/>
-            </a:xfrm>
-            <a:prstGeom prst="bentConnector3">
-              <a:avLst>
-                <a:gd name="adj1" fmla="val 79378"/>
-              </a:avLst>
-            </a:prstGeom>
-            <a:ln w="34925">
-              <a:prstDash val="sysDot"/>
-              <a:round/>
-              <a:tailEnd type="triangle"/>
-            </a:ln>
-          </p:spPr>
-          <p:style>
-            <a:lnRef idx="2">
-              <a:schemeClr val="accent1"/>
-            </a:lnRef>
-            <a:fillRef idx="0">
-              <a:schemeClr val="accent1"/>
-            </a:fillRef>
-            <a:effectRef idx="1">
-              <a:schemeClr val="accent1"/>
-            </a:effectRef>
-            <a:fontRef idx="minor">
-              <a:schemeClr val="tx1"/>
-            </a:fontRef>
-          </p:style>
-        </p:cxnSp>
-        <p:cxnSp>
-          <p:nvCxnSpPr>
-            <p:cNvPr id="25" name="Elbow Connector 24">
-              <a:extLst>
-                <a:ext uri="{FF2B5EF4-FFF2-40B4-BE49-F238E27FC236}">
-                  <a16:creationId xmlns:a16="http://schemas.microsoft.com/office/drawing/2014/main" id="{2F54CABE-64E2-06DB-D490-8B90FE20D1FD}"/>
-                </a:ext>
-              </a:extLst>
-            </p:cNvPr>
-            <p:cNvCxnSpPr>
-              <a:cxnSpLocks/>
-              <a:stCxn id="40" idx="10"/>
-              <a:endCxn id="9" idx="1"/>
-            </p:cNvCxnSpPr>
-            <p:nvPr/>
-          </p:nvCxnSpPr>
-          <p:spPr>
-            <a:xfrm rot="10800000" flipV="1">
-              <a:off x="5114452" y="1827224"/>
-              <a:ext cx="147804" cy="884900"/>
-            </a:xfrm>
-            <a:prstGeom prst="bentConnector3">
-              <a:avLst>
-                <a:gd name="adj1" fmla="val 254664"/>
-              </a:avLst>
-            </a:prstGeom>
-            <a:ln w="34925">
-              <a:solidFill>
-                <a:srgbClr val="C00000"/>
-              </a:solidFill>
-              <a:prstDash val="sysDot"/>
-              <a:round/>
-              <a:tailEnd type="triangle"/>
-            </a:ln>
-          </p:spPr>
-          <p:style>
-            <a:lnRef idx="2">
-              <a:schemeClr val="accent1"/>
-            </a:lnRef>
-            <a:fillRef idx="0">
-              <a:schemeClr val="accent1"/>
-            </a:fillRef>
-            <a:effectRef idx="1">
-              <a:schemeClr val="accent1"/>
-            </a:effectRef>
-            <a:fontRef idx="minor">
-              <a:schemeClr val="tx1"/>
-            </a:fontRef>
-          </p:style>
-        </p:cxnSp>
-        <p:cxnSp>
-          <p:nvCxnSpPr>
-            <p:cNvPr id="30" name="Elbow Connector 29">
-              <a:extLst>
-                <a:ext uri="{FF2B5EF4-FFF2-40B4-BE49-F238E27FC236}">
-                  <a16:creationId xmlns:a16="http://schemas.microsoft.com/office/drawing/2014/main" id="{C8356E87-ED45-E11E-3550-C91B39E5519C}"/>
-                </a:ext>
-              </a:extLst>
-            </p:cNvPr>
-            <p:cNvCxnSpPr>
-              <a:cxnSpLocks/>
-              <a:stCxn id="17" idx="1"/>
-              <a:endCxn id="35" idx="3"/>
-            </p:cNvCxnSpPr>
-            <p:nvPr/>
-          </p:nvCxnSpPr>
-          <p:spPr>
-            <a:xfrm rot="10800000">
-              <a:off x="1107949" y="2575191"/>
-              <a:ext cx="4006503" cy="990175"/>
-            </a:xfrm>
-            <a:prstGeom prst="bentConnector3">
-              <a:avLst>
-                <a:gd name="adj1" fmla="val 13575"/>
-              </a:avLst>
-            </a:prstGeom>
-            <a:ln w="34925">
-              <a:solidFill>
-                <a:srgbClr val="C00000"/>
-              </a:solidFill>
-              <a:prstDash val="sysDot"/>
-              <a:round/>
-              <a:tailEnd type="triangle"/>
-            </a:ln>
-          </p:spPr>
-          <p:style>
-            <a:lnRef idx="2">
-              <a:schemeClr val="accent1"/>
-            </a:lnRef>
-            <a:fillRef idx="0">
-              <a:schemeClr val="accent1"/>
-            </a:fillRef>
-            <a:effectRef idx="1">
-              <a:schemeClr val="accent1"/>
-            </a:effectRef>
-            <a:fontRef idx="minor">
-              <a:schemeClr val="tx1"/>
-            </a:fontRef>
-          </p:style>
-        </p:cxnSp>
-        <p:sp>
-          <p:nvSpPr>
-            <p:cNvPr id="40" name="16-Point Star 39">
-              <a:extLst>
-                <a:ext uri="{FF2B5EF4-FFF2-40B4-BE49-F238E27FC236}">
-                  <a16:creationId xmlns:a16="http://schemas.microsoft.com/office/drawing/2014/main" id="{E0C00056-8436-14D3-AF56-F2F1B14659C5}"/>
-                </a:ext>
-              </a:extLst>
-            </p:cNvPr>
-            <p:cNvSpPr/>
-            <p:nvPr/>
-          </p:nvSpPr>
-          <p:spPr>
-            <a:xfrm>
-              <a:off x="5262256" y="1514173"/>
-              <a:ext cx="1266951" cy="626102"/>
-            </a:xfrm>
-            <a:prstGeom prst="star16">
-              <a:avLst/>
-            </a:prstGeom>
-            <a:solidFill>
-              <a:srgbClr val="FFFF00"/>
-            </a:solidFill>
-          </p:spPr>
-          <p:style>
-            <a:lnRef idx="2">
-              <a:schemeClr val="accent1">
-                <a:shade val="15000"/>
-              </a:schemeClr>
-            </a:lnRef>
-            <a:fillRef idx="1">
-              <a:schemeClr val="accent1"/>
-            </a:fillRef>
-            <a:effectRef idx="0">
-              <a:schemeClr val="accent1"/>
-            </a:effectRef>
-            <a:fontRef idx="minor">
-              <a:schemeClr val="lt1"/>
-            </a:fontRef>
-          </p:style>
-          <p:txBody>
-            <a:bodyPr rtlCol="0" anchor="ctr"/>
-            <a:lstStyle/>
-            <a:p>
-              <a:pPr algn="ctr"/>
-              <a:r>
-                <a:rPr lang="en-US" sz="1600" dirty="0">
-                  <a:solidFill>
-                    <a:schemeClr val="tx1"/>
-                  </a:solidFill>
-                  <a:latin typeface="Times New Roman" panose="02020603050405020304" pitchFamily="18" charset="0"/>
-                  <a:cs typeface="Times New Roman" panose="02020603050405020304" pitchFamily="18" charset="0"/>
-                </a:rPr>
-                <a:t>Panic</a:t>
-              </a:r>
-            </a:p>
-          </p:txBody>
-        </p:sp>
-        <p:sp>
-          <p:nvSpPr>
-            <p:cNvPr id="9" name="Rectangle 8">
-              <a:extLst>
-                <a:ext uri="{FF2B5EF4-FFF2-40B4-BE49-F238E27FC236}">
-                  <a16:creationId xmlns:a16="http://schemas.microsoft.com/office/drawing/2014/main" id="{5EDB9AA2-1D81-1C8E-BD4D-8E31340F0699}"/>
-                </a:ext>
-              </a:extLst>
-            </p:cNvPr>
-            <p:cNvSpPr/>
-            <p:nvPr/>
-          </p:nvSpPr>
-          <p:spPr>
-            <a:xfrm>
-              <a:off x="5114452" y="2586555"/>
-              <a:ext cx="1540921" cy="251137"/>
-            </a:xfrm>
-            <a:prstGeom prst="rect">
-              <a:avLst/>
-            </a:prstGeom>
-            <a:solidFill>
-              <a:schemeClr val="accent1">
-                <a:alpha val="0"/>
-              </a:schemeClr>
-            </a:solidFill>
-            <a:ln>
-              <a:noFill/>
-            </a:ln>
-          </p:spPr>
-          <p:style>
-            <a:lnRef idx="2">
-              <a:schemeClr val="accent1">
-                <a:shade val="15000"/>
-              </a:schemeClr>
-            </a:lnRef>
-            <a:fillRef idx="1">
-              <a:schemeClr val="accent1"/>
-            </a:fillRef>
-            <a:effectRef idx="0">
-              <a:schemeClr val="accent1"/>
-            </a:effectRef>
-            <a:fontRef idx="minor">
-              <a:schemeClr val="lt1"/>
-            </a:fontRef>
-          </p:style>
-          <p:txBody>
-            <a:bodyPr rtlCol="0" anchor="ctr"/>
-            <a:lstStyle/>
-            <a:p>
-              <a:pPr algn="ctr"/>
-              <a:endParaRPr lang="en-US" dirty="0"/>
-            </a:p>
-          </p:txBody>
-        </p:sp>
-        <p:cxnSp>
-          <p:nvCxnSpPr>
-            <p:cNvPr id="15" name="Elbow Connector 14">
-              <a:extLst>
-                <a:ext uri="{FF2B5EF4-FFF2-40B4-BE49-F238E27FC236}">
-                  <a16:creationId xmlns:a16="http://schemas.microsoft.com/office/drawing/2014/main" id="{810763AC-E56E-511C-01EB-3FFB1CCA76FC}"/>
-                </a:ext>
-              </a:extLst>
-            </p:cNvPr>
-            <p:cNvCxnSpPr>
-              <a:cxnSpLocks/>
-              <a:stCxn id="22" idx="3"/>
-              <a:endCxn id="40" idx="14"/>
-            </p:cNvCxnSpPr>
-            <p:nvPr/>
-          </p:nvCxnSpPr>
-          <p:spPr>
-            <a:xfrm>
-              <a:off x="5486400" y="896555"/>
-              <a:ext cx="409332" cy="617618"/>
-            </a:xfrm>
-            <a:prstGeom prst="bentConnector2">
-              <a:avLst/>
-            </a:prstGeom>
-            <a:ln w="34925">
-              <a:solidFill>
-                <a:srgbClr val="C00000"/>
-              </a:solidFill>
-              <a:prstDash val="sysDot"/>
-              <a:round/>
-              <a:tailEnd type="triangle"/>
-            </a:ln>
-          </p:spPr>
-          <p:style>
-            <a:lnRef idx="2">
-              <a:schemeClr val="accent1"/>
-            </a:lnRef>
-            <a:fillRef idx="0">
-              <a:schemeClr val="accent1"/>
-            </a:fillRef>
-            <a:effectRef idx="1">
-              <a:schemeClr val="accent1"/>
-            </a:effectRef>
-            <a:fontRef idx="minor">
-              <a:schemeClr val="tx1"/>
-            </a:fontRef>
-          </p:style>
-        </p:cxnSp>
-        <p:sp>
-          <p:nvSpPr>
-            <p:cNvPr id="22" name="Rectangle 21">
-              <a:extLst>
-                <a:ext uri="{FF2B5EF4-FFF2-40B4-BE49-F238E27FC236}">
-                  <a16:creationId xmlns:a16="http://schemas.microsoft.com/office/drawing/2014/main" id="{17C96EE5-C1CA-1C2F-7300-AA9E703BD53E}"/>
-                </a:ext>
-              </a:extLst>
-            </p:cNvPr>
-            <p:cNvSpPr/>
-            <p:nvPr/>
-          </p:nvSpPr>
-          <p:spPr>
-            <a:xfrm>
-              <a:off x="5128639" y="794327"/>
-              <a:ext cx="357761" cy="204455"/>
-            </a:xfrm>
-            <a:prstGeom prst="rect">
-              <a:avLst/>
-            </a:prstGeom>
-            <a:solidFill>
-              <a:schemeClr val="accent1">
-                <a:alpha val="0"/>
-              </a:schemeClr>
-            </a:solidFill>
-            <a:ln>
-              <a:noFill/>
-            </a:ln>
-          </p:spPr>
-          <p:style>
-            <a:lnRef idx="2">
-              <a:schemeClr val="accent1">
-                <a:shade val="15000"/>
-              </a:schemeClr>
-            </a:lnRef>
-            <a:fillRef idx="1">
-              <a:schemeClr val="accent1"/>
-            </a:fillRef>
-            <a:effectRef idx="0">
-              <a:schemeClr val="accent1"/>
-            </a:effectRef>
-            <a:fontRef idx="minor">
-              <a:schemeClr val="lt1"/>
-            </a:fontRef>
-          </p:style>
-          <p:txBody>
-            <a:bodyPr rtlCol="0" anchor="ctr"/>
-            <a:lstStyle/>
-            <a:p>
-              <a:pPr algn="ctr"/>
-              <a:endParaRPr lang="en-US"/>
-            </a:p>
-          </p:txBody>
-        </p:sp>
-        <p:sp>
-          <p:nvSpPr>
-            <p:cNvPr id="14" name="TextBox 13">
-              <a:extLst>
-                <a:ext uri="{FF2B5EF4-FFF2-40B4-BE49-F238E27FC236}">
-                  <a16:creationId xmlns:a16="http://schemas.microsoft.com/office/drawing/2014/main" id="{A65E88A0-512F-D08C-B8AB-6BEAC25C63D9}"/>
-                </a:ext>
-              </a:extLst>
-            </p:cNvPr>
-            <p:cNvSpPr txBox="1"/>
-            <p:nvPr/>
-          </p:nvSpPr>
-          <p:spPr>
-            <a:xfrm>
-              <a:off x="5047207" y="2263921"/>
-              <a:ext cx="3012130" cy="1508265"/>
-            </a:xfrm>
-            <a:prstGeom prst="rect">
-              <a:avLst/>
-            </a:prstGeom>
-            <a:noFill/>
-            <a:ln>
-              <a:solidFill>
-                <a:schemeClr val="accent1"/>
-              </a:solidFill>
-            </a:ln>
-          </p:spPr>
-          <p:txBody>
-            <a:bodyPr wrap="square" rtlCol="0">
-              <a:noAutofit/>
-            </a:bodyPr>
-            <a:lstStyle/>
-            <a:p>
-              <a:r>
-                <a:rPr lang="en-US" dirty="0">
-                  <a:latin typeface="Times New Roman" panose="02020603050405020304" pitchFamily="18" charset="0"/>
-                  <a:cs typeface="Times New Roman" panose="02020603050405020304" pitchFamily="18" charset="0"/>
-                </a:rPr>
-                <a:t>In-kernel </a:t>
-              </a:r>
-              <a:r>
-                <a:rPr lang="en-US" dirty="0" err="1">
-                  <a:latin typeface="Times New Roman" panose="02020603050405020304" pitchFamily="18" charset="0"/>
-                  <a:cs typeface="Times New Roman" panose="02020603050405020304" pitchFamily="18" charset="0"/>
-                </a:rPr>
-                <a:t>landingpad</a:t>
-              </a:r>
-              <a:endParaRPr lang="en-US" dirty="0">
+          </a:ln>
+        </p:spPr>
+        <p:txBody>
+          <a:bodyPr wrap="square" rtlCol="0">
+            <a:noAutofit/>
+          </a:bodyPr>
+          <a:lstStyle/>
+          <a:p>
+            <a:r>
+              <a:rPr lang="en-US" dirty="0">
                 <a:latin typeface="Times New Roman" panose="02020603050405020304" pitchFamily="18" charset="0"/>
                 <a:cs typeface="Times New Roman" panose="02020603050405020304" pitchFamily="18" charset="0"/>
-              </a:endParaRPr>
-            </a:p>
-            <a:p>
-              <a:r>
-                <a:rPr lang="en-US" sz="1400" b="1" dirty="0" err="1">
-                  <a:latin typeface="Consolas" panose="020B0609020204030204" pitchFamily="49" charset="0"/>
-                  <a:cs typeface="Consolas" panose="020B0609020204030204" pitchFamily="49" charset="0"/>
-                </a:rPr>
-                <a:t>rex_landingpad</a:t>
-              </a:r>
-              <a:r>
-                <a:rPr lang="en-US" sz="1400" b="1" dirty="0">
-                  <a:latin typeface="Consolas" panose="020B0609020204030204" pitchFamily="49" charset="0"/>
-                  <a:cs typeface="Consolas" panose="020B0609020204030204" pitchFamily="49" charset="0"/>
-                </a:rPr>
-                <a:t>:</a:t>
-              </a:r>
-            </a:p>
-            <a:p>
-              <a:r>
-                <a:rPr lang="en-US" sz="1398" dirty="0">
-                  <a:solidFill>
-                    <a:schemeClr val="accent6">
-                      <a:lumMod val="75000"/>
-                    </a:schemeClr>
-                  </a:solidFill>
-                  <a:latin typeface="Consolas" panose="020B0609020204030204" pitchFamily="49" charset="0"/>
-                  <a:cs typeface="Consolas" panose="020B0609020204030204" pitchFamily="49" charset="0"/>
-                </a:rPr>
-                <a:t>// report error</a:t>
-              </a:r>
-            </a:p>
-            <a:p>
-              <a:r>
-                <a:rPr lang="en-US" sz="1398" dirty="0">
-                  <a:solidFill>
-                    <a:schemeClr val="accent6">
-                      <a:lumMod val="75000"/>
-                    </a:schemeClr>
-                  </a:solidFill>
-                  <a:latin typeface="Consolas" panose="020B0609020204030204" pitchFamily="49" charset="0"/>
-                  <a:cs typeface="Consolas" panose="020B0609020204030204" pitchFamily="49" charset="0"/>
-                </a:rPr>
-                <a:t>// set default return value</a:t>
-              </a:r>
-            </a:p>
-            <a:p>
-              <a:r>
-                <a:rPr lang="en-US" sz="1400" dirty="0">
-                  <a:latin typeface="Consolas" panose="020B0609020204030204" pitchFamily="49" charset="0"/>
-                  <a:cs typeface="Consolas" panose="020B0609020204030204" pitchFamily="49" charset="0"/>
-                </a:rPr>
-                <a:t>...</a:t>
-              </a:r>
-            </a:p>
-            <a:p>
-              <a:r>
-                <a:rPr lang="en-US" sz="1400" b="1" dirty="0" err="1">
-                  <a:latin typeface="Consolas" panose="020B0609020204030204" pitchFamily="49" charset="0"/>
-                  <a:cs typeface="Consolas" panose="020B0609020204030204" pitchFamily="49" charset="0"/>
-                </a:rPr>
-                <a:t>jmp</a:t>
-              </a:r>
-              <a:r>
-                <a:rPr lang="en-US" sz="1400" b="1" dirty="0">
-                  <a:latin typeface="Consolas" panose="020B0609020204030204" pitchFamily="49" charset="0"/>
-                  <a:cs typeface="Consolas" panose="020B0609020204030204" pitchFamily="49" charset="0"/>
-                </a:rPr>
-                <a:t> </a:t>
-              </a:r>
-              <a:r>
-                <a:rPr lang="en-US" sz="1400" b="1" dirty="0" err="1">
-                  <a:latin typeface="Consolas" panose="020B0609020204030204" pitchFamily="49" charset="0"/>
-                  <a:cs typeface="Consolas" panose="020B0609020204030204" pitchFamily="49" charset="0"/>
-                </a:rPr>
-                <a:t>rex_exit</a:t>
-              </a:r>
-              <a:endParaRPr lang="en-US" sz="1400" b="1" dirty="0">
-                <a:latin typeface="Consolas" panose="020B0609020204030204" pitchFamily="49" charset="0"/>
-                <a:cs typeface="Consolas" panose="020B0609020204030204" pitchFamily="49" charset="0"/>
-              </a:endParaRPr>
-            </a:p>
-          </p:txBody>
-        </p:sp>
-        <p:sp>
-          <p:nvSpPr>
-            <p:cNvPr id="4" name="TextBox 3">
-              <a:extLst>
-                <a:ext uri="{FF2B5EF4-FFF2-40B4-BE49-F238E27FC236}">
-                  <a16:creationId xmlns:a16="http://schemas.microsoft.com/office/drawing/2014/main" id="{DC5D00EE-0AFF-B160-215E-307CB2FC6491}"/>
-                </a:ext>
-              </a:extLst>
-            </p:cNvPr>
-            <p:cNvSpPr txBox="1"/>
-            <p:nvPr/>
-          </p:nvSpPr>
-          <p:spPr>
-            <a:xfrm>
-              <a:off x="92154" y="12936"/>
-              <a:ext cx="4162402" cy="3759250"/>
-            </a:xfrm>
-            <a:prstGeom prst="rect">
-              <a:avLst/>
-            </a:prstGeom>
+              </a:rPr>
+              <a:t>Rex panic handler</a:t>
+            </a:r>
+            <a:endParaRPr lang="en-US" sz="1400" b="1" dirty="0">
+              <a:solidFill>
+                <a:prstClr val="black"/>
+              </a:solidFill>
+              <a:latin typeface="Consolas" panose="020B0609020204030204" pitchFamily="49" charset="0"/>
+              <a:cs typeface="Consolas" panose="020B0609020204030204" pitchFamily="49" charset="0"/>
+            </a:endParaRPr>
+          </a:p>
+          <a:p>
+            <a:pPr defTabSz="914400">
+              <a:defRPr/>
+            </a:pPr>
+            <a:r>
+              <a:rPr lang="en-US" sz="1398" dirty="0">
+                <a:solidFill>
+                  <a:schemeClr val="accent6">
+                    <a:lumMod val="75000"/>
+                  </a:schemeClr>
+                </a:solidFill>
+                <a:latin typeface="Consolas" panose="020B0609020204030204" pitchFamily="49" charset="0"/>
+                <a:cs typeface="Consolas" panose="020B0609020204030204" pitchFamily="49" charset="0"/>
+              </a:rPr>
+              <a:t>// retrieve </a:t>
+            </a:r>
+            <a:r>
+              <a:rPr lang="en-US" sz="1398" dirty="0" err="1">
+                <a:solidFill>
+                  <a:schemeClr val="accent6">
+                    <a:lumMod val="75000"/>
+                  </a:schemeClr>
+                </a:solidFill>
+                <a:latin typeface="Consolas" panose="020B0609020204030204" pitchFamily="49" charset="0"/>
+                <a:cs typeface="Consolas" panose="020B0609020204030204" pitchFamily="49" charset="0"/>
+              </a:rPr>
+              <a:t>CleanupEntry</a:t>
+            </a:r>
+            <a:r>
+              <a:rPr lang="en-US" sz="1398" dirty="0">
+                <a:solidFill>
+                  <a:schemeClr val="accent6">
+                    <a:lumMod val="75000"/>
+                  </a:schemeClr>
+                </a:solidFill>
+                <a:latin typeface="Consolas" panose="020B0609020204030204" pitchFamily="49" charset="0"/>
+                <a:cs typeface="Consolas" panose="020B0609020204030204" pitchFamily="49" charset="0"/>
+              </a:rPr>
+              <a:t> on the current CPU</a:t>
+            </a:r>
+          </a:p>
+          <a:p>
+            <a:pPr defTabSz="914400">
+              <a:defRPr/>
+            </a:pPr>
+            <a:r>
+              <a:rPr lang="en-US" sz="1400" dirty="0" err="1">
+                <a:solidFill>
+                  <a:prstClr val="black"/>
+                </a:solidFill>
+                <a:latin typeface="Consolas" panose="020B0609020204030204" pitchFamily="49" charset="0"/>
+                <a:cs typeface="Consolas" panose="020B0609020204030204" pitchFamily="49" charset="0"/>
+              </a:rPr>
+              <a:t>this_cpu_read</a:t>
+            </a:r>
+            <a:r>
+              <a:rPr lang="en-US" sz="1400" dirty="0">
+                <a:solidFill>
+                  <a:prstClr val="black"/>
+                </a:solidFill>
+                <a:latin typeface="Consolas" panose="020B0609020204030204" pitchFamily="49" charset="0"/>
+                <a:cs typeface="Consolas" panose="020B0609020204030204" pitchFamily="49" charset="0"/>
+              </a:rPr>
+              <a:t>(</a:t>
+            </a:r>
+            <a:r>
+              <a:rPr lang="en-US" sz="1400" dirty="0" err="1">
+                <a:solidFill>
+                  <a:prstClr val="black"/>
+                </a:solidFill>
+                <a:latin typeface="Consolas" panose="020B0609020204030204" pitchFamily="49" charset="0"/>
+                <a:cs typeface="Consolas" panose="020B0609020204030204" pitchFamily="49" charset="0"/>
+              </a:rPr>
+              <a:t>rex_cleanup_entries</a:t>
+            </a:r>
+            <a:r>
+              <a:rPr lang="en-US" sz="1400" dirty="0">
+                <a:solidFill>
+                  <a:prstClr val="black"/>
+                </a:solidFill>
+                <a:latin typeface="Consolas" panose="020B0609020204030204" pitchFamily="49" charset="0"/>
+                <a:cs typeface="Consolas" panose="020B0609020204030204" pitchFamily="49" charset="0"/>
+              </a:rPr>
+              <a:t>)</a:t>
+            </a:r>
+            <a:endParaRPr lang="en-US" sz="1398" dirty="0">
+              <a:solidFill>
+                <a:schemeClr val="accent6">
+                  <a:lumMod val="75000"/>
+                </a:schemeClr>
+              </a:solidFill>
+              <a:latin typeface="Consolas" panose="020B0609020204030204" pitchFamily="49" charset="0"/>
+              <a:cs typeface="Consolas" panose="020B0609020204030204" pitchFamily="49" charset="0"/>
+            </a:endParaRPr>
+          </a:p>
+          <a:p>
+            <a:pPr defTabSz="914400">
+              <a:defRPr/>
+            </a:pPr>
+            <a:r>
+              <a:rPr lang="en-US" sz="1398" dirty="0">
+                <a:solidFill>
+                  <a:schemeClr val="accent6">
+                    <a:lumMod val="75000"/>
+                  </a:schemeClr>
+                </a:solidFill>
+                <a:latin typeface="Consolas" panose="020B0609020204030204" pitchFamily="49" charset="0"/>
+                <a:cs typeface="Consolas" panose="020B0609020204030204" pitchFamily="49" charset="0"/>
+              </a:rPr>
+              <a:t>// call </a:t>
+            </a:r>
+            <a:r>
+              <a:rPr lang="en-US" sz="1398" dirty="0" err="1">
+                <a:solidFill>
+                  <a:schemeClr val="accent6">
+                    <a:lumMod val="75000"/>
+                  </a:schemeClr>
+                </a:solidFill>
+                <a:latin typeface="Consolas" panose="020B0609020204030204" pitchFamily="49" charset="0"/>
+                <a:cs typeface="Consolas" panose="020B0609020204030204" pitchFamily="49" charset="0"/>
+              </a:rPr>
+              <a:t>cleanup_fn</a:t>
+            </a:r>
+            <a:r>
+              <a:rPr lang="en-US" sz="1398" dirty="0">
+                <a:solidFill>
+                  <a:schemeClr val="accent6">
+                    <a:lumMod val="75000"/>
+                  </a:schemeClr>
+                </a:solidFill>
+                <a:latin typeface="Consolas" panose="020B0609020204030204" pitchFamily="49" charset="0"/>
+                <a:cs typeface="Consolas" panose="020B0609020204030204" pitchFamily="49" charset="0"/>
+              </a:rPr>
+              <a:t> for each entry</a:t>
+            </a:r>
+          </a:p>
+          <a:p>
+            <a:pPr defTabSz="914400">
+              <a:defRPr/>
+            </a:pPr>
+            <a:r>
+              <a:rPr lang="en-US" sz="1400" dirty="0" err="1">
+                <a:solidFill>
+                  <a:prstClr val="black"/>
+                </a:solidFill>
+                <a:latin typeface="Consolas" panose="020B0609020204030204" pitchFamily="49" charset="0"/>
+                <a:cs typeface="Consolas" panose="020B0609020204030204" pitchFamily="49" charset="0"/>
+              </a:rPr>
+              <a:t>entry.cleanup</a:t>
+            </a:r>
+            <a:r>
+              <a:rPr lang="en-US" sz="1400" dirty="0">
+                <a:solidFill>
+                  <a:prstClr val="black"/>
+                </a:solidFill>
+                <a:latin typeface="Consolas" panose="020B0609020204030204" pitchFamily="49" charset="0"/>
+                <a:cs typeface="Consolas" panose="020B0609020204030204" pitchFamily="49" charset="0"/>
+              </a:rPr>
+              <a:t>() ...</a:t>
+            </a:r>
+          </a:p>
+          <a:p>
+            <a:pPr defTabSz="914400">
+              <a:defRPr/>
+            </a:pPr>
+            <a:r>
+              <a:rPr lang="en-US" sz="1398" dirty="0">
+                <a:solidFill>
+                  <a:schemeClr val="accent6">
+                    <a:lumMod val="75000"/>
+                  </a:schemeClr>
+                </a:solidFill>
+                <a:latin typeface="Consolas" panose="020B0609020204030204" pitchFamily="49" charset="0"/>
+                <a:cs typeface="Consolas" panose="020B0609020204030204" pitchFamily="49" charset="0"/>
+              </a:rPr>
+              <a:t>// prepare the error message</a:t>
+            </a:r>
+          </a:p>
+          <a:p>
+            <a:pPr defTabSz="914400">
+              <a:defRPr/>
+            </a:pPr>
+            <a:r>
+              <a:rPr lang="en-US" sz="1400" dirty="0" err="1">
+                <a:solidFill>
+                  <a:prstClr val="black"/>
+                </a:solidFill>
+                <a:latin typeface="Consolas" panose="020B0609020204030204" pitchFamily="49" charset="0"/>
+                <a:cs typeface="Consolas" panose="020B0609020204030204" pitchFamily="49" charset="0"/>
+              </a:rPr>
+              <a:t>jmp</a:t>
+            </a:r>
+            <a:r>
+              <a:rPr lang="en-US" sz="1400" dirty="0">
+                <a:solidFill>
+                  <a:prstClr val="black"/>
+                </a:solidFill>
+                <a:latin typeface="Consolas" panose="020B0609020204030204" pitchFamily="49" charset="0"/>
+                <a:cs typeface="Consolas" panose="020B0609020204030204" pitchFamily="49" charset="0"/>
+              </a:rPr>
+              <a:t> iu_dispatcher_func</a:t>
+            </a:r>
+          </a:p>
+        </p:txBody>
+      </p:sp>
+      <p:sp>
+        <p:nvSpPr>
+          <p:cNvPr id="16" name="Rectangle 15">
+            <a:extLst>
+              <a:ext uri="{FF2B5EF4-FFF2-40B4-BE49-F238E27FC236}">
+                <a16:creationId xmlns:a16="http://schemas.microsoft.com/office/drawing/2014/main" id="{218A518E-A5FE-9D86-1DA1-E23BCDE4656F}"/>
+              </a:ext>
+            </a:extLst>
+          </p:cNvPr>
+          <p:cNvSpPr/>
+          <p:nvPr/>
+        </p:nvSpPr>
+        <p:spPr>
+          <a:xfrm>
+            <a:off x="5022298" y="3525439"/>
+            <a:ext cx="2850754" cy="1185630"/>
+          </a:xfrm>
+          <a:prstGeom prst="rect">
+            <a:avLst/>
+          </a:prstGeom>
+          <a:solidFill>
+            <a:schemeClr val="bg2">
+              <a:lumMod val="90000"/>
+              <a:alpha val="18897"/>
+            </a:schemeClr>
+          </a:solidFill>
+          <a:ln>
             <a:noFill/>
-            <a:ln>
+          </a:ln>
+        </p:spPr>
+        <p:style>
+          <a:lnRef idx="2">
+            <a:schemeClr val="accent1">
+              <a:shade val="50000"/>
+            </a:schemeClr>
+          </a:lnRef>
+          <a:fillRef idx="1">
+            <a:schemeClr val="accent1"/>
+          </a:fillRef>
+          <a:effectRef idx="0">
+            <a:schemeClr val="accent1"/>
+          </a:effectRef>
+          <a:fontRef idx="minor">
+            <a:schemeClr val="lt1"/>
+          </a:fontRef>
+        </p:style>
+        <p:txBody>
+          <a:bodyPr rtlCol="0" anchor="ctr" anchorCtr="0"/>
+          <a:lstStyle/>
+          <a:p>
+            <a:endParaRPr lang="en-US" sz="1400" dirty="0">
               <a:solidFill>
-                <a:schemeClr val="accent1"/>
+                <a:schemeClr val="accent5">
+                  <a:lumMod val="20000"/>
+                  <a:lumOff val="80000"/>
+                </a:schemeClr>
               </a:solidFill>
-            </a:ln>
-          </p:spPr>
-          <p:txBody>
-            <a:bodyPr wrap="square" rtlCol="0">
-              <a:noAutofit/>
-            </a:bodyPr>
-            <a:lstStyle/>
-            <a:p>
-              <a:r>
-                <a:rPr lang="en-US" dirty="0">
-                  <a:latin typeface="Times New Roman" panose="02020603050405020304" pitchFamily="18" charset="0"/>
-                  <a:cs typeface="Times New Roman" panose="02020603050405020304" pitchFamily="18" charset="0"/>
-                </a:rPr>
-                <a:t>In-kernel dispatcher function </a:t>
-              </a:r>
-            </a:p>
-            <a:p>
-              <a:pPr defTabSz="914400">
-                <a:defRPr/>
-              </a:pPr>
-              <a:r>
-                <a:rPr lang="en-US" sz="1400" b="1" dirty="0" err="1">
-                  <a:solidFill>
-                    <a:prstClr val="black"/>
-                  </a:solidFill>
-                  <a:latin typeface="Consolas" panose="020B0609020204030204" pitchFamily="49" charset="0"/>
-                  <a:cs typeface="Consolas" panose="020B0609020204030204" pitchFamily="49" charset="0"/>
-                </a:rPr>
-                <a:t>rex_dispatcher_func</a:t>
-              </a:r>
-              <a:r>
-                <a:rPr lang="en-US" sz="1400" b="1" dirty="0">
-                  <a:solidFill>
-                    <a:prstClr val="black"/>
-                  </a:solidFill>
-                  <a:latin typeface="Consolas" panose="020B0609020204030204" pitchFamily="49" charset="0"/>
-                  <a:cs typeface="Consolas" panose="020B0609020204030204" pitchFamily="49" charset="0"/>
-                </a:rPr>
-                <a:t>:</a:t>
-              </a:r>
-            </a:p>
-            <a:p>
-              <a:pPr defTabSz="457200">
-                <a:defRPr/>
-              </a:pPr>
-              <a:r>
-                <a:rPr lang="en-US" sz="1398" dirty="0">
-                  <a:solidFill>
-                    <a:schemeClr val="accent6">
-                      <a:lumMod val="75000"/>
-                    </a:schemeClr>
-                  </a:solidFill>
-                  <a:latin typeface="Consolas" panose="020B0609020204030204" pitchFamily="49" charset="0"/>
-                  <a:cs typeface="Consolas" panose="020B0609020204030204" pitchFamily="49" charset="0"/>
-                </a:rPr>
-                <a:t>// save the callee-saved registers</a:t>
-              </a:r>
-            </a:p>
-            <a:p>
-              <a:pPr defTabSz="914400">
-                <a:defRPr/>
-              </a:pPr>
-              <a:r>
-                <a:rPr lang="en-US" sz="1400" dirty="0" err="1">
-                  <a:solidFill>
-                    <a:prstClr val="black"/>
-                  </a:solidFill>
-                  <a:latin typeface="Consolas" panose="020B0609020204030204" pitchFamily="49" charset="0"/>
-                  <a:cs typeface="Consolas" panose="020B0609020204030204" pitchFamily="49" charset="0"/>
-                </a:rPr>
-                <a:t>pushq</a:t>
-              </a:r>
-              <a:r>
-                <a:rPr lang="en-US" sz="1400" dirty="0">
-                  <a:solidFill>
-                    <a:prstClr val="black"/>
-                  </a:solidFill>
-                  <a:latin typeface="Consolas" panose="020B0609020204030204" pitchFamily="49" charset="0"/>
-                  <a:cs typeface="Consolas" panose="020B0609020204030204" pitchFamily="49" charset="0"/>
-                </a:rPr>
-                <a:t> ...</a:t>
-              </a:r>
-            </a:p>
-            <a:p>
-              <a:pPr defTabSz="457200">
-                <a:defRPr/>
-              </a:pPr>
-              <a:r>
-                <a:rPr lang="en-US" sz="1398" dirty="0">
-                  <a:solidFill>
-                    <a:schemeClr val="accent6">
-                      <a:lumMod val="75000"/>
-                    </a:schemeClr>
-                  </a:solidFill>
-                  <a:latin typeface="Consolas" panose="020B0609020204030204" pitchFamily="49" charset="0"/>
-                  <a:cs typeface="Consolas" panose="020B0609020204030204" pitchFamily="49" charset="0"/>
-                </a:rPr>
-                <a:t>//</a:t>
-              </a:r>
-              <a:r>
-                <a:rPr lang="zh-CN" altLang="en-US" sz="1398" dirty="0">
-                  <a:solidFill>
-                    <a:schemeClr val="accent6">
-                      <a:lumMod val="75000"/>
-                    </a:schemeClr>
-                  </a:solidFill>
-                  <a:latin typeface="Consolas" panose="020B0609020204030204" pitchFamily="49" charset="0"/>
-                  <a:cs typeface="Consolas" panose="020B0609020204030204" pitchFamily="49" charset="0"/>
-                </a:rPr>
-                <a:t> </a:t>
-              </a:r>
-              <a:r>
-                <a:rPr lang="en-US" sz="1398" dirty="0">
-                  <a:solidFill>
-                    <a:schemeClr val="accent6">
-                      <a:lumMod val="75000"/>
-                    </a:schemeClr>
-                  </a:solidFill>
-                  <a:latin typeface="Consolas" panose="020B0609020204030204" pitchFamily="49" charset="0"/>
-                  <a:cs typeface="Consolas" panose="020B0609020204030204" pitchFamily="49" charset="0"/>
-                </a:rPr>
-                <a:t>save the stack and frame pointer</a:t>
-              </a:r>
-            </a:p>
-            <a:p>
-              <a:pPr defTabSz="914400">
-                <a:defRPr/>
-              </a:pPr>
-              <a:r>
-                <a:rPr lang="en-US" sz="1400" dirty="0" err="1">
-                  <a:solidFill>
-                    <a:prstClr val="black"/>
-                  </a:solidFill>
-                  <a:latin typeface="Consolas" panose="020B0609020204030204" pitchFamily="49" charset="0"/>
-                  <a:cs typeface="Consolas" panose="020B0609020204030204" pitchFamily="49" charset="0"/>
-                </a:rPr>
-                <a:t>movq</a:t>
-              </a:r>
-              <a:r>
-                <a:rPr lang="en-US" sz="1400" dirty="0">
-                  <a:solidFill>
-                    <a:prstClr val="black"/>
-                  </a:solidFill>
-                  <a:latin typeface="Consolas" panose="020B0609020204030204" pitchFamily="49" charset="0"/>
-                  <a:cs typeface="Consolas" panose="020B0609020204030204" pitchFamily="49" charset="0"/>
-                </a:rPr>
-                <a:t> %</a:t>
-              </a:r>
-              <a:r>
-                <a:rPr lang="en-US" sz="1400" dirty="0" err="1">
-                  <a:solidFill>
-                    <a:prstClr val="black"/>
-                  </a:solidFill>
-                  <a:latin typeface="Consolas" panose="020B0609020204030204" pitchFamily="49" charset="0"/>
-                  <a:cs typeface="Consolas" panose="020B0609020204030204" pitchFamily="49" charset="0"/>
-                </a:rPr>
-                <a:t>rsp</a:t>
-              </a:r>
-              <a:r>
-                <a:rPr lang="en-US" sz="1400" dirty="0">
-                  <a:solidFill>
-                    <a:prstClr val="black"/>
-                  </a:solidFill>
-                  <a:latin typeface="Consolas" panose="020B0609020204030204" pitchFamily="49" charset="0"/>
-                  <a:cs typeface="Consolas" panose="020B0609020204030204" pitchFamily="49" charset="0"/>
-                </a:rPr>
-                <a:t>, PER_CPU_VAR(</a:t>
-              </a:r>
-              <a:r>
-                <a:rPr lang="en-US" sz="1400" dirty="0" err="1">
-                  <a:solidFill>
-                    <a:prstClr val="black"/>
-                  </a:solidFill>
-                  <a:latin typeface="Consolas" panose="020B0609020204030204" pitchFamily="49" charset="0"/>
-                  <a:cs typeface="Consolas" panose="020B0609020204030204" pitchFamily="49" charset="0"/>
-                </a:rPr>
-                <a:t>rex_old_sp</a:t>
-              </a:r>
-              <a:r>
-                <a:rPr lang="en-US" sz="1400" dirty="0">
-                  <a:solidFill>
-                    <a:prstClr val="black"/>
-                  </a:solidFill>
-                  <a:latin typeface="Consolas" panose="020B0609020204030204" pitchFamily="49" charset="0"/>
-                  <a:cs typeface="Consolas" panose="020B0609020204030204" pitchFamily="49" charset="0"/>
-                </a:rPr>
-                <a:t>) ...</a:t>
-              </a:r>
-            </a:p>
-            <a:p>
-              <a:pPr defTabSz="457200">
-                <a:defRPr/>
-              </a:pPr>
-              <a:r>
-                <a:rPr lang="en-US" sz="1398" dirty="0">
-                  <a:solidFill>
-                    <a:schemeClr val="accent6">
-                      <a:lumMod val="75000"/>
-                    </a:schemeClr>
-                  </a:solidFill>
-                  <a:latin typeface="Consolas" panose="020B0609020204030204" pitchFamily="49" charset="0"/>
-                  <a:cs typeface="Consolas" panose="020B0609020204030204" pitchFamily="49" charset="0"/>
-                </a:rPr>
-                <a:t>// switch stack </a:t>
-              </a:r>
-            </a:p>
-            <a:p>
-              <a:pPr defTabSz="914400">
-                <a:defRPr/>
-              </a:pPr>
-              <a:r>
-                <a:rPr lang="en-US" sz="1400" dirty="0" err="1">
-                  <a:solidFill>
-                    <a:prstClr val="black"/>
-                  </a:solidFill>
-                  <a:latin typeface="Consolas" panose="020B0609020204030204" pitchFamily="49" charset="0"/>
-                  <a:cs typeface="Consolas" panose="020B0609020204030204" pitchFamily="49" charset="0"/>
-                </a:rPr>
-                <a:t>movq</a:t>
-              </a:r>
-              <a:r>
-                <a:rPr lang="en-US" sz="1400" dirty="0">
-                  <a:solidFill>
-                    <a:prstClr val="black"/>
-                  </a:solidFill>
-                  <a:latin typeface="Consolas" panose="020B0609020204030204" pitchFamily="49" charset="0"/>
-                  <a:cs typeface="Consolas" panose="020B0609020204030204" pitchFamily="49" charset="0"/>
-                </a:rPr>
-                <a:t> PER_CPU_VAR(</a:t>
-              </a:r>
-              <a:r>
-                <a:rPr lang="en-US" sz="1400" dirty="0" err="1">
-                  <a:solidFill>
-                    <a:prstClr val="black"/>
-                  </a:solidFill>
-                  <a:latin typeface="Consolas" panose="020B0609020204030204" pitchFamily="49" charset="0"/>
-                  <a:cs typeface="Consolas" panose="020B0609020204030204" pitchFamily="49" charset="0"/>
-                </a:rPr>
-                <a:t>rex_stack</a:t>
-              </a:r>
-              <a:r>
-                <a:rPr lang="en-US" sz="1400" dirty="0">
-                  <a:solidFill>
-                    <a:prstClr val="black"/>
-                  </a:solidFill>
-                  <a:latin typeface="Consolas" panose="020B0609020204030204" pitchFamily="49" charset="0"/>
-                  <a:cs typeface="Consolas" panose="020B0609020204030204" pitchFamily="49" charset="0"/>
-                </a:rPr>
-                <a:t>), %</a:t>
-              </a:r>
-              <a:r>
-                <a:rPr lang="en-US" sz="1400" dirty="0" err="1">
-                  <a:solidFill>
-                    <a:prstClr val="black"/>
-                  </a:solidFill>
-                  <a:latin typeface="Consolas" panose="020B0609020204030204" pitchFamily="49" charset="0"/>
-                  <a:cs typeface="Consolas" panose="020B0609020204030204" pitchFamily="49" charset="0"/>
-                </a:rPr>
-                <a:t>rsp</a:t>
-              </a:r>
-              <a:r>
-                <a:rPr lang="en-US" sz="1400" dirty="0">
-                  <a:solidFill>
-                    <a:prstClr val="black"/>
-                  </a:solidFill>
-                  <a:latin typeface="Consolas" panose="020B0609020204030204" pitchFamily="49" charset="0"/>
-                  <a:cs typeface="Consolas" panose="020B0609020204030204" pitchFamily="49" charset="0"/>
-                </a:rPr>
-                <a:t> ...</a:t>
-              </a:r>
-            </a:p>
-            <a:p>
-              <a:pPr defTabSz="457200">
-                <a:defRPr/>
-              </a:pPr>
-              <a:r>
-                <a:rPr lang="en-US" sz="1398" dirty="0">
-                  <a:solidFill>
-                    <a:schemeClr val="accent6">
-                      <a:lumMod val="75000"/>
-                    </a:schemeClr>
-                  </a:solidFill>
-                  <a:latin typeface="Consolas" panose="020B0609020204030204" pitchFamily="49" charset="0"/>
-                  <a:cs typeface="Consolas" panose="020B0609020204030204" pitchFamily="49" charset="0"/>
-                </a:rPr>
-                <a:t>// invoke the REX program</a:t>
-              </a:r>
-            </a:p>
-            <a:p>
-              <a:pPr defTabSz="914400">
-                <a:defRPr/>
-              </a:pPr>
-              <a:r>
-                <a:rPr lang="en-US" sz="1400" b="1" dirty="0">
-                  <a:solidFill>
-                    <a:prstClr val="black"/>
-                  </a:solidFill>
-                  <a:latin typeface="Consolas" panose="020B0609020204030204" pitchFamily="49" charset="0"/>
-                  <a:cs typeface="Consolas" panose="020B0609020204030204" pitchFamily="49" charset="0"/>
-                </a:rPr>
-                <a:t>call *%</a:t>
-              </a:r>
-              <a:r>
-                <a:rPr lang="en-US" sz="1400" b="1" dirty="0" err="1">
-                  <a:solidFill>
-                    <a:prstClr val="black"/>
-                  </a:solidFill>
-                  <a:latin typeface="Consolas" panose="020B0609020204030204" pitchFamily="49" charset="0"/>
-                  <a:cs typeface="Consolas" panose="020B0609020204030204" pitchFamily="49" charset="0"/>
-                </a:rPr>
-                <a:t>rdx</a:t>
-              </a:r>
-              <a:endParaRPr lang="en-US" sz="1400" dirty="0">
+            </a:endParaRPr>
+          </a:p>
+        </p:txBody>
+      </p:sp>
+      <p:sp>
+        <p:nvSpPr>
+          <p:cNvPr id="7" name="Rectangle 6">
+            <a:extLst>
+              <a:ext uri="{FF2B5EF4-FFF2-40B4-BE49-F238E27FC236}">
+                <a16:creationId xmlns:a16="http://schemas.microsoft.com/office/drawing/2014/main" id="{1F872621-EC48-3332-CBBC-2C03012BFD07}"/>
+              </a:ext>
+            </a:extLst>
+          </p:cNvPr>
+          <p:cNvSpPr/>
+          <p:nvPr/>
+        </p:nvSpPr>
+        <p:spPr>
+          <a:xfrm>
+            <a:off x="5036486" y="441370"/>
+            <a:ext cx="2635602" cy="770347"/>
+          </a:xfrm>
+          <a:prstGeom prst="rect">
+            <a:avLst/>
+          </a:prstGeom>
+          <a:solidFill>
+            <a:schemeClr val="accent3">
+              <a:lumMod val="20000"/>
+              <a:lumOff val="80000"/>
+            </a:schemeClr>
+          </a:solidFill>
+          <a:ln>
+            <a:noFill/>
+          </a:ln>
+        </p:spPr>
+        <p:style>
+          <a:lnRef idx="2">
+            <a:schemeClr val="accent1">
+              <a:shade val="50000"/>
+            </a:schemeClr>
+          </a:lnRef>
+          <a:fillRef idx="1">
+            <a:schemeClr val="accent1"/>
+          </a:fillRef>
+          <a:effectRef idx="0">
+            <a:schemeClr val="accent1"/>
+          </a:effectRef>
+          <a:fontRef idx="minor">
+            <a:schemeClr val="lt1"/>
+          </a:fontRef>
+        </p:style>
+        <p:txBody>
+          <a:bodyPr rtlCol="0" anchor="ctr" anchorCtr="0"/>
+          <a:lstStyle/>
+          <a:p>
+            <a:endParaRPr lang="en-US" sz="1400" dirty="0">
+              <a:solidFill>
+                <a:schemeClr val="tx1"/>
+              </a:solidFill>
+              <a:latin typeface="Consolas" panose="020B0609020204030204" pitchFamily="49" charset="0"/>
+              <a:cs typeface="Consolas" panose="020B0609020204030204" pitchFamily="49" charset="0"/>
+            </a:endParaRPr>
+          </a:p>
+        </p:txBody>
+      </p:sp>
+      <p:sp>
+        <p:nvSpPr>
+          <p:cNvPr id="17" name="Rectangle 16">
+            <a:extLst>
+              <a:ext uri="{FF2B5EF4-FFF2-40B4-BE49-F238E27FC236}">
+                <a16:creationId xmlns:a16="http://schemas.microsoft.com/office/drawing/2014/main" id="{4A974896-1FB6-99BD-E3C1-66A923F1844A}"/>
+              </a:ext>
+            </a:extLst>
+          </p:cNvPr>
+          <p:cNvSpPr/>
+          <p:nvPr/>
+        </p:nvSpPr>
+        <p:spPr>
+          <a:xfrm>
+            <a:off x="5022297" y="4371662"/>
+            <a:ext cx="1290896" cy="265172"/>
+          </a:xfrm>
+          <a:prstGeom prst="rect">
+            <a:avLst/>
+          </a:prstGeom>
+          <a:solidFill>
+            <a:schemeClr val="accent2">
+              <a:lumMod val="20000"/>
+              <a:lumOff val="80000"/>
+              <a:alpha val="89000"/>
+            </a:schemeClr>
+          </a:solidFill>
+          <a:ln>
+            <a:noFill/>
+          </a:ln>
+        </p:spPr>
+        <p:style>
+          <a:lnRef idx="2">
+            <a:schemeClr val="accent1">
+              <a:shade val="50000"/>
+            </a:schemeClr>
+          </a:lnRef>
+          <a:fillRef idx="1">
+            <a:schemeClr val="accent1"/>
+          </a:fillRef>
+          <a:effectRef idx="0">
+            <a:schemeClr val="accent1"/>
+          </a:effectRef>
+          <a:fontRef idx="minor">
+            <a:schemeClr val="lt1"/>
+          </a:fontRef>
+        </p:style>
+        <p:txBody>
+          <a:bodyPr rtlCol="0" anchor="ctr" anchorCtr="0"/>
+          <a:lstStyle/>
+          <a:p>
+            <a:endParaRPr lang="en-US" sz="1400" b="1" dirty="0">
+              <a:solidFill>
+                <a:schemeClr val="tx1"/>
+              </a:solidFill>
+              <a:latin typeface="Consolas" panose="020B0609020204030204" pitchFamily="49" charset="0"/>
+              <a:cs typeface="Consolas" panose="020B0609020204030204" pitchFamily="49" charset="0"/>
+            </a:endParaRPr>
+          </a:p>
+        </p:txBody>
+      </p:sp>
+      <p:sp>
+        <p:nvSpPr>
+          <p:cNvPr id="13" name="TextBox 12">
+            <a:extLst>
+              <a:ext uri="{FF2B5EF4-FFF2-40B4-BE49-F238E27FC236}">
+                <a16:creationId xmlns:a16="http://schemas.microsoft.com/office/drawing/2014/main" id="{0B437A3A-0629-116F-D833-3529DF7AC570}"/>
+              </a:ext>
+            </a:extLst>
+          </p:cNvPr>
+          <p:cNvSpPr txBox="1"/>
+          <p:nvPr/>
+        </p:nvSpPr>
+        <p:spPr>
+          <a:xfrm>
+            <a:off x="4955053" y="0"/>
+            <a:ext cx="2819420" cy="1281118"/>
+          </a:xfrm>
+          <a:prstGeom prst="rect">
+            <a:avLst/>
+          </a:prstGeom>
+          <a:noFill/>
+          <a:ln>
+            <a:solidFill>
+              <a:schemeClr val="accent1"/>
+            </a:solidFill>
+          </a:ln>
+        </p:spPr>
+        <p:txBody>
+          <a:bodyPr wrap="square" rtlCol="0">
+            <a:noAutofit/>
+          </a:bodyPr>
+          <a:lstStyle/>
+          <a:p>
+            <a:r>
+              <a:rPr lang="en-US" dirty="0">
+                <a:latin typeface="Times New Roman" panose="02020603050405020304" pitchFamily="18" charset="0"/>
+                <a:cs typeface="Times New Roman" panose="02020603050405020304" pitchFamily="18" charset="0"/>
+              </a:rPr>
+              <a:t>Rex program</a:t>
+            </a:r>
+          </a:p>
+          <a:p>
+            <a:pPr defTabSz="914400">
+              <a:defRPr/>
+            </a:pPr>
+            <a:endParaRPr lang="en-US" sz="1400" b="1" dirty="0">
+              <a:solidFill>
+                <a:prstClr val="black"/>
+              </a:solidFill>
+              <a:latin typeface="Consolas" panose="020B0609020204030204" pitchFamily="49" charset="0"/>
+              <a:cs typeface="Consolas" panose="020B0609020204030204" pitchFamily="49" charset="0"/>
+            </a:endParaRPr>
+          </a:p>
+          <a:p>
+            <a:pPr defTabSz="914400">
+              <a:defRPr/>
+            </a:pPr>
+            <a:r>
+              <a:rPr lang="en-US" sz="1400" b="1" dirty="0">
                 <a:solidFill>
                   <a:prstClr val="black"/>
                 </a:solidFill>
                 <a:latin typeface="Consolas" panose="020B0609020204030204" pitchFamily="49" charset="0"/>
                 <a:cs typeface="Consolas" panose="020B0609020204030204" pitchFamily="49" charset="0"/>
-              </a:endParaRPr>
-            </a:p>
-            <a:p>
-              <a:pPr defTabSz="914400">
-                <a:defRPr/>
-              </a:pPr>
-              <a:endParaRPr lang="en-US" sz="1400" dirty="0">
+              </a:rPr>
+              <a:t>rex_prog1:</a:t>
+            </a:r>
+          </a:p>
+          <a:p>
+            <a:pPr defTabSz="914400">
+              <a:defRPr/>
+            </a:pPr>
+            <a:r>
+              <a:rPr lang="en-US" sz="1400" dirty="0">
                 <a:solidFill>
                   <a:prstClr val="black"/>
                 </a:solidFill>
                 <a:latin typeface="Consolas" panose="020B0609020204030204" pitchFamily="49" charset="0"/>
                 <a:cs typeface="Consolas" panose="020B0609020204030204" pitchFamily="49" charset="0"/>
-              </a:endParaRPr>
-            </a:p>
-            <a:p>
-              <a:pPr defTabSz="914400">
-                <a:defRPr/>
-              </a:pPr>
-              <a:r>
-                <a:rPr lang="en-US" sz="1400" b="1" dirty="0" err="1">
-                  <a:solidFill>
-                    <a:prstClr val="black"/>
-                  </a:solidFill>
-                  <a:latin typeface="Consolas" panose="020B0609020204030204" pitchFamily="49" charset="0"/>
-                  <a:cs typeface="Consolas" panose="020B0609020204030204" pitchFamily="49" charset="0"/>
-                </a:rPr>
-                <a:t>rex_exit</a:t>
-              </a:r>
-              <a:r>
-                <a:rPr lang="en-US" sz="1400" b="1" dirty="0">
-                  <a:solidFill>
-                    <a:prstClr val="black"/>
-                  </a:solidFill>
-                  <a:latin typeface="Consolas" panose="020B0609020204030204" pitchFamily="49" charset="0"/>
-                  <a:cs typeface="Consolas" panose="020B0609020204030204" pitchFamily="49" charset="0"/>
-                </a:rPr>
-                <a:t>:</a:t>
-              </a:r>
-            </a:p>
-            <a:p>
-              <a:pPr defTabSz="457200">
-                <a:defRPr/>
-              </a:pPr>
-              <a:r>
-                <a:rPr lang="en-US" sz="1398" dirty="0">
-                  <a:solidFill>
-                    <a:schemeClr val="accent6">
-                      <a:lumMod val="75000"/>
-                    </a:schemeClr>
-                  </a:solidFill>
-                  <a:latin typeface="Consolas" panose="020B0609020204030204" pitchFamily="49" charset="0"/>
-                  <a:cs typeface="Consolas" panose="020B0609020204030204" pitchFamily="49" charset="0"/>
-                </a:rPr>
-                <a:t>// restore old stack and frame pointer</a:t>
-              </a:r>
-            </a:p>
-            <a:p>
-              <a:pPr defTabSz="914400">
-                <a:defRPr/>
-              </a:pPr>
-              <a:r>
-                <a:rPr lang="en-US" sz="1400" dirty="0" err="1">
-                  <a:solidFill>
-                    <a:prstClr val="black"/>
-                  </a:solidFill>
-                  <a:latin typeface="Consolas" panose="020B0609020204030204" pitchFamily="49" charset="0"/>
-                  <a:cs typeface="Consolas" panose="020B0609020204030204" pitchFamily="49" charset="0"/>
-                </a:rPr>
-                <a:t>movq</a:t>
-              </a:r>
-              <a:r>
-                <a:rPr lang="en-US" sz="1400" dirty="0">
-                  <a:solidFill>
-                    <a:prstClr val="black"/>
-                  </a:solidFill>
-                  <a:latin typeface="Consolas" panose="020B0609020204030204" pitchFamily="49" charset="0"/>
-                  <a:cs typeface="Consolas" panose="020B0609020204030204" pitchFamily="49" charset="0"/>
-                </a:rPr>
-                <a:t> PER_CPU_VAR(</a:t>
-              </a:r>
-              <a:r>
-                <a:rPr lang="en-US" sz="1400" dirty="0" err="1">
-                  <a:solidFill>
-                    <a:prstClr val="black"/>
-                  </a:solidFill>
-                  <a:latin typeface="Consolas" panose="020B0609020204030204" pitchFamily="49" charset="0"/>
-                  <a:cs typeface="Consolas" panose="020B0609020204030204" pitchFamily="49" charset="0"/>
-                </a:rPr>
-                <a:t>rex_old_sp</a:t>
-              </a:r>
-              <a:r>
-                <a:rPr lang="en-US" sz="1400" dirty="0">
-                  <a:solidFill>
-                    <a:prstClr val="black"/>
-                  </a:solidFill>
-                  <a:latin typeface="Consolas" panose="020B0609020204030204" pitchFamily="49" charset="0"/>
-                  <a:cs typeface="Consolas" panose="020B0609020204030204" pitchFamily="49" charset="0"/>
-                </a:rPr>
-                <a:t>), %</a:t>
-              </a:r>
-              <a:r>
-                <a:rPr lang="en-US" sz="1400" dirty="0" err="1">
-                  <a:solidFill>
-                    <a:prstClr val="black"/>
-                  </a:solidFill>
-                  <a:latin typeface="Consolas" panose="020B0609020204030204" pitchFamily="49" charset="0"/>
-                  <a:cs typeface="Consolas" panose="020B0609020204030204" pitchFamily="49" charset="0"/>
-                </a:rPr>
-                <a:t>rsp</a:t>
-              </a:r>
-              <a:endParaRPr lang="en-US" sz="1400" dirty="0">
+              </a:rPr>
+              <a:t>...</a:t>
+            </a:r>
+          </a:p>
+          <a:p>
+            <a:pPr defTabSz="914400">
+              <a:defRPr/>
+            </a:pPr>
+            <a:r>
+              <a:rPr lang="en-US" sz="1400" dirty="0">
                 <a:solidFill>
                   <a:prstClr val="black"/>
                 </a:solidFill>
                 <a:latin typeface="Consolas" panose="020B0609020204030204" pitchFamily="49" charset="0"/>
                 <a:cs typeface="Consolas" panose="020B0609020204030204" pitchFamily="49" charset="0"/>
-              </a:endParaRPr>
-            </a:p>
-            <a:p>
-              <a:pPr defTabSz="457200">
-                <a:defRPr/>
-              </a:pPr>
-              <a:r>
-                <a:rPr lang="en-US" sz="1398" dirty="0">
-                  <a:solidFill>
-                    <a:schemeClr val="accent6">
-                      <a:lumMod val="75000"/>
-                    </a:schemeClr>
-                  </a:solidFill>
-                  <a:latin typeface="Consolas" panose="020B0609020204030204" pitchFamily="49" charset="0"/>
-                  <a:cs typeface="Consolas" panose="020B0609020204030204" pitchFamily="49" charset="0"/>
-                </a:rPr>
-                <a:t>// restore the callee-saved registers</a:t>
-              </a:r>
-            </a:p>
-            <a:p>
-              <a:pPr defTabSz="914400">
-                <a:defRPr/>
-              </a:pPr>
-              <a:r>
-                <a:rPr lang="en-US" sz="1400" dirty="0" err="1">
-                  <a:solidFill>
-                    <a:prstClr val="black"/>
-                  </a:solidFill>
-                  <a:latin typeface="Consolas" panose="020B0609020204030204" pitchFamily="49" charset="0"/>
-                  <a:cs typeface="Consolas" panose="020B0609020204030204" pitchFamily="49" charset="0"/>
-                </a:rPr>
-                <a:t>popq</a:t>
-              </a:r>
-              <a:r>
-                <a:rPr lang="en-US" sz="1400" dirty="0">
-                  <a:solidFill>
-                    <a:prstClr val="black"/>
-                  </a:solidFill>
-                  <a:latin typeface="Consolas" panose="020B0609020204030204" pitchFamily="49" charset="0"/>
-                  <a:cs typeface="Consolas" panose="020B0609020204030204" pitchFamily="49" charset="0"/>
-                </a:rPr>
-                <a:t> ...</a:t>
-              </a:r>
-            </a:p>
-            <a:p>
-              <a:pPr defTabSz="914400">
-                <a:defRPr/>
-              </a:pPr>
-              <a:r>
-                <a:rPr lang="en-US" sz="1400" dirty="0">
-                  <a:solidFill>
-                    <a:prstClr val="black"/>
-                  </a:solidFill>
-                  <a:latin typeface="Consolas" panose="020B0609020204030204" pitchFamily="49" charset="0"/>
-                  <a:cs typeface="Consolas" panose="020B0609020204030204" pitchFamily="49" charset="0"/>
-                </a:rPr>
-                <a:t>ret</a:t>
-              </a:r>
-            </a:p>
-            <a:p>
-              <a:pPr defTabSz="914400">
-                <a:defRPr/>
-              </a:pPr>
-              <a:endParaRPr lang="en-US" sz="500" dirty="0">
+              </a:rPr>
+              <a:t>ret</a:t>
+            </a:r>
+          </a:p>
+        </p:txBody>
+      </p:sp>
+      <p:sp>
+        <p:nvSpPr>
+          <p:cNvPr id="35" name="Rectangle 34">
+            <a:extLst>
+              <a:ext uri="{FF2B5EF4-FFF2-40B4-BE49-F238E27FC236}">
+                <a16:creationId xmlns:a16="http://schemas.microsoft.com/office/drawing/2014/main" id="{3649AC7D-4CBA-CEDA-1E35-C47DC495BC39}"/>
+              </a:ext>
+            </a:extLst>
+          </p:cNvPr>
+          <p:cNvSpPr/>
+          <p:nvPr/>
+        </p:nvSpPr>
+        <p:spPr>
+          <a:xfrm>
+            <a:off x="71153" y="3397075"/>
+            <a:ext cx="944643" cy="233996"/>
+          </a:xfrm>
+          <a:prstGeom prst="rect">
+            <a:avLst/>
+          </a:prstGeom>
+          <a:solidFill>
+            <a:schemeClr val="accent2">
+              <a:lumMod val="20000"/>
+              <a:lumOff val="80000"/>
+              <a:alpha val="0"/>
+            </a:schemeClr>
+          </a:solidFill>
+          <a:ln>
+            <a:noFill/>
+          </a:ln>
+        </p:spPr>
+        <p:style>
+          <a:lnRef idx="2">
+            <a:schemeClr val="accent1">
+              <a:shade val="50000"/>
+            </a:schemeClr>
+          </a:lnRef>
+          <a:fillRef idx="1">
+            <a:schemeClr val="accent1"/>
+          </a:fillRef>
+          <a:effectRef idx="0">
+            <a:schemeClr val="accent1"/>
+          </a:effectRef>
+          <a:fontRef idx="minor">
+            <a:schemeClr val="lt1"/>
+          </a:fontRef>
+        </p:style>
+        <p:txBody>
+          <a:bodyPr rtlCol="0" anchor="ctr" anchorCtr="0"/>
+          <a:lstStyle/>
+          <a:p>
+            <a:endParaRPr lang="en-US" sz="1400" dirty="0">
+              <a:solidFill>
+                <a:schemeClr val="tx1"/>
+              </a:solidFill>
+              <a:latin typeface="Consolas" panose="020B0609020204030204" pitchFamily="49" charset="0"/>
+              <a:cs typeface="Consolas" panose="020B0609020204030204" pitchFamily="49" charset="0"/>
+            </a:endParaRPr>
+          </a:p>
+        </p:txBody>
+      </p:sp>
+      <p:sp>
+        <p:nvSpPr>
+          <p:cNvPr id="24" name="Rectangle 23">
+            <a:extLst>
+              <a:ext uri="{FF2B5EF4-FFF2-40B4-BE49-F238E27FC236}">
+                <a16:creationId xmlns:a16="http://schemas.microsoft.com/office/drawing/2014/main" id="{BCE7C08D-EC2E-9315-CDCC-A9F3E1412C56}"/>
+              </a:ext>
+            </a:extLst>
+          </p:cNvPr>
+          <p:cNvSpPr/>
+          <p:nvPr/>
+        </p:nvSpPr>
+        <p:spPr>
+          <a:xfrm>
+            <a:off x="69661" y="3653109"/>
+            <a:ext cx="4014215" cy="1102123"/>
+          </a:xfrm>
+          <a:prstGeom prst="rect">
+            <a:avLst/>
+          </a:prstGeom>
+          <a:solidFill>
+            <a:schemeClr val="accent6">
+              <a:lumMod val="20000"/>
+              <a:lumOff val="80000"/>
+              <a:alpha val="0"/>
+            </a:schemeClr>
+          </a:solidFill>
+          <a:ln>
+            <a:noFill/>
+          </a:ln>
+        </p:spPr>
+        <p:style>
+          <a:lnRef idx="2">
+            <a:schemeClr val="accent1">
+              <a:shade val="50000"/>
+            </a:schemeClr>
+          </a:lnRef>
+          <a:fillRef idx="1">
+            <a:schemeClr val="accent1"/>
+          </a:fillRef>
+          <a:effectRef idx="0">
+            <a:schemeClr val="accent1"/>
+          </a:effectRef>
+          <a:fontRef idx="minor">
+            <a:schemeClr val="lt1"/>
+          </a:fontRef>
+        </p:style>
+        <p:txBody>
+          <a:bodyPr rtlCol="0" anchor="ctr"/>
+          <a:lstStyle/>
+          <a:p>
+            <a:pPr algn="ctr"/>
+            <a:endParaRPr lang="en-US" sz="600" dirty="0"/>
+          </a:p>
+        </p:txBody>
+      </p:sp>
+      <p:sp>
+        <p:nvSpPr>
+          <p:cNvPr id="8" name="Rectangle 7">
+            <a:extLst>
+              <a:ext uri="{FF2B5EF4-FFF2-40B4-BE49-F238E27FC236}">
+                <a16:creationId xmlns:a16="http://schemas.microsoft.com/office/drawing/2014/main" id="{CF488771-0B9B-DFD8-B008-7EA5FC0673BC}"/>
+              </a:ext>
+            </a:extLst>
+          </p:cNvPr>
+          <p:cNvSpPr/>
+          <p:nvPr/>
+        </p:nvSpPr>
+        <p:spPr>
+          <a:xfrm>
+            <a:off x="60517" y="2793575"/>
+            <a:ext cx="2560113" cy="378219"/>
+          </a:xfrm>
+          <a:prstGeom prst="rect">
+            <a:avLst/>
+          </a:prstGeom>
+          <a:solidFill>
+            <a:schemeClr val="accent2">
+              <a:lumMod val="20000"/>
+              <a:lumOff val="80000"/>
+              <a:alpha val="0"/>
+            </a:schemeClr>
+          </a:solidFill>
+          <a:ln>
+            <a:noFill/>
+          </a:ln>
+        </p:spPr>
+        <p:style>
+          <a:lnRef idx="2">
+            <a:schemeClr val="accent1">
+              <a:shade val="50000"/>
+            </a:schemeClr>
+          </a:lnRef>
+          <a:fillRef idx="1">
+            <a:schemeClr val="accent1"/>
+          </a:fillRef>
+          <a:effectRef idx="0">
+            <a:schemeClr val="accent1"/>
+          </a:effectRef>
+          <a:fontRef idx="minor">
+            <a:schemeClr val="lt1"/>
+          </a:fontRef>
+        </p:style>
+        <p:txBody>
+          <a:bodyPr rtlCol="0" anchor="ctr" anchorCtr="0"/>
+          <a:lstStyle/>
+          <a:p>
+            <a:endParaRPr lang="en-US" sz="1400" dirty="0">
+              <a:solidFill>
+                <a:schemeClr val="tx1"/>
+              </a:solidFill>
+              <a:latin typeface="Consolas" panose="020B0609020204030204" pitchFamily="49" charset="0"/>
+              <a:cs typeface="Consolas" panose="020B0609020204030204" pitchFamily="49" charset="0"/>
+            </a:endParaRPr>
+          </a:p>
+        </p:txBody>
+      </p:sp>
+      <p:sp>
+        <p:nvSpPr>
+          <p:cNvPr id="5" name="Rectangle 4">
+            <a:extLst>
+              <a:ext uri="{FF2B5EF4-FFF2-40B4-BE49-F238E27FC236}">
+                <a16:creationId xmlns:a16="http://schemas.microsoft.com/office/drawing/2014/main" id="{450B10D6-AD2E-7932-C9ED-F99E35ABC865}"/>
+              </a:ext>
+            </a:extLst>
+          </p:cNvPr>
+          <p:cNvSpPr/>
+          <p:nvPr/>
+        </p:nvSpPr>
+        <p:spPr>
+          <a:xfrm>
+            <a:off x="71155" y="1319211"/>
+            <a:ext cx="4010567" cy="3391858"/>
+          </a:xfrm>
+          <a:prstGeom prst="rect">
+            <a:avLst/>
+          </a:prstGeom>
+          <a:solidFill>
+            <a:schemeClr val="accent4">
+              <a:lumMod val="20000"/>
+              <a:lumOff val="80000"/>
+              <a:alpha val="50000"/>
+            </a:schemeClr>
+          </a:solidFill>
+          <a:ln>
+            <a:noFill/>
+          </a:ln>
+        </p:spPr>
+        <p:style>
+          <a:lnRef idx="2">
+            <a:schemeClr val="accent1">
+              <a:shade val="50000"/>
+            </a:schemeClr>
+          </a:lnRef>
+          <a:fillRef idx="1">
+            <a:schemeClr val="accent1"/>
+          </a:fillRef>
+          <a:effectRef idx="0">
+            <a:schemeClr val="accent1"/>
+          </a:effectRef>
+          <a:fontRef idx="minor">
+            <a:schemeClr val="lt1"/>
+          </a:fontRef>
+        </p:style>
+        <p:txBody>
+          <a:bodyPr rtlCol="0" anchor="ctr" anchorCtr="0"/>
+          <a:lstStyle/>
+          <a:p>
+            <a:endParaRPr lang="en-US" sz="1400" dirty="0">
+              <a:solidFill>
+                <a:schemeClr val="tx1"/>
+              </a:solidFill>
+              <a:latin typeface="Consolas" panose="020B0609020204030204" pitchFamily="49" charset="0"/>
+              <a:cs typeface="Consolas" panose="020B0609020204030204" pitchFamily="49" charset="0"/>
+            </a:endParaRPr>
+          </a:p>
+        </p:txBody>
+      </p:sp>
+      <p:cxnSp>
+        <p:nvCxnSpPr>
+          <p:cNvPr id="12" name="Elbow Connector 11">
+            <a:extLst>
+              <a:ext uri="{FF2B5EF4-FFF2-40B4-BE49-F238E27FC236}">
+                <a16:creationId xmlns:a16="http://schemas.microsoft.com/office/drawing/2014/main" id="{A3231205-109F-A30C-CF11-C6E1F95CDE41}"/>
+              </a:ext>
+            </a:extLst>
+          </p:cNvPr>
+          <p:cNvCxnSpPr>
+            <a:cxnSpLocks/>
+            <a:stCxn id="8" idx="3"/>
+            <a:endCxn id="13" idx="1"/>
+          </p:cNvCxnSpPr>
+          <p:nvPr/>
+        </p:nvCxnSpPr>
+        <p:spPr>
+          <a:xfrm flipV="1">
+            <a:off x="2620629" y="640560"/>
+            <a:ext cx="2334424" cy="2342125"/>
+          </a:xfrm>
+          <a:prstGeom prst="bentConnector3">
+            <a:avLst>
+              <a:gd name="adj1" fmla="val 72441"/>
+            </a:avLst>
+          </a:prstGeom>
+          <a:ln w="34925">
+            <a:prstDash val="sysDot"/>
+            <a:round/>
+            <a:tailEnd type="triangle"/>
+          </a:ln>
+        </p:spPr>
+        <p:style>
+          <a:lnRef idx="2">
+            <a:schemeClr val="accent1"/>
+          </a:lnRef>
+          <a:fillRef idx="0">
+            <a:schemeClr val="accent1"/>
+          </a:fillRef>
+          <a:effectRef idx="1">
+            <a:schemeClr val="accent1"/>
+          </a:effectRef>
+          <a:fontRef idx="minor">
+            <a:schemeClr val="tx1"/>
+          </a:fontRef>
+        </p:style>
+      </p:cxnSp>
+      <p:cxnSp>
+        <p:nvCxnSpPr>
+          <p:cNvPr id="30" name="Elbow Connector 29">
+            <a:extLst>
+              <a:ext uri="{FF2B5EF4-FFF2-40B4-BE49-F238E27FC236}">
+                <a16:creationId xmlns:a16="http://schemas.microsoft.com/office/drawing/2014/main" id="{C8356E87-ED45-E11E-3550-C91B39E5519C}"/>
+              </a:ext>
+            </a:extLst>
+          </p:cNvPr>
+          <p:cNvCxnSpPr>
+            <a:cxnSpLocks/>
+            <a:stCxn id="17" idx="1"/>
+            <a:endCxn id="35" idx="3"/>
+          </p:cNvCxnSpPr>
+          <p:nvPr/>
+        </p:nvCxnSpPr>
+        <p:spPr>
+          <a:xfrm rot="10800000">
+            <a:off x="1015797" y="3514076"/>
+            <a:ext cx="4006503" cy="990175"/>
+          </a:xfrm>
+          <a:prstGeom prst="bentConnector3">
+            <a:avLst>
+              <a:gd name="adj1" fmla="val 13575"/>
+            </a:avLst>
+          </a:prstGeom>
+          <a:ln w="34925">
+            <a:solidFill>
+              <a:srgbClr val="C00000"/>
+            </a:solidFill>
+            <a:prstDash val="sysDot"/>
+            <a:round/>
+            <a:tailEnd type="triangle"/>
+          </a:ln>
+        </p:spPr>
+        <p:style>
+          <a:lnRef idx="2">
+            <a:schemeClr val="accent1"/>
+          </a:lnRef>
+          <a:fillRef idx="0">
+            <a:schemeClr val="accent1"/>
+          </a:fillRef>
+          <a:effectRef idx="1">
+            <a:schemeClr val="accent1"/>
+          </a:effectRef>
+          <a:fontRef idx="minor">
+            <a:schemeClr val="tx1"/>
+          </a:fontRef>
+        </p:style>
+      </p:cxnSp>
+      <p:sp>
+        <p:nvSpPr>
+          <p:cNvPr id="40" name="16-Point Star 39">
+            <a:extLst>
+              <a:ext uri="{FF2B5EF4-FFF2-40B4-BE49-F238E27FC236}">
+                <a16:creationId xmlns:a16="http://schemas.microsoft.com/office/drawing/2014/main" id="{E0C00056-8436-14D3-AF56-F2F1B14659C5}"/>
+              </a:ext>
+            </a:extLst>
+          </p:cNvPr>
+          <p:cNvSpPr/>
+          <p:nvPr/>
+        </p:nvSpPr>
+        <p:spPr>
+          <a:xfrm>
+            <a:off x="6056244" y="570106"/>
+            <a:ext cx="1266951" cy="626102"/>
+          </a:xfrm>
+          <a:prstGeom prst="star16">
+            <a:avLst/>
+          </a:prstGeom>
+          <a:solidFill>
+            <a:srgbClr val="FFFF00"/>
+          </a:solidFill>
+        </p:spPr>
+        <p:style>
+          <a:lnRef idx="2">
+            <a:schemeClr val="accent1">
+              <a:shade val="15000"/>
+            </a:schemeClr>
+          </a:lnRef>
+          <a:fillRef idx="1">
+            <a:schemeClr val="accent1"/>
+          </a:fillRef>
+          <a:effectRef idx="0">
+            <a:schemeClr val="accent1"/>
+          </a:effectRef>
+          <a:fontRef idx="minor">
+            <a:schemeClr val="lt1"/>
+          </a:fontRef>
+        </p:style>
+        <p:txBody>
+          <a:bodyPr rtlCol="0" anchor="ctr"/>
+          <a:lstStyle/>
+          <a:p>
+            <a:pPr algn="ctr"/>
+            <a:r>
+              <a:rPr lang="en-US" sz="1600" dirty="0">
+                <a:solidFill>
+                  <a:schemeClr val="tx1"/>
+                </a:solidFill>
+                <a:latin typeface="Times New Roman" panose="02020603050405020304" pitchFamily="18" charset="0"/>
+                <a:cs typeface="Times New Roman" panose="02020603050405020304" pitchFamily="18" charset="0"/>
+              </a:rPr>
+              <a:t>Panic</a:t>
+            </a:r>
+          </a:p>
+        </p:txBody>
+      </p:sp>
+      <p:sp>
+        <p:nvSpPr>
+          <p:cNvPr id="9" name="Rectangle 8">
+            <a:extLst>
+              <a:ext uri="{FF2B5EF4-FFF2-40B4-BE49-F238E27FC236}">
+                <a16:creationId xmlns:a16="http://schemas.microsoft.com/office/drawing/2014/main" id="{5EDB9AA2-1D81-1C8E-BD4D-8E31340F0699}"/>
+              </a:ext>
+            </a:extLst>
+          </p:cNvPr>
+          <p:cNvSpPr/>
+          <p:nvPr/>
+        </p:nvSpPr>
+        <p:spPr>
+          <a:xfrm>
+            <a:off x="5022300" y="3525440"/>
+            <a:ext cx="1540921" cy="251137"/>
+          </a:xfrm>
+          <a:prstGeom prst="rect">
+            <a:avLst/>
+          </a:prstGeom>
+          <a:solidFill>
+            <a:schemeClr val="accent1">
+              <a:alpha val="0"/>
+            </a:schemeClr>
+          </a:solidFill>
+          <a:ln>
+            <a:noFill/>
+          </a:ln>
+        </p:spPr>
+        <p:style>
+          <a:lnRef idx="2">
+            <a:schemeClr val="accent1">
+              <a:shade val="15000"/>
+            </a:schemeClr>
+          </a:lnRef>
+          <a:fillRef idx="1">
+            <a:schemeClr val="accent1"/>
+          </a:fillRef>
+          <a:effectRef idx="0">
+            <a:schemeClr val="accent1"/>
+          </a:effectRef>
+          <a:fontRef idx="minor">
+            <a:schemeClr val="lt1"/>
+          </a:fontRef>
+        </p:style>
+        <p:txBody>
+          <a:bodyPr rtlCol="0" anchor="ctr"/>
+          <a:lstStyle/>
+          <a:p>
+            <a:pPr algn="ctr"/>
+            <a:endParaRPr lang="en-US" dirty="0"/>
+          </a:p>
+        </p:txBody>
+      </p:sp>
+      <p:sp>
+        <p:nvSpPr>
+          <p:cNvPr id="14" name="TextBox 13">
+            <a:extLst>
+              <a:ext uri="{FF2B5EF4-FFF2-40B4-BE49-F238E27FC236}">
+                <a16:creationId xmlns:a16="http://schemas.microsoft.com/office/drawing/2014/main" id="{A65E88A0-512F-D08C-B8AB-6BEAC25C63D9}"/>
+              </a:ext>
+            </a:extLst>
+          </p:cNvPr>
+          <p:cNvSpPr txBox="1"/>
+          <p:nvPr/>
+        </p:nvSpPr>
+        <p:spPr>
+          <a:xfrm>
+            <a:off x="4955053" y="3202806"/>
+            <a:ext cx="3012130" cy="1508265"/>
+          </a:xfrm>
+          <a:prstGeom prst="rect">
+            <a:avLst/>
+          </a:prstGeom>
+          <a:noFill/>
+          <a:ln>
+            <a:solidFill>
+              <a:schemeClr val="accent1"/>
+            </a:solidFill>
+          </a:ln>
+        </p:spPr>
+        <p:txBody>
+          <a:bodyPr wrap="square" rtlCol="0">
+            <a:noAutofit/>
+          </a:bodyPr>
+          <a:lstStyle/>
+          <a:p>
+            <a:r>
+              <a:rPr lang="en-US" dirty="0">
+                <a:latin typeface="Times New Roman" panose="02020603050405020304" pitchFamily="18" charset="0"/>
+                <a:cs typeface="Times New Roman" panose="02020603050405020304" pitchFamily="18" charset="0"/>
+              </a:rPr>
+              <a:t>In-kernel </a:t>
+            </a:r>
+            <a:r>
+              <a:rPr lang="en-US" dirty="0" err="1">
+                <a:latin typeface="Times New Roman" panose="02020603050405020304" pitchFamily="18" charset="0"/>
+                <a:cs typeface="Times New Roman" panose="02020603050405020304" pitchFamily="18" charset="0"/>
+              </a:rPr>
+              <a:t>landingpad</a:t>
+            </a:r>
+            <a:endParaRPr lang="en-US" dirty="0">
+              <a:latin typeface="Times New Roman" panose="02020603050405020304" pitchFamily="18" charset="0"/>
+              <a:cs typeface="Times New Roman" panose="02020603050405020304" pitchFamily="18" charset="0"/>
+            </a:endParaRPr>
+          </a:p>
+          <a:p>
+            <a:r>
+              <a:rPr lang="en-US" sz="1400" b="1" dirty="0" err="1">
+                <a:latin typeface="Consolas" panose="020B0609020204030204" pitchFamily="49" charset="0"/>
+                <a:cs typeface="Consolas" panose="020B0609020204030204" pitchFamily="49" charset="0"/>
+              </a:rPr>
+              <a:t>rex_landingpad</a:t>
+            </a:r>
+            <a:r>
+              <a:rPr lang="en-US" sz="1400" b="1" dirty="0">
+                <a:latin typeface="Consolas" panose="020B0609020204030204" pitchFamily="49" charset="0"/>
+                <a:cs typeface="Consolas" panose="020B0609020204030204" pitchFamily="49" charset="0"/>
+              </a:rPr>
+              <a:t>:</a:t>
+            </a:r>
+          </a:p>
+          <a:p>
+            <a:r>
+              <a:rPr lang="en-US" sz="1398" dirty="0">
+                <a:solidFill>
+                  <a:schemeClr val="accent6">
+                    <a:lumMod val="75000"/>
+                  </a:schemeClr>
+                </a:solidFill>
+                <a:latin typeface="Consolas" panose="020B0609020204030204" pitchFamily="49" charset="0"/>
+                <a:cs typeface="Consolas" panose="020B0609020204030204" pitchFamily="49" charset="0"/>
+              </a:rPr>
+              <a:t>// report error</a:t>
+            </a:r>
+          </a:p>
+          <a:p>
+            <a:r>
+              <a:rPr lang="en-US" sz="1398" dirty="0">
+                <a:solidFill>
+                  <a:schemeClr val="accent6">
+                    <a:lumMod val="75000"/>
+                  </a:schemeClr>
+                </a:solidFill>
+                <a:latin typeface="Consolas" panose="020B0609020204030204" pitchFamily="49" charset="0"/>
+                <a:cs typeface="Consolas" panose="020B0609020204030204" pitchFamily="49" charset="0"/>
+              </a:rPr>
+              <a:t>// set default return value</a:t>
+            </a:r>
+          </a:p>
+          <a:p>
+            <a:r>
+              <a:rPr lang="en-US" sz="1400" dirty="0">
+                <a:latin typeface="Consolas" panose="020B0609020204030204" pitchFamily="49" charset="0"/>
+                <a:cs typeface="Consolas" panose="020B0609020204030204" pitchFamily="49" charset="0"/>
+              </a:rPr>
+              <a:t>...</a:t>
+            </a:r>
+          </a:p>
+          <a:p>
+            <a:r>
+              <a:rPr lang="en-US" sz="1400" b="1" dirty="0" err="1">
+                <a:latin typeface="Consolas" panose="020B0609020204030204" pitchFamily="49" charset="0"/>
+                <a:cs typeface="Consolas" panose="020B0609020204030204" pitchFamily="49" charset="0"/>
+              </a:rPr>
+              <a:t>jmp</a:t>
+            </a:r>
+            <a:r>
+              <a:rPr lang="en-US" sz="1400" b="1" dirty="0">
+                <a:latin typeface="Consolas" panose="020B0609020204030204" pitchFamily="49" charset="0"/>
+                <a:cs typeface="Consolas" panose="020B0609020204030204" pitchFamily="49" charset="0"/>
+              </a:rPr>
+              <a:t> </a:t>
+            </a:r>
+            <a:r>
+              <a:rPr lang="en-US" sz="1400" b="1" dirty="0" err="1">
+                <a:latin typeface="Consolas" panose="020B0609020204030204" pitchFamily="49" charset="0"/>
+                <a:cs typeface="Consolas" panose="020B0609020204030204" pitchFamily="49" charset="0"/>
+              </a:rPr>
+              <a:t>rex_exit</a:t>
+            </a:r>
+            <a:endParaRPr lang="en-US" sz="1400" b="1" dirty="0">
+              <a:latin typeface="Consolas" panose="020B0609020204030204" pitchFamily="49" charset="0"/>
+              <a:cs typeface="Consolas" panose="020B0609020204030204" pitchFamily="49" charset="0"/>
+            </a:endParaRPr>
+          </a:p>
+        </p:txBody>
+      </p:sp>
+      <p:sp>
+        <p:nvSpPr>
+          <p:cNvPr id="4" name="TextBox 3">
+            <a:extLst>
+              <a:ext uri="{FF2B5EF4-FFF2-40B4-BE49-F238E27FC236}">
+                <a16:creationId xmlns:a16="http://schemas.microsoft.com/office/drawing/2014/main" id="{DC5D00EE-0AFF-B160-215E-307CB2FC6491}"/>
+              </a:ext>
+            </a:extLst>
+          </p:cNvPr>
+          <p:cNvSpPr txBox="1"/>
+          <p:nvPr/>
+        </p:nvSpPr>
+        <p:spPr>
+          <a:xfrm>
+            <a:off x="0" y="951819"/>
+            <a:ext cx="4162402" cy="3759250"/>
+          </a:xfrm>
+          <a:prstGeom prst="rect">
+            <a:avLst/>
+          </a:prstGeom>
+          <a:noFill/>
+          <a:ln>
+            <a:solidFill>
+              <a:schemeClr val="accent1"/>
+            </a:solidFill>
+          </a:ln>
+        </p:spPr>
+        <p:txBody>
+          <a:bodyPr wrap="square" rtlCol="0">
+            <a:noAutofit/>
+          </a:bodyPr>
+          <a:lstStyle/>
+          <a:p>
+            <a:r>
+              <a:rPr lang="en-US" dirty="0">
+                <a:latin typeface="Times New Roman" panose="02020603050405020304" pitchFamily="18" charset="0"/>
+                <a:cs typeface="Times New Roman" panose="02020603050405020304" pitchFamily="18" charset="0"/>
+              </a:rPr>
+              <a:t>In-kernel dispatcher function </a:t>
+            </a:r>
+          </a:p>
+          <a:p>
+            <a:pPr defTabSz="914400">
+              <a:defRPr/>
+            </a:pPr>
+            <a:r>
+              <a:rPr lang="en-US" sz="1400" b="1" dirty="0" err="1">
                 <a:solidFill>
                   <a:prstClr val="black"/>
                 </a:solidFill>
                 <a:latin typeface="Consolas" panose="020B0609020204030204" pitchFamily="49" charset="0"/>
                 <a:cs typeface="Consolas" panose="020B0609020204030204" pitchFamily="49" charset="0"/>
-              </a:endParaRPr>
-            </a:p>
-          </p:txBody>
-        </p:sp>
-      </p:grpSp>
+              </a:rPr>
+              <a:t>rex_dispatcher_func</a:t>
+            </a:r>
+            <a:r>
+              <a:rPr lang="en-US" sz="1400" b="1" dirty="0">
+                <a:solidFill>
+                  <a:prstClr val="black"/>
+                </a:solidFill>
+                <a:latin typeface="Consolas" panose="020B0609020204030204" pitchFamily="49" charset="0"/>
+                <a:cs typeface="Consolas" panose="020B0609020204030204" pitchFamily="49" charset="0"/>
+              </a:rPr>
+              <a:t>:</a:t>
+            </a:r>
+          </a:p>
+          <a:p>
+            <a:pPr>
+              <a:defRPr/>
+            </a:pPr>
+            <a:r>
+              <a:rPr lang="en-US" sz="1398" dirty="0">
+                <a:solidFill>
+                  <a:schemeClr val="accent6">
+                    <a:lumMod val="75000"/>
+                  </a:schemeClr>
+                </a:solidFill>
+                <a:latin typeface="Consolas" panose="020B0609020204030204" pitchFamily="49" charset="0"/>
+                <a:cs typeface="Consolas" panose="020B0609020204030204" pitchFamily="49" charset="0"/>
+              </a:rPr>
+              <a:t>// save the callee-saved registers</a:t>
+            </a:r>
+          </a:p>
+          <a:p>
+            <a:pPr defTabSz="914400">
+              <a:defRPr/>
+            </a:pPr>
+            <a:r>
+              <a:rPr lang="en-US" sz="1400" dirty="0" err="1">
+                <a:solidFill>
+                  <a:prstClr val="black"/>
+                </a:solidFill>
+                <a:latin typeface="Consolas" panose="020B0609020204030204" pitchFamily="49" charset="0"/>
+                <a:cs typeface="Consolas" panose="020B0609020204030204" pitchFamily="49" charset="0"/>
+              </a:rPr>
+              <a:t>pushq</a:t>
+            </a:r>
+            <a:r>
+              <a:rPr lang="en-US" sz="1400" dirty="0">
+                <a:solidFill>
+                  <a:prstClr val="black"/>
+                </a:solidFill>
+                <a:latin typeface="Consolas" panose="020B0609020204030204" pitchFamily="49" charset="0"/>
+                <a:cs typeface="Consolas" panose="020B0609020204030204" pitchFamily="49" charset="0"/>
+              </a:rPr>
+              <a:t> ...</a:t>
+            </a:r>
+          </a:p>
+          <a:p>
+            <a:pPr>
+              <a:defRPr/>
+            </a:pPr>
+            <a:r>
+              <a:rPr lang="en-US" sz="1398" dirty="0">
+                <a:solidFill>
+                  <a:schemeClr val="accent6">
+                    <a:lumMod val="75000"/>
+                  </a:schemeClr>
+                </a:solidFill>
+                <a:latin typeface="Consolas" panose="020B0609020204030204" pitchFamily="49" charset="0"/>
+                <a:cs typeface="Consolas" panose="020B0609020204030204" pitchFamily="49" charset="0"/>
+              </a:rPr>
+              <a:t>//</a:t>
+            </a:r>
+            <a:r>
+              <a:rPr lang="zh-CN" altLang="en-US" sz="1398" dirty="0">
+                <a:solidFill>
+                  <a:schemeClr val="accent6">
+                    <a:lumMod val="75000"/>
+                  </a:schemeClr>
+                </a:solidFill>
+                <a:latin typeface="Consolas" panose="020B0609020204030204" pitchFamily="49" charset="0"/>
+                <a:cs typeface="Consolas" panose="020B0609020204030204" pitchFamily="49" charset="0"/>
+              </a:rPr>
+              <a:t> </a:t>
+            </a:r>
+            <a:r>
+              <a:rPr lang="en-US" sz="1398" dirty="0">
+                <a:solidFill>
+                  <a:schemeClr val="accent6">
+                    <a:lumMod val="75000"/>
+                  </a:schemeClr>
+                </a:solidFill>
+                <a:latin typeface="Consolas" panose="020B0609020204030204" pitchFamily="49" charset="0"/>
+                <a:cs typeface="Consolas" panose="020B0609020204030204" pitchFamily="49" charset="0"/>
+              </a:rPr>
+              <a:t>save the stack and frame pointer</a:t>
+            </a:r>
+          </a:p>
+          <a:p>
+            <a:pPr defTabSz="914400">
+              <a:defRPr/>
+            </a:pPr>
+            <a:r>
+              <a:rPr lang="en-US" sz="1400" dirty="0" err="1">
+                <a:solidFill>
+                  <a:prstClr val="black"/>
+                </a:solidFill>
+                <a:latin typeface="Consolas" panose="020B0609020204030204" pitchFamily="49" charset="0"/>
+                <a:cs typeface="Consolas" panose="020B0609020204030204" pitchFamily="49" charset="0"/>
+              </a:rPr>
+              <a:t>movq</a:t>
+            </a:r>
+            <a:r>
+              <a:rPr lang="en-US" sz="1400" dirty="0">
+                <a:solidFill>
+                  <a:prstClr val="black"/>
+                </a:solidFill>
+                <a:latin typeface="Consolas" panose="020B0609020204030204" pitchFamily="49" charset="0"/>
+                <a:cs typeface="Consolas" panose="020B0609020204030204" pitchFamily="49" charset="0"/>
+              </a:rPr>
+              <a:t> %</a:t>
+            </a:r>
+            <a:r>
+              <a:rPr lang="en-US" sz="1400" dirty="0" err="1">
+                <a:solidFill>
+                  <a:prstClr val="black"/>
+                </a:solidFill>
+                <a:latin typeface="Consolas" panose="020B0609020204030204" pitchFamily="49" charset="0"/>
+                <a:cs typeface="Consolas" panose="020B0609020204030204" pitchFamily="49" charset="0"/>
+              </a:rPr>
+              <a:t>rsp</a:t>
+            </a:r>
+            <a:r>
+              <a:rPr lang="en-US" sz="1400" dirty="0">
+                <a:solidFill>
+                  <a:prstClr val="black"/>
+                </a:solidFill>
+                <a:latin typeface="Consolas" panose="020B0609020204030204" pitchFamily="49" charset="0"/>
+                <a:cs typeface="Consolas" panose="020B0609020204030204" pitchFamily="49" charset="0"/>
+              </a:rPr>
+              <a:t>, PER_CPU_VAR(</a:t>
+            </a:r>
+            <a:r>
+              <a:rPr lang="en-US" sz="1400" dirty="0" err="1">
+                <a:solidFill>
+                  <a:prstClr val="black"/>
+                </a:solidFill>
+                <a:latin typeface="Consolas" panose="020B0609020204030204" pitchFamily="49" charset="0"/>
+                <a:cs typeface="Consolas" panose="020B0609020204030204" pitchFamily="49" charset="0"/>
+              </a:rPr>
+              <a:t>rex_old_sp</a:t>
+            </a:r>
+            <a:r>
+              <a:rPr lang="en-US" sz="1400" dirty="0">
+                <a:solidFill>
+                  <a:prstClr val="black"/>
+                </a:solidFill>
+                <a:latin typeface="Consolas" panose="020B0609020204030204" pitchFamily="49" charset="0"/>
+                <a:cs typeface="Consolas" panose="020B0609020204030204" pitchFamily="49" charset="0"/>
+              </a:rPr>
+              <a:t>) ...</a:t>
+            </a:r>
+          </a:p>
+          <a:p>
+            <a:pPr>
+              <a:defRPr/>
+            </a:pPr>
+            <a:r>
+              <a:rPr lang="en-US" sz="1398" dirty="0">
+                <a:solidFill>
+                  <a:schemeClr val="accent6">
+                    <a:lumMod val="75000"/>
+                  </a:schemeClr>
+                </a:solidFill>
+                <a:latin typeface="Consolas" panose="020B0609020204030204" pitchFamily="49" charset="0"/>
+                <a:cs typeface="Consolas" panose="020B0609020204030204" pitchFamily="49" charset="0"/>
+              </a:rPr>
+              <a:t>// switch stack </a:t>
+            </a:r>
+          </a:p>
+          <a:p>
+            <a:pPr defTabSz="914400">
+              <a:defRPr/>
+            </a:pPr>
+            <a:r>
+              <a:rPr lang="en-US" sz="1400" dirty="0" err="1">
+                <a:solidFill>
+                  <a:prstClr val="black"/>
+                </a:solidFill>
+                <a:latin typeface="Consolas" panose="020B0609020204030204" pitchFamily="49" charset="0"/>
+                <a:cs typeface="Consolas" panose="020B0609020204030204" pitchFamily="49" charset="0"/>
+              </a:rPr>
+              <a:t>movq</a:t>
+            </a:r>
+            <a:r>
+              <a:rPr lang="en-US" sz="1400" dirty="0">
+                <a:solidFill>
+                  <a:prstClr val="black"/>
+                </a:solidFill>
+                <a:latin typeface="Consolas" panose="020B0609020204030204" pitchFamily="49" charset="0"/>
+                <a:cs typeface="Consolas" panose="020B0609020204030204" pitchFamily="49" charset="0"/>
+              </a:rPr>
+              <a:t> PER_CPU_VAR(</a:t>
+            </a:r>
+            <a:r>
+              <a:rPr lang="en-US" sz="1400" dirty="0" err="1">
+                <a:solidFill>
+                  <a:prstClr val="black"/>
+                </a:solidFill>
+                <a:latin typeface="Consolas" panose="020B0609020204030204" pitchFamily="49" charset="0"/>
+                <a:cs typeface="Consolas" panose="020B0609020204030204" pitchFamily="49" charset="0"/>
+              </a:rPr>
+              <a:t>rex_stack</a:t>
+            </a:r>
+            <a:r>
+              <a:rPr lang="en-US" sz="1400" dirty="0">
+                <a:solidFill>
+                  <a:prstClr val="black"/>
+                </a:solidFill>
+                <a:latin typeface="Consolas" panose="020B0609020204030204" pitchFamily="49" charset="0"/>
+                <a:cs typeface="Consolas" panose="020B0609020204030204" pitchFamily="49" charset="0"/>
+              </a:rPr>
+              <a:t>), %</a:t>
+            </a:r>
+            <a:r>
+              <a:rPr lang="en-US" sz="1400" dirty="0" err="1">
+                <a:solidFill>
+                  <a:prstClr val="black"/>
+                </a:solidFill>
+                <a:latin typeface="Consolas" panose="020B0609020204030204" pitchFamily="49" charset="0"/>
+                <a:cs typeface="Consolas" panose="020B0609020204030204" pitchFamily="49" charset="0"/>
+              </a:rPr>
+              <a:t>rsp</a:t>
+            </a:r>
+            <a:r>
+              <a:rPr lang="en-US" sz="1400" dirty="0">
+                <a:solidFill>
+                  <a:prstClr val="black"/>
+                </a:solidFill>
+                <a:latin typeface="Consolas" panose="020B0609020204030204" pitchFamily="49" charset="0"/>
+                <a:cs typeface="Consolas" panose="020B0609020204030204" pitchFamily="49" charset="0"/>
+              </a:rPr>
+              <a:t> ...</a:t>
+            </a:r>
+          </a:p>
+          <a:p>
+            <a:pPr>
+              <a:defRPr/>
+            </a:pPr>
+            <a:r>
+              <a:rPr lang="en-US" sz="1398" dirty="0">
+                <a:solidFill>
+                  <a:schemeClr val="accent6">
+                    <a:lumMod val="75000"/>
+                  </a:schemeClr>
+                </a:solidFill>
+                <a:latin typeface="Consolas" panose="020B0609020204030204" pitchFamily="49" charset="0"/>
+                <a:cs typeface="Consolas" panose="020B0609020204030204" pitchFamily="49" charset="0"/>
+              </a:rPr>
+              <a:t>// invoke the REX program</a:t>
+            </a:r>
+          </a:p>
+          <a:p>
+            <a:pPr defTabSz="914400">
+              <a:defRPr/>
+            </a:pPr>
+            <a:r>
+              <a:rPr lang="en-US" sz="1400" b="1" dirty="0">
+                <a:solidFill>
+                  <a:prstClr val="black"/>
+                </a:solidFill>
+                <a:latin typeface="Consolas" panose="020B0609020204030204" pitchFamily="49" charset="0"/>
+                <a:cs typeface="Consolas" panose="020B0609020204030204" pitchFamily="49" charset="0"/>
+              </a:rPr>
+              <a:t>call *%</a:t>
+            </a:r>
+            <a:r>
+              <a:rPr lang="en-US" sz="1400" b="1" dirty="0" err="1">
+                <a:solidFill>
+                  <a:prstClr val="black"/>
+                </a:solidFill>
+                <a:latin typeface="Consolas" panose="020B0609020204030204" pitchFamily="49" charset="0"/>
+                <a:cs typeface="Consolas" panose="020B0609020204030204" pitchFamily="49" charset="0"/>
+              </a:rPr>
+              <a:t>rdx</a:t>
+            </a:r>
+            <a:endParaRPr lang="en-US" sz="1400" dirty="0">
+              <a:solidFill>
+                <a:prstClr val="black"/>
+              </a:solidFill>
+              <a:latin typeface="Consolas" panose="020B0609020204030204" pitchFamily="49" charset="0"/>
+              <a:cs typeface="Consolas" panose="020B0609020204030204" pitchFamily="49" charset="0"/>
+            </a:endParaRPr>
+          </a:p>
+          <a:p>
+            <a:pPr defTabSz="914400">
+              <a:defRPr/>
+            </a:pPr>
+            <a:endParaRPr lang="en-US" sz="1400" dirty="0">
+              <a:solidFill>
+                <a:prstClr val="black"/>
+              </a:solidFill>
+              <a:latin typeface="Consolas" panose="020B0609020204030204" pitchFamily="49" charset="0"/>
+              <a:cs typeface="Consolas" panose="020B0609020204030204" pitchFamily="49" charset="0"/>
+            </a:endParaRPr>
+          </a:p>
+          <a:p>
+            <a:pPr defTabSz="914400">
+              <a:defRPr/>
+            </a:pPr>
+            <a:r>
+              <a:rPr lang="en-US" sz="1400" b="1" dirty="0" err="1">
+                <a:solidFill>
+                  <a:prstClr val="black"/>
+                </a:solidFill>
+                <a:latin typeface="Consolas" panose="020B0609020204030204" pitchFamily="49" charset="0"/>
+                <a:cs typeface="Consolas" panose="020B0609020204030204" pitchFamily="49" charset="0"/>
+              </a:rPr>
+              <a:t>rex_exit</a:t>
+            </a:r>
+            <a:r>
+              <a:rPr lang="en-US" sz="1400" b="1" dirty="0">
+                <a:solidFill>
+                  <a:prstClr val="black"/>
+                </a:solidFill>
+                <a:latin typeface="Consolas" panose="020B0609020204030204" pitchFamily="49" charset="0"/>
+                <a:cs typeface="Consolas" panose="020B0609020204030204" pitchFamily="49" charset="0"/>
+              </a:rPr>
+              <a:t>:</a:t>
+            </a:r>
+          </a:p>
+          <a:p>
+            <a:pPr>
+              <a:defRPr/>
+            </a:pPr>
+            <a:r>
+              <a:rPr lang="en-US" sz="1398" dirty="0">
+                <a:solidFill>
+                  <a:schemeClr val="accent6">
+                    <a:lumMod val="75000"/>
+                  </a:schemeClr>
+                </a:solidFill>
+                <a:latin typeface="Consolas" panose="020B0609020204030204" pitchFamily="49" charset="0"/>
+                <a:cs typeface="Consolas" panose="020B0609020204030204" pitchFamily="49" charset="0"/>
+              </a:rPr>
+              <a:t>// restore old stack and frame pointer</a:t>
+            </a:r>
+          </a:p>
+          <a:p>
+            <a:pPr defTabSz="914400">
+              <a:defRPr/>
+            </a:pPr>
+            <a:r>
+              <a:rPr lang="en-US" sz="1400" dirty="0" err="1">
+                <a:solidFill>
+                  <a:prstClr val="black"/>
+                </a:solidFill>
+                <a:latin typeface="Consolas" panose="020B0609020204030204" pitchFamily="49" charset="0"/>
+                <a:cs typeface="Consolas" panose="020B0609020204030204" pitchFamily="49" charset="0"/>
+              </a:rPr>
+              <a:t>movq</a:t>
+            </a:r>
+            <a:r>
+              <a:rPr lang="en-US" sz="1400" dirty="0">
+                <a:solidFill>
+                  <a:prstClr val="black"/>
+                </a:solidFill>
+                <a:latin typeface="Consolas" panose="020B0609020204030204" pitchFamily="49" charset="0"/>
+                <a:cs typeface="Consolas" panose="020B0609020204030204" pitchFamily="49" charset="0"/>
+              </a:rPr>
+              <a:t> PER_CPU_VAR(</a:t>
+            </a:r>
+            <a:r>
+              <a:rPr lang="en-US" sz="1400" dirty="0" err="1">
+                <a:solidFill>
+                  <a:prstClr val="black"/>
+                </a:solidFill>
+                <a:latin typeface="Consolas" panose="020B0609020204030204" pitchFamily="49" charset="0"/>
+                <a:cs typeface="Consolas" panose="020B0609020204030204" pitchFamily="49" charset="0"/>
+              </a:rPr>
+              <a:t>rex_old_sp</a:t>
+            </a:r>
+            <a:r>
+              <a:rPr lang="en-US" sz="1400" dirty="0">
+                <a:solidFill>
+                  <a:prstClr val="black"/>
+                </a:solidFill>
+                <a:latin typeface="Consolas" panose="020B0609020204030204" pitchFamily="49" charset="0"/>
+                <a:cs typeface="Consolas" panose="020B0609020204030204" pitchFamily="49" charset="0"/>
+              </a:rPr>
+              <a:t>), %</a:t>
+            </a:r>
+            <a:r>
+              <a:rPr lang="en-US" sz="1400" dirty="0" err="1">
+                <a:solidFill>
+                  <a:prstClr val="black"/>
+                </a:solidFill>
+                <a:latin typeface="Consolas" panose="020B0609020204030204" pitchFamily="49" charset="0"/>
+                <a:cs typeface="Consolas" panose="020B0609020204030204" pitchFamily="49" charset="0"/>
+              </a:rPr>
+              <a:t>rsp</a:t>
+            </a:r>
+            <a:endParaRPr lang="en-US" sz="1400" dirty="0">
+              <a:solidFill>
+                <a:prstClr val="black"/>
+              </a:solidFill>
+              <a:latin typeface="Consolas" panose="020B0609020204030204" pitchFamily="49" charset="0"/>
+              <a:cs typeface="Consolas" panose="020B0609020204030204" pitchFamily="49" charset="0"/>
+            </a:endParaRPr>
+          </a:p>
+          <a:p>
+            <a:pPr>
+              <a:defRPr/>
+            </a:pPr>
+            <a:r>
+              <a:rPr lang="en-US" sz="1398" dirty="0">
+                <a:solidFill>
+                  <a:schemeClr val="accent6">
+                    <a:lumMod val="75000"/>
+                  </a:schemeClr>
+                </a:solidFill>
+                <a:latin typeface="Consolas" panose="020B0609020204030204" pitchFamily="49" charset="0"/>
+                <a:cs typeface="Consolas" panose="020B0609020204030204" pitchFamily="49" charset="0"/>
+              </a:rPr>
+              <a:t>// restore the callee-saved registers</a:t>
+            </a:r>
+          </a:p>
+          <a:p>
+            <a:pPr defTabSz="914400">
+              <a:defRPr/>
+            </a:pPr>
+            <a:r>
+              <a:rPr lang="en-US" sz="1400" dirty="0" err="1">
+                <a:solidFill>
+                  <a:prstClr val="black"/>
+                </a:solidFill>
+                <a:latin typeface="Consolas" panose="020B0609020204030204" pitchFamily="49" charset="0"/>
+                <a:cs typeface="Consolas" panose="020B0609020204030204" pitchFamily="49" charset="0"/>
+              </a:rPr>
+              <a:t>popq</a:t>
+            </a:r>
+            <a:r>
+              <a:rPr lang="en-US" sz="1400" dirty="0">
+                <a:solidFill>
+                  <a:prstClr val="black"/>
+                </a:solidFill>
+                <a:latin typeface="Consolas" panose="020B0609020204030204" pitchFamily="49" charset="0"/>
+                <a:cs typeface="Consolas" panose="020B0609020204030204" pitchFamily="49" charset="0"/>
+              </a:rPr>
+              <a:t> ...</a:t>
+            </a:r>
+          </a:p>
+          <a:p>
+            <a:pPr defTabSz="914400">
+              <a:defRPr/>
+            </a:pPr>
+            <a:r>
+              <a:rPr lang="en-US" sz="1400" dirty="0">
+                <a:solidFill>
+                  <a:prstClr val="black"/>
+                </a:solidFill>
+                <a:latin typeface="Consolas" panose="020B0609020204030204" pitchFamily="49" charset="0"/>
+                <a:cs typeface="Consolas" panose="020B0609020204030204" pitchFamily="49" charset="0"/>
+              </a:rPr>
+              <a:t>ret</a:t>
+            </a:r>
+          </a:p>
+          <a:p>
+            <a:pPr defTabSz="914400">
+              <a:defRPr/>
+            </a:pPr>
+            <a:endParaRPr lang="en-US" sz="500" dirty="0">
+              <a:solidFill>
+                <a:prstClr val="black"/>
+              </a:solidFill>
+              <a:latin typeface="Consolas" panose="020B0609020204030204" pitchFamily="49" charset="0"/>
+              <a:cs typeface="Consolas" panose="020B0609020204030204" pitchFamily="49" charset="0"/>
+            </a:endParaRPr>
+          </a:p>
+        </p:txBody>
+      </p:sp>
+      <p:cxnSp>
+        <p:nvCxnSpPr>
+          <p:cNvPr id="56" name="Elbow Connector 55">
+            <a:extLst>
+              <a:ext uri="{FF2B5EF4-FFF2-40B4-BE49-F238E27FC236}">
+                <a16:creationId xmlns:a16="http://schemas.microsoft.com/office/drawing/2014/main" id="{9D001ADA-E8F4-C5EE-20D3-B87DC87E86A1}"/>
+              </a:ext>
+            </a:extLst>
+          </p:cNvPr>
+          <p:cNvCxnSpPr>
+            <a:cxnSpLocks/>
+            <a:stCxn id="40" idx="2"/>
+          </p:cNvCxnSpPr>
+          <p:nvPr/>
+        </p:nvCxnSpPr>
+        <p:spPr>
+          <a:xfrm flipH="1">
+            <a:off x="6496826" y="883158"/>
+            <a:ext cx="826368" cy="720595"/>
+          </a:xfrm>
+          <a:prstGeom prst="bentConnector3">
+            <a:avLst>
+              <a:gd name="adj1" fmla="val -91058"/>
+            </a:avLst>
+          </a:prstGeom>
+          <a:ln w="34925">
+            <a:solidFill>
+              <a:srgbClr val="C00000"/>
+            </a:solidFill>
+            <a:prstDash val="sysDot"/>
+            <a:round/>
+            <a:tailEnd type="triangle"/>
+          </a:ln>
+        </p:spPr>
+        <p:style>
+          <a:lnRef idx="2">
+            <a:schemeClr val="accent1"/>
+          </a:lnRef>
+          <a:fillRef idx="0">
+            <a:schemeClr val="accent1"/>
+          </a:fillRef>
+          <a:effectRef idx="1">
+            <a:schemeClr val="accent1"/>
+          </a:effectRef>
+          <a:fontRef idx="minor">
+            <a:schemeClr val="tx1"/>
+          </a:fontRef>
+        </p:style>
+      </p:cxnSp>
+      <p:sp>
+        <p:nvSpPr>
+          <p:cNvPr id="75" name="TextBox 74">
+            <a:extLst>
+              <a:ext uri="{FF2B5EF4-FFF2-40B4-BE49-F238E27FC236}">
+                <a16:creationId xmlns:a16="http://schemas.microsoft.com/office/drawing/2014/main" id="{1D8E2556-92C3-7B82-5EBA-03213E737026}"/>
+              </a:ext>
+            </a:extLst>
+          </p:cNvPr>
+          <p:cNvSpPr txBox="1"/>
+          <p:nvPr/>
+        </p:nvSpPr>
+        <p:spPr>
+          <a:xfrm>
+            <a:off x="4784265" y="2793575"/>
+            <a:ext cx="2216610" cy="232930"/>
+          </a:xfrm>
+          <a:prstGeom prst="rect">
+            <a:avLst/>
+          </a:prstGeom>
+          <a:noFill/>
+          <a:ln>
+            <a:noFill/>
+          </a:ln>
+        </p:spPr>
+        <p:txBody>
+          <a:bodyPr wrap="square" rtlCol="0">
+            <a:noAutofit/>
+          </a:bodyPr>
+          <a:lstStyle/>
+          <a:p>
+            <a:endParaRPr lang="en-US" sz="1400" dirty="0">
+              <a:solidFill>
+                <a:prstClr val="black"/>
+              </a:solidFill>
+              <a:latin typeface="Consolas" panose="020B0609020204030204" pitchFamily="49" charset="0"/>
+              <a:cs typeface="Consolas" panose="020B0609020204030204" pitchFamily="49" charset="0"/>
+            </a:endParaRPr>
+          </a:p>
+        </p:txBody>
+      </p:sp>
+      <p:cxnSp>
+        <p:nvCxnSpPr>
+          <p:cNvPr id="76" name="Elbow Connector 75">
+            <a:extLst>
+              <a:ext uri="{FF2B5EF4-FFF2-40B4-BE49-F238E27FC236}">
+                <a16:creationId xmlns:a16="http://schemas.microsoft.com/office/drawing/2014/main" id="{CBF7EA6E-09A2-19DA-4EF0-F1BE22E1ED51}"/>
+              </a:ext>
+            </a:extLst>
+          </p:cNvPr>
+          <p:cNvCxnSpPr>
+            <a:cxnSpLocks/>
+            <a:stCxn id="75" idx="3"/>
+            <a:endCxn id="79" idx="3"/>
+          </p:cNvCxnSpPr>
+          <p:nvPr/>
+        </p:nvCxnSpPr>
+        <p:spPr>
+          <a:xfrm flipH="1">
+            <a:off x="6512411" y="2910041"/>
+            <a:ext cx="488464" cy="721031"/>
+          </a:xfrm>
+          <a:prstGeom prst="bentConnector3">
+            <a:avLst>
+              <a:gd name="adj1" fmla="val -247649"/>
+            </a:avLst>
+          </a:prstGeom>
+          <a:ln w="34925">
+            <a:solidFill>
+              <a:srgbClr val="C00000"/>
+            </a:solidFill>
+            <a:prstDash val="sysDot"/>
+            <a:round/>
+            <a:tailEnd type="triangle"/>
+          </a:ln>
+        </p:spPr>
+        <p:style>
+          <a:lnRef idx="2">
+            <a:schemeClr val="accent1"/>
+          </a:lnRef>
+          <a:fillRef idx="0">
+            <a:schemeClr val="accent1"/>
+          </a:fillRef>
+          <a:effectRef idx="1">
+            <a:schemeClr val="accent1"/>
+          </a:effectRef>
+          <a:fontRef idx="minor">
+            <a:schemeClr val="tx1"/>
+          </a:fontRef>
+        </p:style>
+      </p:cxnSp>
+      <p:sp>
+        <p:nvSpPr>
+          <p:cNvPr id="79" name="TextBox 78">
+            <a:extLst>
+              <a:ext uri="{FF2B5EF4-FFF2-40B4-BE49-F238E27FC236}">
+                <a16:creationId xmlns:a16="http://schemas.microsoft.com/office/drawing/2014/main" id="{228AFBE5-1F4C-E599-E670-3CC0B90D784B}"/>
+              </a:ext>
+            </a:extLst>
+          </p:cNvPr>
+          <p:cNvSpPr txBox="1"/>
+          <p:nvPr/>
+        </p:nvSpPr>
+        <p:spPr>
+          <a:xfrm>
+            <a:off x="4971491" y="3507500"/>
+            <a:ext cx="1540921" cy="247143"/>
+          </a:xfrm>
+          <a:prstGeom prst="rect">
+            <a:avLst/>
+          </a:prstGeom>
+          <a:noFill/>
+          <a:ln>
+            <a:noFill/>
+          </a:ln>
+        </p:spPr>
+        <p:txBody>
+          <a:bodyPr wrap="square" rtlCol="0">
+            <a:noAutofit/>
+          </a:bodyPr>
+          <a:lstStyle/>
+          <a:p>
+            <a:endParaRPr lang="en-US" sz="1400" dirty="0">
+              <a:solidFill>
+                <a:prstClr val="black"/>
+              </a:solidFill>
+              <a:latin typeface="Consolas" panose="020B0609020204030204" pitchFamily="49" charset="0"/>
+              <a:cs typeface="Consolas" panose="020B0609020204030204" pitchFamily="49" charset="0"/>
+            </a:endParaRPr>
+          </a:p>
+        </p:txBody>
+      </p:sp>
     </p:spTree>
     <p:extLst>
       <p:ext uri="{BB962C8B-B14F-4D97-AF65-F5344CB8AC3E}">

</xml_diff>